<commit_message>
edited samplesheet dataset3 and analysis ideas with disease datasets
</commit_message>
<xml_diff>
--- a/analysis_ideas.pptx
+++ b/analysis_ideas.pptx
@@ -7,6 +7,10 @@
   <p:sldIdLst>
     <p:sldId id="256" r:id="rId2"/>
     <p:sldId id="257" r:id="rId3"/>
+    <p:sldId id="258" r:id="rId4"/>
+    <p:sldId id="259" r:id="rId5"/>
+    <p:sldId id="260" r:id="rId6"/>
+    <p:sldId id="261" r:id="rId7"/>
   </p:sldIdLst>
   <p:sldSz cx="12192000" cy="6858000"/>
   <p:notesSz cx="6858000" cy="9144000"/>
@@ -602,7 +606,7 @@
           <a:p>
             <a:fld id="{B39DB6D8-D897-47EB-B13C-F7D5E8B7745B}" type="datetimeFigureOut">
               <a:rPr lang="en-US" smtClean="0"/>
-              <a:t>12/13/2024</a:t>
+              <a:t>1/7/2025</a:t>
             </a:fld>
             <a:endParaRPr lang="en-US"/>
           </a:p>
@@ -800,7 +804,7 @@
           <a:p>
             <a:fld id="{B39DB6D8-D897-47EB-B13C-F7D5E8B7745B}" type="datetimeFigureOut">
               <a:rPr lang="en-US" smtClean="0"/>
-              <a:t>12/13/2024</a:t>
+              <a:t>1/7/2025</a:t>
             </a:fld>
             <a:endParaRPr lang="en-US"/>
           </a:p>
@@ -1008,7 +1012,7 @@
           <a:p>
             <a:fld id="{B39DB6D8-D897-47EB-B13C-F7D5E8B7745B}" type="datetimeFigureOut">
               <a:rPr lang="en-US" smtClean="0"/>
-              <a:t>12/13/2024</a:t>
+              <a:t>1/7/2025</a:t>
             </a:fld>
             <a:endParaRPr lang="en-US"/>
           </a:p>
@@ -1206,7 +1210,7 @@
           <a:p>
             <a:fld id="{B39DB6D8-D897-47EB-B13C-F7D5E8B7745B}" type="datetimeFigureOut">
               <a:rPr lang="en-US" smtClean="0"/>
-              <a:t>12/13/2024</a:t>
+              <a:t>1/7/2025</a:t>
             </a:fld>
             <a:endParaRPr lang="en-US"/>
           </a:p>
@@ -1481,7 +1485,7 @@
           <a:p>
             <a:fld id="{B39DB6D8-D897-47EB-B13C-F7D5E8B7745B}" type="datetimeFigureOut">
               <a:rPr lang="en-US" smtClean="0"/>
-              <a:t>12/13/2024</a:t>
+              <a:t>1/7/2025</a:t>
             </a:fld>
             <a:endParaRPr lang="en-US"/>
           </a:p>
@@ -1746,7 +1750,7 @@
           <a:p>
             <a:fld id="{B39DB6D8-D897-47EB-B13C-F7D5E8B7745B}" type="datetimeFigureOut">
               <a:rPr lang="en-US" smtClean="0"/>
-              <a:t>12/13/2024</a:t>
+              <a:t>1/7/2025</a:t>
             </a:fld>
             <a:endParaRPr lang="en-US"/>
           </a:p>
@@ -2158,7 +2162,7 @@
           <a:p>
             <a:fld id="{B39DB6D8-D897-47EB-B13C-F7D5E8B7745B}" type="datetimeFigureOut">
               <a:rPr lang="en-US" smtClean="0"/>
-              <a:t>12/13/2024</a:t>
+              <a:t>1/7/2025</a:t>
             </a:fld>
             <a:endParaRPr lang="en-US"/>
           </a:p>
@@ -2299,7 +2303,7 @@
           <a:p>
             <a:fld id="{B39DB6D8-D897-47EB-B13C-F7D5E8B7745B}" type="datetimeFigureOut">
               <a:rPr lang="en-US" smtClean="0"/>
-              <a:t>12/13/2024</a:t>
+              <a:t>1/7/2025</a:t>
             </a:fld>
             <a:endParaRPr lang="en-US"/>
           </a:p>
@@ -2412,7 +2416,7 @@
           <a:p>
             <a:fld id="{B39DB6D8-D897-47EB-B13C-F7D5E8B7745B}" type="datetimeFigureOut">
               <a:rPr lang="en-US" smtClean="0"/>
-              <a:t>12/13/2024</a:t>
+              <a:t>1/7/2025</a:t>
             </a:fld>
             <a:endParaRPr lang="en-US"/>
           </a:p>
@@ -2723,7 +2727,7 @@
           <a:p>
             <a:fld id="{B39DB6D8-D897-47EB-B13C-F7D5E8B7745B}" type="datetimeFigureOut">
               <a:rPr lang="en-US" smtClean="0"/>
-              <a:t>12/13/2024</a:t>
+              <a:t>1/7/2025</a:t>
             </a:fld>
             <a:endParaRPr lang="en-US"/>
           </a:p>
@@ -3011,7 +3015,7 @@
           <a:p>
             <a:fld id="{B39DB6D8-D897-47EB-B13C-F7D5E8B7745B}" type="datetimeFigureOut">
               <a:rPr lang="en-US" smtClean="0"/>
-              <a:t>12/13/2024</a:t>
+              <a:t>1/7/2025</a:t>
             </a:fld>
             <a:endParaRPr lang="en-US"/>
           </a:p>
@@ -3252,7 +3256,7 @@
           <a:p>
             <a:fld id="{B39DB6D8-D897-47EB-B13C-F7D5E8B7745B}" type="datetimeFigureOut">
               <a:rPr lang="en-US" smtClean="0"/>
-              <a:t>12/13/2024</a:t>
+              <a:t>1/7/2025</a:t>
             </a:fld>
             <a:endParaRPr lang="en-US"/>
           </a:p>
@@ -5368,6 +5372,1687 @@
     <p:extLst>
       <p:ext uri="{BB962C8B-B14F-4D97-AF65-F5344CB8AC3E}">
         <p14:creationId xmlns:p14="http://schemas.microsoft.com/office/powerpoint/2010/main" val="668727100"/>
+      </p:ext>
+    </p:extLst>
+  </p:cSld>
+  <p:clrMapOvr>
+    <a:masterClrMapping/>
+  </p:clrMapOvr>
+</p:sld>
+</file>
+
+<file path=ppt/slides/slide3.xml><?xml version="1.0" encoding="utf-8"?>
+<p:sld xmlns:a="http://schemas.openxmlformats.org/drawingml/2006/main" xmlns:r="http://schemas.openxmlformats.org/officeDocument/2006/relationships" xmlns:p="http://schemas.openxmlformats.org/presentationml/2006/main">
+  <p:cSld>
+    <p:spTree>
+      <p:nvGrpSpPr>
+        <p:cNvPr id="1" name=""/>
+        <p:cNvGrpSpPr/>
+        <p:nvPr/>
+      </p:nvGrpSpPr>
+      <p:grpSpPr>
+        <a:xfrm>
+          <a:off x="0" y="0"/>
+          <a:ext cx="0" cy="0"/>
+          <a:chOff x="0" y="0"/>
+          <a:chExt cx="0" cy="0"/>
+        </a:xfrm>
+      </p:grpSpPr>
+      <p:sp>
+        <p:nvSpPr>
+          <p:cNvPr id="10" name="Title 1">
+            <a:extLst>
+              <a:ext uri="{FF2B5EF4-FFF2-40B4-BE49-F238E27FC236}">
+                <a16:creationId xmlns:a16="http://schemas.microsoft.com/office/drawing/2014/main" id="{8DC65B8B-C057-103B-161E-86829DB636B2}"/>
+              </a:ext>
+            </a:extLst>
+          </p:cNvPr>
+          <p:cNvSpPr>
+            <a:spLocks noGrp="1"/>
+          </p:cNvSpPr>
+          <p:nvPr>
+            <p:ph type="title"/>
+          </p:nvPr>
+        </p:nvSpPr>
+        <p:spPr>
+          <a:xfrm>
+            <a:off x="186267" y="187324"/>
+            <a:ext cx="10515600" cy="540809"/>
+          </a:xfrm>
+        </p:spPr>
+        <p:txBody>
+          <a:bodyPr>
+            <a:normAutofit/>
+          </a:bodyPr>
+          <a:lstStyle/>
+          <a:p>
+            <a:r>
+              <a:rPr lang="en-US" sz="3000" dirty="0"/>
+              <a:t>Disease dataset set #1: </a:t>
+            </a:r>
+            <a:r>
+              <a:rPr lang="en-US" sz="3000" dirty="0" err="1"/>
+              <a:t>Proestou</a:t>
+            </a:r>
+            <a:r>
+              <a:rPr lang="en-US" sz="3000" dirty="0"/>
+              <a:t> et al. 2023</a:t>
+            </a:r>
+          </a:p>
+        </p:txBody>
+      </p:sp>
+      <p:sp>
+        <p:nvSpPr>
+          <p:cNvPr id="11" name="Title 1">
+            <a:extLst>
+              <a:ext uri="{FF2B5EF4-FFF2-40B4-BE49-F238E27FC236}">
+                <a16:creationId xmlns:a16="http://schemas.microsoft.com/office/drawing/2014/main" id="{D8A3D93B-A7FC-F9D9-8FBF-470919815147}"/>
+              </a:ext>
+            </a:extLst>
+          </p:cNvPr>
+          <p:cNvSpPr txBox="1">
+            <a:spLocks/>
+          </p:cNvSpPr>
+          <p:nvPr/>
+        </p:nvSpPr>
+        <p:spPr>
+          <a:xfrm>
+            <a:off x="186267" y="788456"/>
+            <a:ext cx="10515600" cy="1694633"/>
+          </a:xfrm>
+          <a:prstGeom prst="rect">
+            <a:avLst/>
+          </a:prstGeom>
+        </p:spPr>
+        <p:txBody>
+          <a:bodyPr vert="horz" lIns="91440" tIns="45720" rIns="91440" bIns="45720" rtlCol="0" anchor="ctr">
+            <a:normAutofit/>
+          </a:bodyPr>
+          <a:lstStyle>
+            <a:lvl1pPr algn="l" defTabSz="914400" rtl="0" eaLnBrk="1" latinLnBrk="0" hangingPunct="1">
+              <a:lnSpc>
+                <a:spcPct val="90000"/>
+              </a:lnSpc>
+              <a:spcBef>
+                <a:spcPct val="0"/>
+              </a:spcBef>
+              <a:buNone/>
+              <a:defRPr sz="4400" kern="1200">
+                <a:solidFill>
+                  <a:schemeClr val="tx1"/>
+                </a:solidFill>
+                <a:latin typeface="+mj-lt"/>
+                <a:ea typeface="+mj-ea"/>
+                <a:cs typeface="+mj-cs"/>
+              </a:defRPr>
+            </a:lvl1pPr>
+          </a:lstStyle>
+          <a:p>
+            <a:r>
+              <a:rPr lang="en-US" sz="1800" dirty="0"/>
+              <a:t>Understanding </a:t>
+            </a:r>
+            <a:r>
+              <a:rPr lang="en-US" sz="1800" i="1" dirty="0"/>
+              <a:t>Crassostrea virginica </a:t>
+            </a:r>
+            <a:r>
+              <a:rPr lang="en-US" sz="1800" dirty="0"/>
+              <a:t>tolerance of </a:t>
+            </a:r>
+            <a:r>
+              <a:rPr lang="en-US" sz="1800" i="1" dirty="0" err="1"/>
+              <a:t>Perkinsus</a:t>
+            </a:r>
+            <a:r>
+              <a:rPr lang="en-US" sz="1800" i="1" dirty="0"/>
+              <a:t> marinus </a:t>
+            </a:r>
+            <a:r>
+              <a:rPr lang="en-US" sz="1800" dirty="0"/>
+              <a:t>through global gene expression analysis</a:t>
+            </a:r>
+          </a:p>
+          <a:p>
+            <a:r>
+              <a:rPr lang="en-US" sz="1800" dirty="0"/>
+              <a:t>link: </a:t>
+            </a:r>
+            <a:r>
+              <a:rPr lang="en-US" sz="1800" dirty="0">
+                <a:hlinkClick r:id="rId2"/>
+              </a:rPr>
+              <a:t>https://www.frontiersin.org/journals/genetics/articles/10.3389/fgene.2023.1054558/full</a:t>
+            </a:r>
+            <a:r>
+              <a:rPr lang="en-US" sz="1800" dirty="0"/>
+              <a:t> </a:t>
+            </a:r>
+          </a:p>
+          <a:p>
+            <a:endParaRPr lang="en-US" sz="1800" dirty="0"/>
+          </a:p>
+          <a:p>
+            <a:r>
+              <a:rPr lang="en-US" sz="1800" dirty="0"/>
+              <a:t>In this study we measured dermo tolerance and evaluated global expression patterns of two sensitive and two tolerant eastern oyster families experimentally challenged with distinct doses of </a:t>
+            </a:r>
+            <a:r>
+              <a:rPr lang="en-US" sz="1800" i="1" dirty="0"/>
+              <a:t>P. marinus </a:t>
+            </a:r>
+            <a:r>
+              <a:rPr lang="en-US" sz="1800" dirty="0"/>
+              <a:t>(0, 10^6, 10^7, and 10^8 parasite spores per gram wet weight, n = 3–5 individuals per family per dose)</a:t>
+            </a:r>
+          </a:p>
+        </p:txBody>
+      </p:sp>
+      <p:pic>
+        <p:nvPicPr>
+          <p:cNvPr id="1026" name="Picture 2" descr="Oyster Graphic">
+            <a:extLst>
+              <a:ext uri="{FF2B5EF4-FFF2-40B4-BE49-F238E27FC236}">
+                <a16:creationId xmlns:a16="http://schemas.microsoft.com/office/drawing/2014/main" id="{D0129C25-3F00-6345-84D8-A1E5945BBEF5}"/>
+              </a:ext>
+            </a:extLst>
+          </p:cNvPr>
+          <p:cNvPicPr>
+            <a:picLocks noChangeAspect="1" noChangeArrowheads="1"/>
+          </p:cNvPicPr>
+          <p:nvPr/>
+        </p:nvPicPr>
+        <p:blipFill>
+          <a:blip r:embed="rId3">
+            <a:extLst>
+              <a:ext uri="{28A0092B-C50C-407E-A947-70E740481C1C}">
+                <a14:useLocalDpi xmlns:a14="http://schemas.microsoft.com/office/drawing/2010/main" val="0"/>
+              </a:ext>
+            </a:extLst>
+          </a:blip>
+          <a:srcRect/>
+          <a:stretch>
+            <a:fillRect/>
+          </a:stretch>
+        </p:blipFill>
+        <p:spPr bwMode="auto">
+          <a:xfrm>
+            <a:off x="470407" y="2878565"/>
+            <a:ext cx="1093047" cy="1093047"/>
+          </a:xfrm>
+          <a:prstGeom prst="rect">
+            <a:avLst/>
+          </a:prstGeom>
+          <a:noFill/>
+          <a:extLst>
+            <a:ext uri="{909E8E84-426E-40DD-AFC4-6F175D3DCCD1}">
+              <a14:hiddenFill xmlns:a14="http://schemas.microsoft.com/office/drawing/2010/main">
+                <a:solidFill>
+                  <a:srgbClr val="FFFFFF"/>
+                </a:solidFill>
+              </a14:hiddenFill>
+            </a:ext>
+          </a:extLst>
+        </p:spPr>
+      </p:pic>
+      <p:sp>
+        <p:nvSpPr>
+          <p:cNvPr id="13" name="TextBox 12">
+            <a:extLst>
+              <a:ext uri="{FF2B5EF4-FFF2-40B4-BE49-F238E27FC236}">
+                <a16:creationId xmlns:a16="http://schemas.microsoft.com/office/drawing/2014/main" id="{FF68A273-D031-6C28-C839-AABB339E1C7F}"/>
+              </a:ext>
+            </a:extLst>
+          </p:cNvPr>
+          <p:cNvSpPr txBox="1"/>
+          <p:nvPr/>
+        </p:nvSpPr>
+        <p:spPr>
+          <a:xfrm>
+            <a:off x="4199465" y="3249346"/>
+            <a:ext cx="3115735" cy="369332"/>
+          </a:xfrm>
+          <a:prstGeom prst="rect">
+            <a:avLst/>
+          </a:prstGeom>
+          <a:noFill/>
+          <a:ln w="28575">
+            <a:solidFill>
+              <a:schemeClr val="accent1"/>
+            </a:solidFill>
+          </a:ln>
+        </p:spPr>
+        <p:txBody>
+          <a:bodyPr wrap="square" rtlCol="0">
+            <a:spAutoFit/>
+          </a:bodyPr>
+          <a:lstStyle/>
+          <a:p>
+            <a:pPr algn="ctr"/>
+            <a:r>
+              <a:rPr lang="en-US" dirty="0"/>
+              <a:t>Control (0 parasite spores g</a:t>
+            </a:r>
+            <a:r>
+              <a:rPr lang="en-US" baseline="30000" dirty="0"/>
+              <a:t>-1</a:t>
+            </a:r>
+            <a:r>
+              <a:rPr lang="en-US" dirty="0"/>
+              <a:t>)</a:t>
+            </a:r>
+          </a:p>
+        </p:txBody>
+      </p:sp>
+      <p:sp>
+        <p:nvSpPr>
+          <p:cNvPr id="14" name="TextBox 13">
+            <a:extLst>
+              <a:ext uri="{FF2B5EF4-FFF2-40B4-BE49-F238E27FC236}">
+                <a16:creationId xmlns:a16="http://schemas.microsoft.com/office/drawing/2014/main" id="{C3D5EF9D-70AB-0F63-8199-562443881253}"/>
+              </a:ext>
+            </a:extLst>
+          </p:cNvPr>
+          <p:cNvSpPr txBox="1"/>
+          <p:nvPr/>
+        </p:nvSpPr>
+        <p:spPr>
+          <a:xfrm>
+            <a:off x="4199464" y="3785950"/>
+            <a:ext cx="3115735" cy="369332"/>
+          </a:xfrm>
+          <a:prstGeom prst="rect">
+            <a:avLst/>
+          </a:prstGeom>
+          <a:noFill/>
+          <a:ln w="28575">
+            <a:solidFill>
+              <a:schemeClr val="accent3">
+                <a:lumMod val="60000"/>
+                <a:lumOff val="40000"/>
+              </a:schemeClr>
+            </a:solidFill>
+          </a:ln>
+        </p:spPr>
+        <p:txBody>
+          <a:bodyPr wrap="square" rtlCol="0">
+            <a:spAutoFit/>
+          </a:bodyPr>
+          <a:lstStyle/>
+          <a:p>
+            <a:pPr algn="ctr"/>
+            <a:r>
+              <a:rPr lang="en-US" dirty="0"/>
+              <a:t>Dose 10</a:t>
+            </a:r>
+            <a:r>
+              <a:rPr lang="en-US" baseline="30000" dirty="0"/>
+              <a:t>^6</a:t>
+            </a:r>
+            <a:r>
+              <a:rPr lang="en-US" dirty="0"/>
+              <a:t> parasite spores g</a:t>
+            </a:r>
+            <a:r>
+              <a:rPr lang="en-US" baseline="30000" dirty="0"/>
+              <a:t>-1</a:t>
+            </a:r>
+            <a:r>
+              <a:rPr lang="en-US" dirty="0"/>
+              <a:t>)</a:t>
+            </a:r>
+          </a:p>
+        </p:txBody>
+      </p:sp>
+      <p:sp>
+        <p:nvSpPr>
+          <p:cNvPr id="15" name="TextBox 14">
+            <a:extLst>
+              <a:ext uri="{FF2B5EF4-FFF2-40B4-BE49-F238E27FC236}">
+                <a16:creationId xmlns:a16="http://schemas.microsoft.com/office/drawing/2014/main" id="{2CB688E8-5CFB-AE09-0832-9B603D6F9F53}"/>
+              </a:ext>
+            </a:extLst>
+          </p:cNvPr>
+          <p:cNvSpPr txBox="1"/>
+          <p:nvPr/>
+        </p:nvSpPr>
+        <p:spPr>
+          <a:xfrm>
+            <a:off x="4199464" y="4322554"/>
+            <a:ext cx="3115735" cy="369332"/>
+          </a:xfrm>
+          <a:prstGeom prst="rect">
+            <a:avLst/>
+          </a:prstGeom>
+          <a:noFill/>
+          <a:ln w="28575">
+            <a:solidFill>
+              <a:schemeClr val="accent6">
+                <a:lumMod val="75000"/>
+              </a:schemeClr>
+            </a:solidFill>
+          </a:ln>
+        </p:spPr>
+        <p:txBody>
+          <a:bodyPr wrap="square" rtlCol="0">
+            <a:spAutoFit/>
+          </a:bodyPr>
+          <a:lstStyle/>
+          <a:p>
+            <a:pPr algn="ctr"/>
+            <a:r>
+              <a:rPr lang="en-US" dirty="0"/>
+              <a:t>Dose 10</a:t>
+            </a:r>
+            <a:r>
+              <a:rPr lang="en-US" baseline="30000" dirty="0"/>
+              <a:t>^7</a:t>
+            </a:r>
+            <a:r>
+              <a:rPr lang="en-US" dirty="0"/>
+              <a:t> parasite spores g</a:t>
+            </a:r>
+            <a:r>
+              <a:rPr lang="en-US" baseline="30000" dirty="0"/>
+              <a:t>-1</a:t>
+            </a:r>
+            <a:r>
+              <a:rPr lang="en-US" dirty="0"/>
+              <a:t>)</a:t>
+            </a:r>
+          </a:p>
+        </p:txBody>
+      </p:sp>
+      <p:sp>
+        <p:nvSpPr>
+          <p:cNvPr id="16" name="TextBox 15">
+            <a:extLst>
+              <a:ext uri="{FF2B5EF4-FFF2-40B4-BE49-F238E27FC236}">
+                <a16:creationId xmlns:a16="http://schemas.microsoft.com/office/drawing/2014/main" id="{642274C1-4F82-4C1D-8B26-C662D7D9F001}"/>
+              </a:ext>
+            </a:extLst>
+          </p:cNvPr>
+          <p:cNvSpPr txBox="1"/>
+          <p:nvPr/>
+        </p:nvSpPr>
+        <p:spPr>
+          <a:xfrm>
+            <a:off x="4199464" y="4859158"/>
+            <a:ext cx="3115735" cy="369332"/>
+          </a:xfrm>
+          <a:prstGeom prst="rect">
+            <a:avLst/>
+          </a:prstGeom>
+          <a:noFill/>
+          <a:ln w="28575">
+            <a:solidFill>
+              <a:schemeClr val="accent6">
+                <a:lumMod val="50000"/>
+              </a:schemeClr>
+            </a:solidFill>
+          </a:ln>
+        </p:spPr>
+        <p:txBody>
+          <a:bodyPr wrap="square" rtlCol="0">
+            <a:spAutoFit/>
+          </a:bodyPr>
+          <a:lstStyle/>
+          <a:p>
+            <a:pPr algn="ctr"/>
+            <a:r>
+              <a:rPr lang="en-US" dirty="0"/>
+              <a:t>Dose 10</a:t>
+            </a:r>
+            <a:r>
+              <a:rPr lang="en-US" baseline="30000" dirty="0"/>
+              <a:t>^8</a:t>
+            </a:r>
+            <a:r>
+              <a:rPr lang="en-US" dirty="0"/>
+              <a:t> parasite spores g</a:t>
+            </a:r>
+            <a:r>
+              <a:rPr lang="en-US" baseline="30000" dirty="0"/>
+              <a:t>-1</a:t>
+            </a:r>
+            <a:r>
+              <a:rPr lang="en-US" dirty="0"/>
+              <a:t>)</a:t>
+            </a:r>
+          </a:p>
+        </p:txBody>
+      </p:sp>
+      <p:cxnSp>
+        <p:nvCxnSpPr>
+          <p:cNvPr id="25" name="Connector: Elbow 24">
+            <a:extLst>
+              <a:ext uri="{FF2B5EF4-FFF2-40B4-BE49-F238E27FC236}">
+                <a16:creationId xmlns:a16="http://schemas.microsoft.com/office/drawing/2014/main" id="{2D8B6194-6B09-F76C-EB82-631FB243B56B}"/>
+              </a:ext>
+            </a:extLst>
+          </p:cNvPr>
+          <p:cNvCxnSpPr>
+            <a:cxnSpLocks/>
+          </p:cNvCxnSpPr>
+          <p:nvPr/>
+        </p:nvCxnSpPr>
+        <p:spPr>
+          <a:xfrm>
+            <a:off x="7315199" y="3425089"/>
+            <a:ext cx="3725333" cy="857192"/>
+          </a:xfrm>
+          <a:prstGeom prst="bentConnector3">
+            <a:avLst>
+              <a:gd name="adj1" fmla="val 24545"/>
+            </a:avLst>
+          </a:prstGeom>
+          <a:ln>
+            <a:tailEnd type="triangle"/>
+          </a:ln>
+        </p:spPr>
+        <p:style>
+          <a:lnRef idx="2">
+            <a:schemeClr val="accent1"/>
+          </a:lnRef>
+          <a:fillRef idx="0">
+            <a:schemeClr val="accent1"/>
+          </a:fillRef>
+          <a:effectRef idx="1">
+            <a:schemeClr val="accent1"/>
+          </a:effectRef>
+          <a:fontRef idx="minor">
+            <a:schemeClr val="tx1"/>
+          </a:fontRef>
+        </p:style>
+      </p:cxnSp>
+      <p:cxnSp>
+        <p:nvCxnSpPr>
+          <p:cNvPr id="32" name="Connector: Elbow 31">
+            <a:extLst>
+              <a:ext uri="{FF2B5EF4-FFF2-40B4-BE49-F238E27FC236}">
+                <a16:creationId xmlns:a16="http://schemas.microsoft.com/office/drawing/2014/main" id="{E63B9CA2-87B5-53E0-A8CE-D6B4E84C1344}"/>
+              </a:ext>
+            </a:extLst>
+          </p:cNvPr>
+          <p:cNvCxnSpPr>
+            <a:cxnSpLocks/>
+            <a:stCxn id="14" idx="3"/>
+          </p:cNvCxnSpPr>
+          <p:nvPr/>
+        </p:nvCxnSpPr>
+        <p:spPr>
+          <a:xfrm>
+            <a:off x="7315199" y="3970616"/>
+            <a:ext cx="3725333" cy="311665"/>
+          </a:xfrm>
+          <a:prstGeom prst="bentConnector3">
+            <a:avLst>
+              <a:gd name="adj1" fmla="val 24523"/>
+            </a:avLst>
+          </a:prstGeom>
+          <a:ln>
+            <a:solidFill>
+              <a:schemeClr val="accent3">
+                <a:lumMod val="60000"/>
+                <a:lumOff val="40000"/>
+              </a:schemeClr>
+            </a:solidFill>
+            <a:tailEnd type="triangle"/>
+          </a:ln>
+        </p:spPr>
+        <p:style>
+          <a:lnRef idx="2">
+            <a:schemeClr val="accent1"/>
+          </a:lnRef>
+          <a:fillRef idx="0">
+            <a:schemeClr val="accent1"/>
+          </a:fillRef>
+          <a:effectRef idx="1">
+            <a:schemeClr val="accent1"/>
+          </a:effectRef>
+          <a:fontRef idx="minor">
+            <a:schemeClr val="tx1"/>
+          </a:fontRef>
+        </p:style>
+      </p:cxnSp>
+      <p:cxnSp>
+        <p:nvCxnSpPr>
+          <p:cNvPr id="36" name="Connector: Elbow 35">
+            <a:extLst>
+              <a:ext uri="{FF2B5EF4-FFF2-40B4-BE49-F238E27FC236}">
+                <a16:creationId xmlns:a16="http://schemas.microsoft.com/office/drawing/2014/main" id="{7FC27111-E05A-53A0-BEAB-91516D93B17B}"/>
+              </a:ext>
+            </a:extLst>
+          </p:cNvPr>
+          <p:cNvCxnSpPr>
+            <a:cxnSpLocks/>
+            <a:stCxn id="15" idx="3"/>
+          </p:cNvCxnSpPr>
+          <p:nvPr/>
+        </p:nvCxnSpPr>
+        <p:spPr>
+          <a:xfrm flipV="1">
+            <a:off x="7315199" y="4282281"/>
+            <a:ext cx="3725333" cy="224939"/>
+          </a:xfrm>
+          <a:prstGeom prst="bentConnector3">
+            <a:avLst>
+              <a:gd name="adj1" fmla="val 24523"/>
+            </a:avLst>
+          </a:prstGeom>
+          <a:ln>
+            <a:solidFill>
+              <a:schemeClr val="accent6">
+                <a:lumMod val="75000"/>
+              </a:schemeClr>
+            </a:solidFill>
+            <a:tailEnd type="triangle"/>
+          </a:ln>
+        </p:spPr>
+        <p:style>
+          <a:lnRef idx="2">
+            <a:schemeClr val="accent1"/>
+          </a:lnRef>
+          <a:fillRef idx="0">
+            <a:schemeClr val="accent1"/>
+          </a:fillRef>
+          <a:effectRef idx="1">
+            <a:schemeClr val="accent1"/>
+          </a:effectRef>
+          <a:fontRef idx="minor">
+            <a:schemeClr val="tx1"/>
+          </a:fontRef>
+        </p:style>
+      </p:cxnSp>
+      <p:cxnSp>
+        <p:nvCxnSpPr>
+          <p:cNvPr id="42" name="Connector: Elbow 41">
+            <a:extLst>
+              <a:ext uri="{FF2B5EF4-FFF2-40B4-BE49-F238E27FC236}">
+                <a16:creationId xmlns:a16="http://schemas.microsoft.com/office/drawing/2014/main" id="{BB9BDB02-0923-FB9B-07AC-B89D81ADEE52}"/>
+              </a:ext>
+            </a:extLst>
+          </p:cNvPr>
+          <p:cNvCxnSpPr>
+            <a:cxnSpLocks/>
+            <a:stCxn id="16" idx="3"/>
+          </p:cNvCxnSpPr>
+          <p:nvPr/>
+        </p:nvCxnSpPr>
+        <p:spPr>
+          <a:xfrm flipV="1">
+            <a:off x="7315199" y="4282281"/>
+            <a:ext cx="3725333" cy="761543"/>
+          </a:xfrm>
+          <a:prstGeom prst="bentConnector3">
+            <a:avLst>
+              <a:gd name="adj1" fmla="val 24616"/>
+            </a:avLst>
+          </a:prstGeom>
+          <a:ln>
+            <a:solidFill>
+              <a:schemeClr val="accent6">
+                <a:lumMod val="50000"/>
+              </a:schemeClr>
+            </a:solidFill>
+            <a:tailEnd type="triangle"/>
+          </a:ln>
+        </p:spPr>
+        <p:style>
+          <a:lnRef idx="2">
+            <a:schemeClr val="accent1"/>
+          </a:lnRef>
+          <a:fillRef idx="0">
+            <a:schemeClr val="accent1"/>
+          </a:fillRef>
+          <a:effectRef idx="1">
+            <a:schemeClr val="accent1"/>
+          </a:effectRef>
+          <a:fontRef idx="minor">
+            <a:schemeClr val="tx1"/>
+          </a:fontRef>
+        </p:style>
+      </p:cxnSp>
+      <p:sp>
+        <p:nvSpPr>
+          <p:cNvPr id="47" name="TextBox 46">
+            <a:extLst>
+              <a:ext uri="{FF2B5EF4-FFF2-40B4-BE49-F238E27FC236}">
+                <a16:creationId xmlns:a16="http://schemas.microsoft.com/office/drawing/2014/main" id="{F8B9C48F-D9E7-6B54-93F3-D14032B51ADB}"/>
+              </a:ext>
+            </a:extLst>
+          </p:cNvPr>
+          <p:cNvSpPr txBox="1"/>
+          <p:nvPr/>
+        </p:nvSpPr>
+        <p:spPr>
+          <a:xfrm>
+            <a:off x="367113" y="3897564"/>
+            <a:ext cx="1299635" cy="369332"/>
+          </a:xfrm>
+          <a:prstGeom prst="rect">
+            <a:avLst/>
+          </a:prstGeom>
+          <a:noFill/>
+          <a:ln w="28575">
+            <a:noFill/>
+          </a:ln>
+        </p:spPr>
+        <p:txBody>
+          <a:bodyPr wrap="square" rtlCol="0">
+            <a:spAutoFit/>
+          </a:bodyPr>
+          <a:lstStyle/>
+          <a:p>
+            <a:pPr algn="ctr"/>
+            <a:r>
+              <a:rPr lang="en-US" dirty="0"/>
+              <a:t>Family 84</a:t>
+            </a:r>
+          </a:p>
+        </p:txBody>
+      </p:sp>
+      <p:pic>
+        <p:nvPicPr>
+          <p:cNvPr id="49" name="Picture 2" descr="Oyster Graphic">
+            <a:extLst>
+              <a:ext uri="{FF2B5EF4-FFF2-40B4-BE49-F238E27FC236}">
+                <a16:creationId xmlns:a16="http://schemas.microsoft.com/office/drawing/2014/main" id="{32D2C41F-43A7-BB43-7E31-B6DDA297CEF3}"/>
+              </a:ext>
+            </a:extLst>
+          </p:cNvPr>
+          <p:cNvPicPr>
+            <a:picLocks noChangeAspect="1" noChangeArrowheads="1"/>
+          </p:cNvPicPr>
+          <p:nvPr/>
+        </p:nvPicPr>
+        <p:blipFill>
+          <a:blip r:embed="rId3">
+            <a:extLst>
+              <a:ext uri="{28A0092B-C50C-407E-A947-70E740481C1C}">
+                <a14:useLocalDpi xmlns:a14="http://schemas.microsoft.com/office/drawing/2010/main" val="0"/>
+              </a:ext>
+            </a:extLst>
+          </a:blip>
+          <a:srcRect/>
+          <a:stretch>
+            <a:fillRect/>
+          </a:stretch>
+        </p:blipFill>
+        <p:spPr bwMode="auto">
+          <a:xfrm>
+            <a:off x="470407" y="4511241"/>
+            <a:ext cx="1093047" cy="1093047"/>
+          </a:xfrm>
+          <a:prstGeom prst="rect">
+            <a:avLst/>
+          </a:prstGeom>
+          <a:noFill/>
+          <a:extLst>
+            <a:ext uri="{909E8E84-426E-40DD-AFC4-6F175D3DCCD1}">
+              <a14:hiddenFill xmlns:a14="http://schemas.microsoft.com/office/drawing/2010/main">
+                <a:solidFill>
+                  <a:srgbClr val="FFFFFF"/>
+                </a:solidFill>
+              </a14:hiddenFill>
+            </a:ext>
+          </a:extLst>
+        </p:spPr>
+      </p:pic>
+      <p:sp>
+        <p:nvSpPr>
+          <p:cNvPr id="50" name="TextBox 49">
+            <a:extLst>
+              <a:ext uri="{FF2B5EF4-FFF2-40B4-BE49-F238E27FC236}">
+                <a16:creationId xmlns:a16="http://schemas.microsoft.com/office/drawing/2014/main" id="{F8F380BC-F2E9-51FF-9E4F-92838720C5C9}"/>
+              </a:ext>
+            </a:extLst>
+          </p:cNvPr>
+          <p:cNvSpPr txBox="1"/>
+          <p:nvPr/>
+        </p:nvSpPr>
+        <p:spPr>
+          <a:xfrm>
+            <a:off x="367113" y="5530241"/>
+            <a:ext cx="1299635" cy="369332"/>
+          </a:xfrm>
+          <a:prstGeom prst="rect">
+            <a:avLst/>
+          </a:prstGeom>
+          <a:noFill/>
+          <a:ln w="28575">
+            <a:noFill/>
+          </a:ln>
+        </p:spPr>
+        <p:txBody>
+          <a:bodyPr wrap="square" rtlCol="0">
+            <a:spAutoFit/>
+          </a:bodyPr>
+          <a:lstStyle/>
+          <a:p>
+            <a:pPr algn="ctr"/>
+            <a:r>
+              <a:rPr lang="en-US" dirty="0"/>
+              <a:t>Family 89</a:t>
+            </a:r>
+          </a:p>
+        </p:txBody>
+      </p:sp>
+      <p:sp>
+        <p:nvSpPr>
+          <p:cNvPr id="51" name="Oval 50">
+            <a:extLst>
+              <a:ext uri="{FF2B5EF4-FFF2-40B4-BE49-F238E27FC236}">
+                <a16:creationId xmlns:a16="http://schemas.microsoft.com/office/drawing/2014/main" id="{B369BAAF-4B69-DF68-D463-59D186A12464}"/>
+              </a:ext>
+            </a:extLst>
+          </p:cNvPr>
+          <p:cNvSpPr/>
+          <p:nvPr/>
+        </p:nvSpPr>
+        <p:spPr>
+          <a:xfrm>
+            <a:off x="8674734" y="4218781"/>
+            <a:ext cx="126999" cy="126999"/>
+          </a:xfrm>
+          <a:prstGeom prst="ellipse">
+            <a:avLst/>
+          </a:prstGeom>
+          <a:solidFill>
+            <a:schemeClr val="tx1">
+              <a:lumMod val="50000"/>
+              <a:lumOff val="50000"/>
+            </a:schemeClr>
+          </a:solidFill>
+          <a:ln>
+            <a:solidFill>
+              <a:schemeClr val="tx1">
+                <a:lumMod val="50000"/>
+                <a:lumOff val="50000"/>
+              </a:schemeClr>
+            </a:solidFill>
+          </a:ln>
+        </p:spPr>
+        <p:style>
+          <a:lnRef idx="2">
+            <a:schemeClr val="accent1">
+              <a:shade val="15000"/>
+            </a:schemeClr>
+          </a:lnRef>
+          <a:fillRef idx="1">
+            <a:schemeClr val="accent1"/>
+          </a:fillRef>
+          <a:effectRef idx="0">
+            <a:schemeClr val="accent1"/>
+          </a:effectRef>
+          <a:fontRef idx="minor">
+            <a:schemeClr val="lt1"/>
+          </a:fontRef>
+        </p:style>
+        <p:txBody>
+          <a:bodyPr rtlCol="0" anchor="ctr"/>
+          <a:lstStyle/>
+          <a:p>
+            <a:pPr algn="ctr"/>
+            <a:endParaRPr lang="en-US"/>
+          </a:p>
+        </p:txBody>
+      </p:sp>
+      <p:sp>
+        <p:nvSpPr>
+          <p:cNvPr id="52" name="TextBox 51">
+            <a:extLst>
+              <a:ext uri="{FF2B5EF4-FFF2-40B4-BE49-F238E27FC236}">
+                <a16:creationId xmlns:a16="http://schemas.microsoft.com/office/drawing/2014/main" id="{F678A3E7-209A-1A63-EB10-1CC7BDBB7152}"/>
+              </a:ext>
+            </a:extLst>
+          </p:cNvPr>
+          <p:cNvSpPr txBox="1"/>
+          <p:nvPr/>
+        </p:nvSpPr>
+        <p:spPr>
+          <a:xfrm>
+            <a:off x="8088415" y="3834459"/>
+            <a:ext cx="1299635" cy="369332"/>
+          </a:xfrm>
+          <a:prstGeom prst="rect">
+            <a:avLst/>
+          </a:prstGeom>
+          <a:noFill/>
+          <a:ln w="28575">
+            <a:noFill/>
+          </a:ln>
+        </p:spPr>
+        <p:txBody>
+          <a:bodyPr wrap="square" rtlCol="0">
+            <a:spAutoFit/>
+          </a:bodyPr>
+          <a:lstStyle/>
+          <a:p>
+            <a:pPr algn="ctr"/>
+            <a:r>
+              <a:rPr lang="en-US" dirty="0"/>
+              <a:t>Day 7</a:t>
+            </a:r>
+          </a:p>
+        </p:txBody>
+      </p:sp>
+      <p:sp>
+        <p:nvSpPr>
+          <p:cNvPr id="53" name="Oval 52">
+            <a:extLst>
+              <a:ext uri="{FF2B5EF4-FFF2-40B4-BE49-F238E27FC236}">
+                <a16:creationId xmlns:a16="http://schemas.microsoft.com/office/drawing/2014/main" id="{8E6121C1-0D69-6114-A051-FD05B4BBDFC8}"/>
+              </a:ext>
+            </a:extLst>
+          </p:cNvPr>
+          <p:cNvSpPr/>
+          <p:nvPr/>
+        </p:nvSpPr>
+        <p:spPr>
+          <a:xfrm>
+            <a:off x="9857634" y="4216894"/>
+            <a:ext cx="126999" cy="126999"/>
+          </a:xfrm>
+          <a:prstGeom prst="ellipse">
+            <a:avLst/>
+          </a:prstGeom>
+          <a:solidFill>
+            <a:schemeClr val="tx1">
+              <a:lumMod val="50000"/>
+              <a:lumOff val="50000"/>
+            </a:schemeClr>
+          </a:solidFill>
+          <a:ln>
+            <a:solidFill>
+              <a:schemeClr val="tx1">
+                <a:lumMod val="50000"/>
+                <a:lumOff val="50000"/>
+              </a:schemeClr>
+            </a:solidFill>
+          </a:ln>
+        </p:spPr>
+        <p:style>
+          <a:lnRef idx="2">
+            <a:schemeClr val="accent1">
+              <a:shade val="15000"/>
+            </a:schemeClr>
+          </a:lnRef>
+          <a:fillRef idx="1">
+            <a:schemeClr val="accent1"/>
+          </a:fillRef>
+          <a:effectRef idx="0">
+            <a:schemeClr val="accent1"/>
+          </a:effectRef>
+          <a:fontRef idx="minor">
+            <a:schemeClr val="lt1"/>
+          </a:fontRef>
+        </p:style>
+        <p:txBody>
+          <a:bodyPr rtlCol="0" anchor="ctr"/>
+          <a:lstStyle/>
+          <a:p>
+            <a:pPr algn="ctr"/>
+            <a:endParaRPr lang="en-US"/>
+          </a:p>
+        </p:txBody>
+      </p:sp>
+      <p:sp>
+        <p:nvSpPr>
+          <p:cNvPr id="54" name="TextBox 53">
+            <a:extLst>
+              <a:ext uri="{FF2B5EF4-FFF2-40B4-BE49-F238E27FC236}">
+                <a16:creationId xmlns:a16="http://schemas.microsoft.com/office/drawing/2014/main" id="{75146F35-1801-CAFC-76C5-A55D53CD9693}"/>
+              </a:ext>
+            </a:extLst>
+          </p:cNvPr>
+          <p:cNvSpPr txBox="1"/>
+          <p:nvPr/>
+        </p:nvSpPr>
+        <p:spPr>
+          <a:xfrm>
+            <a:off x="9271315" y="3832572"/>
+            <a:ext cx="1299635" cy="369332"/>
+          </a:xfrm>
+          <a:prstGeom prst="rect">
+            <a:avLst/>
+          </a:prstGeom>
+          <a:noFill/>
+          <a:ln w="28575">
+            <a:noFill/>
+          </a:ln>
+        </p:spPr>
+        <p:txBody>
+          <a:bodyPr wrap="square" rtlCol="0">
+            <a:spAutoFit/>
+          </a:bodyPr>
+          <a:lstStyle/>
+          <a:p>
+            <a:pPr algn="ctr"/>
+            <a:r>
+              <a:rPr lang="en-US" dirty="0"/>
+              <a:t>Day 50</a:t>
+            </a:r>
+          </a:p>
+        </p:txBody>
+      </p:sp>
+      <p:cxnSp>
+        <p:nvCxnSpPr>
+          <p:cNvPr id="56" name="Straight Arrow Connector 55">
+            <a:extLst>
+              <a:ext uri="{FF2B5EF4-FFF2-40B4-BE49-F238E27FC236}">
+                <a16:creationId xmlns:a16="http://schemas.microsoft.com/office/drawing/2014/main" id="{CBAAF926-D358-CD75-911D-A221C3589950}"/>
+              </a:ext>
+            </a:extLst>
+          </p:cNvPr>
+          <p:cNvCxnSpPr/>
+          <p:nvPr/>
+        </p:nvCxnSpPr>
+        <p:spPr>
+          <a:xfrm>
+            <a:off x="8737599" y="4566943"/>
+            <a:ext cx="0" cy="782223"/>
+          </a:xfrm>
+          <a:prstGeom prst="straightConnector1">
+            <a:avLst/>
+          </a:prstGeom>
+          <a:ln>
+            <a:solidFill>
+              <a:schemeClr val="tx1">
+                <a:lumMod val="50000"/>
+                <a:lumOff val="50000"/>
+              </a:schemeClr>
+            </a:solidFill>
+            <a:tailEnd type="triangle"/>
+          </a:ln>
+        </p:spPr>
+        <p:style>
+          <a:lnRef idx="2">
+            <a:schemeClr val="accent1"/>
+          </a:lnRef>
+          <a:fillRef idx="0">
+            <a:schemeClr val="accent1"/>
+          </a:fillRef>
+          <a:effectRef idx="1">
+            <a:schemeClr val="accent1"/>
+          </a:effectRef>
+          <a:fontRef idx="minor">
+            <a:schemeClr val="tx1"/>
+          </a:fontRef>
+        </p:style>
+      </p:cxnSp>
+      <p:sp>
+        <p:nvSpPr>
+          <p:cNvPr id="57" name="TextBox 56">
+            <a:extLst>
+              <a:ext uri="{FF2B5EF4-FFF2-40B4-BE49-F238E27FC236}">
+                <a16:creationId xmlns:a16="http://schemas.microsoft.com/office/drawing/2014/main" id="{8F363D38-A192-C590-FEB1-BBF3DA5D104B}"/>
+              </a:ext>
+            </a:extLst>
+          </p:cNvPr>
+          <p:cNvSpPr txBox="1"/>
+          <p:nvPr/>
+        </p:nvSpPr>
+        <p:spPr>
+          <a:xfrm>
+            <a:off x="7824449" y="5468412"/>
+            <a:ext cx="2877418" cy="646331"/>
+          </a:xfrm>
+          <a:prstGeom prst="rect">
+            <a:avLst/>
+          </a:prstGeom>
+          <a:noFill/>
+          <a:ln w="28575">
+            <a:noFill/>
+          </a:ln>
+        </p:spPr>
+        <p:txBody>
+          <a:bodyPr wrap="square" rtlCol="0">
+            <a:spAutoFit/>
+          </a:bodyPr>
+          <a:lstStyle/>
+          <a:p>
+            <a:pPr algn="ctr"/>
+            <a:r>
+              <a:rPr lang="en-US" dirty="0" err="1"/>
+              <a:t>TruSeq</a:t>
+            </a:r>
+            <a:r>
+              <a:rPr lang="en-US" dirty="0"/>
+              <a:t> Stranded mRNA n=3 family</a:t>
+            </a:r>
+            <a:r>
+              <a:rPr lang="en-US" baseline="30000" dirty="0"/>
+              <a:t>-1</a:t>
+            </a:r>
+            <a:r>
+              <a:rPr lang="en-US" dirty="0"/>
+              <a:t> treatment</a:t>
+            </a:r>
+            <a:r>
+              <a:rPr lang="en-US" baseline="30000" dirty="0"/>
+              <a:t>-1</a:t>
+            </a:r>
+          </a:p>
+        </p:txBody>
+      </p:sp>
+      <p:cxnSp>
+        <p:nvCxnSpPr>
+          <p:cNvPr id="60" name="Straight Arrow Connector 59">
+            <a:extLst>
+              <a:ext uri="{FF2B5EF4-FFF2-40B4-BE49-F238E27FC236}">
+                <a16:creationId xmlns:a16="http://schemas.microsoft.com/office/drawing/2014/main" id="{FAB46DB0-070C-8B4E-461D-E10B1067CB54}"/>
+              </a:ext>
+            </a:extLst>
+          </p:cNvPr>
+          <p:cNvCxnSpPr>
+            <a:cxnSpLocks/>
+          </p:cNvCxnSpPr>
+          <p:nvPr/>
+        </p:nvCxnSpPr>
+        <p:spPr>
+          <a:xfrm flipV="1">
+            <a:off x="2973462" y="4201904"/>
+            <a:ext cx="787005" cy="489982"/>
+          </a:xfrm>
+          <a:prstGeom prst="straightConnector1">
+            <a:avLst/>
+          </a:prstGeom>
+          <a:ln>
+            <a:solidFill>
+              <a:schemeClr val="tx1">
+                <a:lumMod val="50000"/>
+                <a:lumOff val="50000"/>
+              </a:schemeClr>
+            </a:solidFill>
+            <a:tailEnd type="triangle"/>
+          </a:ln>
+        </p:spPr>
+        <p:style>
+          <a:lnRef idx="2">
+            <a:schemeClr val="accent1"/>
+          </a:lnRef>
+          <a:fillRef idx="0">
+            <a:schemeClr val="accent1"/>
+          </a:fillRef>
+          <a:effectRef idx="1">
+            <a:schemeClr val="accent1"/>
+          </a:effectRef>
+          <a:fontRef idx="minor">
+            <a:schemeClr val="tx1"/>
+          </a:fontRef>
+        </p:style>
+      </p:cxnSp>
+      <p:sp>
+        <p:nvSpPr>
+          <p:cNvPr id="1025" name="TextBox 1024">
+            <a:extLst>
+              <a:ext uri="{FF2B5EF4-FFF2-40B4-BE49-F238E27FC236}">
+                <a16:creationId xmlns:a16="http://schemas.microsoft.com/office/drawing/2014/main" id="{08089DA9-9ABC-B96F-595D-1103575D8F18}"/>
+              </a:ext>
+            </a:extLst>
+          </p:cNvPr>
+          <p:cNvSpPr txBox="1"/>
+          <p:nvPr/>
+        </p:nvSpPr>
+        <p:spPr>
+          <a:xfrm>
+            <a:off x="7824449" y="6069544"/>
+            <a:ext cx="1894866" cy="369332"/>
+          </a:xfrm>
+          <a:prstGeom prst="rect">
+            <a:avLst/>
+          </a:prstGeom>
+          <a:noFill/>
+          <a:ln w="28575">
+            <a:noFill/>
+          </a:ln>
+        </p:spPr>
+        <p:txBody>
+          <a:bodyPr wrap="square" rtlCol="0">
+            <a:spAutoFit/>
+          </a:bodyPr>
+          <a:lstStyle/>
+          <a:p>
+            <a:pPr algn="ctr"/>
+            <a:r>
+              <a:rPr lang="en-US" dirty="0"/>
+              <a:t>Mantle tissue</a:t>
+            </a:r>
+            <a:endParaRPr lang="en-US" baseline="30000" dirty="0"/>
+          </a:p>
+        </p:txBody>
+      </p:sp>
+      <p:pic>
+        <p:nvPicPr>
+          <p:cNvPr id="1030" name="Picture 2" descr="Oyster Graphic">
+            <a:extLst>
+              <a:ext uri="{FF2B5EF4-FFF2-40B4-BE49-F238E27FC236}">
+                <a16:creationId xmlns:a16="http://schemas.microsoft.com/office/drawing/2014/main" id="{6F7E65DC-EBE3-C410-BA9D-329943016938}"/>
+              </a:ext>
+            </a:extLst>
+          </p:cNvPr>
+          <p:cNvPicPr>
+            <a:picLocks noChangeAspect="1" noChangeArrowheads="1"/>
+          </p:cNvPicPr>
+          <p:nvPr/>
+        </p:nvPicPr>
+        <p:blipFill>
+          <a:blip r:embed="rId3">
+            <a:extLst>
+              <a:ext uri="{28A0092B-C50C-407E-A947-70E740481C1C}">
+                <a14:useLocalDpi xmlns:a14="http://schemas.microsoft.com/office/drawing/2010/main" val="0"/>
+              </a:ext>
+            </a:extLst>
+          </a:blip>
+          <a:srcRect/>
+          <a:stretch>
+            <a:fillRect/>
+          </a:stretch>
+        </p:blipFill>
+        <p:spPr bwMode="auto">
+          <a:xfrm>
+            <a:off x="1610151" y="4511241"/>
+            <a:ext cx="1093047" cy="1093047"/>
+          </a:xfrm>
+          <a:prstGeom prst="rect">
+            <a:avLst/>
+          </a:prstGeom>
+          <a:noFill/>
+          <a:extLst>
+            <a:ext uri="{909E8E84-426E-40DD-AFC4-6F175D3DCCD1}">
+              <a14:hiddenFill xmlns:a14="http://schemas.microsoft.com/office/drawing/2010/main">
+                <a:solidFill>
+                  <a:srgbClr val="FFFFFF"/>
+                </a:solidFill>
+              </a14:hiddenFill>
+            </a:ext>
+          </a:extLst>
+        </p:spPr>
+      </p:pic>
+      <p:sp>
+        <p:nvSpPr>
+          <p:cNvPr id="1031" name="TextBox 1030">
+            <a:extLst>
+              <a:ext uri="{FF2B5EF4-FFF2-40B4-BE49-F238E27FC236}">
+                <a16:creationId xmlns:a16="http://schemas.microsoft.com/office/drawing/2014/main" id="{DEEFA012-01AE-0238-2C2A-F08DEA3AAA07}"/>
+              </a:ext>
+            </a:extLst>
+          </p:cNvPr>
+          <p:cNvSpPr txBox="1"/>
+          <p:nvPr/>
+        </p:nvSpPr>
+        <p:spPr>
+          <a:xfrm>
+            <a:off x="1506857" y="5530241"/>
+            <a:ext cx="1299635" cy="369332"/>
+          </a:xfrm>
+          <a:prstGeom prst="rect">
+            <a:avLst/>
+          </a:prstGeom>
+          <a:noFill/>
+          <a:ln w="28575">
+            <a:noFill/>
+          </a:ln>
+        </p:spPr>
+        <p:txBody>
+          <a:bodyPr wrap="square" rtlCol="0">
+            <a:spAutoFit/>
+          </a:bodyPr>
+          <a:lstStyle/>
+          <a:p>
+            <a:pPr algn="ctr"/>
+            <a:r>
+              <a:rPr lang="en-US" dirty="0"/>
+              <a:t>Family 90</a:t>
+            </a:r>
+          </a:p>
+        </p:txBody>
+      </p:sp>
+      <p:pic>
+        <p:nvPicPr>
+          <p:cNvPr id="1033" name="Picture 2" descr="Oyster Graphic">
+            <a:extLst>
+              <a:ext uri="{FF2B5EF4-FFF2-40B4-BE49-F238E27FC236}">
+                <a16:creationId xmlns:a16="http://schemas.microsoft.com/office/drawing/2014/main" id="{BA935C37-61E5-E32D-5515-2068CC6F1B6F}"/>
+              </a:ext>
+            </a:extLst>
+          </p:cNvPr>
+          <p:cNvPicPr>
+            <a:picLocks noChangeAspect="1" noChangeArrowheads="1"/>
+          </p:cNvPicPr>
+          <p:nvPr/>
+        </p:nvPicPr>
+        <p:blipFill>
+          <a:blip r:embed="rId3">
+            <a:extLst>
+              <a:ext uri="{28A0092B-C50C-407E-A947-70E740481C1C}">
+                <a14:useLocalDpi xmlns:a14="http://schemas.microsoft.com/office/drawing/2010/main" val="0"/>
+              </a:ext>
+            </a:extLst>
+          </a:blip>
+          <a:srcRect/>
+          <a:stretch>
+            <a:fillRect/>
+          </a:stretch>
+        </p:blipFill>
+        <p:spPr bwMode="auto">
+          <a:xfrm>
+            <a:off x="1610151" y="2878565"/>
+            <a:ext cx="1093047" cy="1093047"/>
+          </a:xfrm>
+          <a:prstGeom prst="rect">
+            <a:avLst/>
+          </a:prstGeom>
+          <a:noFill/>
+          <a:extLst>
+            <a:ext uri="{909E8E84-426E-40DD-AFC4-6F175D3DCCD1}">
+              <a14:hiddenFill xmlns:a14="http://schemas.microsoft.com/office/drawing/2010/main">
+                <a:solidFill>
+                  <a:srgbClr val="FFFFFF"/>
+                </a:solidFill>
+              </a14:hiddenFill>
+            </a:ext>
+          </a:extLst>
+        </p:spPr>
+      </p:pic>
+      <p:sp>
+        <p:nvSpPr>
+          <p:cNvPr id="1034" name="TextBox 1033">
+            <a:extLst>
+              <a:ext uri="{FF2B5EF4-FFF2-40B4-BE49-F238E27FC236}">
+                <a16:creationId xmlns:a16="http://schemas.microsoft.com/office/drawing/2014/main" id="{79616A11-2DC9-315F-035A-330D5FAF4DEB}"/>
+              </a:ext>
+            </a:extLst>
+          </p:cNvPr>
+          <p:cNvSpPr txBox="1"/>
+          <p:nvPr/>
+        </p:nvSpPr>
+        <p:spPr>
+          <a:xfrm>
+            <a:off x="1506857" y="3897564"/>
+            <a:ext cx="1299635" cy="369332"/>
+          </a:xfrm>
+          <a:prstGeom prst="rect">
+            <a:avLst/>
+          </a:prstGeom>
+          <a:noFill/>
+          <a:ln w="28575">
+            <a:noFill/>
+          </a:ln>
+        </p:spPr>
+        <p:txBody>
+          <a:bodyPr wrap="square" rtlCol="0">
+            <a:spAutoFit/>
+          </a:bodyPr>
+          <a:lstStyle/>
+          <a:p>
+            <a:pPr algn="ctr"/>
+            <a:r>
+              <a:rPr lang="en-US" dirty="0"/>
+              <a:t>Family 120</a:t>
+            </a:r>
+          </a:p>
+        </p:txBody>
+      </p:sp>
+      <p:cxnSp>
+        <p:nvCxnSpPr>
+          <p:cNvPr id="1035" name="Straight Arrow Connector 1034">
+            <a:extLst>
+              <a:ext uri="{FF2B5EF4-FFF2-40B4-BE49-F238E27FC236}">
+                <a16:creationId xmlns:a16="http://schemas.microsoft.com/office/drawing/2014/main" id="{754F649B-A3C7-2C14-A8F4-7FF2EFF0C2AC}"/>
+              </a:ext>
+            </a:extLst>
+          </p:cNvPr>
+          <p:cNvCxnSpPr>
+            <a:cxnSpLocks/>
+          </p:cNvCxnSpPr>
+          <p:nvPr/>
+        </p:nvCxnSpPr>
+        <p:spPr>
+          <a:xfrm>
+            <a:off x="3022600" y="3665436"/>
+            <a:ext cx="737867" cy="459389"/>
+          </a:xfrm>
+          <a:prstGeom prst="straightConnector1">
+            <a:avLst/>
+          </a:prstGeom>
+          <a:ln>
+            <a:solidFill>
+              <a:schemeClr val="tx1">
+                <a:lumMod val="50000"/>
+                <a:lumOff val="50000"/>
+              </a:schemeClr>
+            </a:solidFill>
+            <a:tailEnd type="triangle"/>
+          </a:ln>
+        </p:spPr>
+        <p:style>
+          <a:lnRef idx="2">
+            <a:schemeClr val="accent1"/>
+          </a:lnRef>
+          <a:fillRef idx="0">
+            <a:schemeClr val="accent1"/>
+          </a:fillRef>
+          <a:effectRef idx="1">
+            <a:schemeClr val="accent1"/>
+          </a:effectRef>
+          <a:fontRef idx="minor">
+            <a:schemeClr val="tx1"/>
+          </a:fontRef>
+        </p:style>
+      </p:cxnSp>
+      <p:cxnSp>
+        <p:nvCxnSpPr>
+          <p:cNvPr id="1036" name="Straight Arrow Connector 1035">
+            <a:extLst>
+              <a:ext uri="{FF2B5EF4-FFF2-40B4-BE49-F238E27FC236}">
+                <a16:creationId xmlns:a16="http://schemas.microsoft.com/office/drawing/2014/main" id="{43A0C72D-8195-52E6-1D43-A75360628167}"/>
+              </a:ext>
+            </a:extLst>
+          </p:cNvPr>
+          <p:cNvCxnSpPr>
+            <a:cxnSpLocks/>
+          </p:cNvCxnSpPr>
+          <p:nvPr/>
+        </p:nvCxnSpPr>
+        <p:spPr>
+          <a:xfrm flipH="1" flipV="1">
+            <a:off x="8727649" y="3166533"/>
+            <a:ext cx="9950" cy="537384"/>
+          </a:xfrm>
+          <a:prstGeom prst="straightConnector1">
+            <a:avLst/>
+          </a:prstGeom>
+          <a:ln>
+            <a:solidFill>
+              <a:schemeClr val="tx1">
+                <a:lumMod val="50000"/>
+                <a:lumOff val="50000"/>
+              </a:schemeClr>
+            </a:solidFill>
+            <a:tailEnd type="triangle"/>
+          </a:ln>
+        </p:spPr>
+        <p:style>
+          <a:lnRef idx="2">
+            <a:schemeClr val="accent1"/>
+          </a:lnRef>
+          <a:fillRef idx="0">
+            <a:schemeClr val="accent1"/>
+          </a:fillRef>
+          <a:effectRef idx="1">
+            <a:schemeClr val="accent1"/>
+          </a:effectRef>
+          <a:fontRef idx="minor">
+            <a:schemeClr val="tx1"/>
+          </a:fontRef>
+        </p:style>
+      </p:cxnSp>
+      <p:sp>
+        <p:nvSpPr>
+          <p:cNvPr id="1039" name="TextBox 1038">
+            <a:extLst>
+              <a:ext uri="{FF2B5EF4-FFF2-40B4-BE49-F238E27FC236}">
+                <a16:creationId xmlns:a16="http://schemas.microsoft.com/office/drawing/2014/main" id="{F2A0B343-13D2-57B4-73DE-B134341270DE}"/>
+              </a:ext>
+            </a:extLst>
+          </p:cNvPr>
+          <p:cNvSpPr txBox="1"/>
+          <p:nvPr/>
+        </p:nvSpPr>
+        <p:spPr>
+          <a:xfrm>
+            <a:off x="8077831" y="2557666"/>
+            <a:ext cx="3292902" cy="523220"/>
+          </a:xfrm>
+          <a:prstGeom prst="rect">
+            <a:avLst/>
+          </a:prstGeom>
+          <a:noFill/>
+          <a:ln w="28575">
+            <a:noFill/>
+          </a:ln>
+        </p:spPr>
+        <p:txBody>
+          <a:bodyPr wrap="square" rtlCol="0">
+            <a:spAutoFit/>
+          </a:bodyPr>
+          <a:lstStyle/>
+          <a:p>
+            <a:pPr algn="ctr"/>
+            <a:r>
+              <a:rPr lang="en-US" sz="1400" dirty="0"/>
+              <a:t>Phenotype metrics determined: Sensitive (90, 120) and Tolerant (84, 89)</a:t>
+            </a:r>
+          </a:p>
+        </p:txBody>
+      </p:sp>
+    </p:spTree>
+    <p:extLst>
+      <p:ext uri="{BB962C8B-B14F-4D97-AF65-F5344CB8AC3E}">
+        <p14:creationId xmlns:p14="http://schemas.microsoft.com/office/powerpoint/2010/main" val="1511544374"/>
+      </p:ext>
+    </p:extLst>
+  </p:cSld>
+  <p:clrMapOvr>
+    <a:masterClrMapping/>
+  </p:clrMapOvr>
+</p:sld>
+</file>
+
+<file path=ppt/slides/slide4.xml><?xml version="1.0" encoding="utf-8"?>
+<p:sld xmlns:a="http://schemas.openxmlformats.org/drawingml/2006/main" xmlns:r="http://schemas.openxmlformats.org/officeDocument/2006/relationships" xmlns:p="http://schemas.openxmlformats.org/presentationml/2006/main">
+  <p:cSld>
+    <p:spTree>
+      <p:nvGrpSpPr>
+        <p:cNvPr id="1" name="">
+          <a:extLst>
+            <a:ext uri="{FF2B5EF4-FFF2-40B4-BE49-F238E27FC236}">
+              <a16:creationId xmlns:a16="http://schemas.microsoft.com/office/drawing/2014/main" id="{A3EB18FC-7D20-9E5A-1F0B-F7898799CB31}"/>
+            </a:ext>
+          </a:extLst>
+        </p:cNvPr>
+        <p:cNvGrpSpPr/>
+        <p:nvPr/>
+      </p:nvGrpSpPr>
+      <p:grpSpPr>
+        <a:xfrm>
+          <a:off x="0" y="0"/>
+          <a:ext cx="0" cy="0"/>
+          <a:chOff x="0" y="0"/>
+          <a:chExt cx="0" cy="0"/>
+        </a:xfrm>
+      </p:grpSpPr>
+      <p:sp>
+        <p:nvSpPr>
+          <p:cNvPr id="4" name="Title 1">
+            <a:extLst>
+              <a:ext uri="{FF2B5EF4-FFF2-40B4-BE49-F238E27FC236}">
+                <a16:creationId xmlns:a16="http://schemas.microsoft.com/office/drawing/2014/main" id="{F83315C6-042B-6C9B-DBE8-6FF86D094681}"/>
+              </a:ext>
+            </a:extLst>
+          </p:cNvPr>
+          <p:cNvSpPr>
+            <a:spLocks noGrp="1"/>
+          </p:cNvSpPr>
+          <p:nvPr>
+            <p:ph type="title"/>
+          </p:nvPr>
+        </p:nvSpPr>
+        <p:spPr>
+          <a:xfrm>
+            <a:off x="186267" y="187324"/>
+            <a:ext cx="10515600" cy="540809"/>
+          </a:xfrm>
+        </p:spPr>
+        <p:txBody>
+          <a:bodyPr>
+            <a:normAutofit/>
+          </a:bodyPr>
+          <a:lstStyle/>
+          <a:p>
+            <a:r>
+              <a:rPr lang="en-US" sz="3000" dirty="0"/>
+              <a:t>Disease dataset set #2: Johnson et al. 2020</a:t>
+            </a:r>
+          </a:p>
+        </p:txBody>
+      </p:sp>
+    </p:spTree>
+    <p:extLst>
+      <p:ext uri="{BB962C8B-B14F-4D97-AF65-F5344CB8AC3E}">
+        <p14:creationId xmlns:p14="http://schemas.microsoft.com/office/powerpoint/2010/main" val="764808860"/>
+      </p:ext>
+    </p:extLst>
+  </p:cSld>
+  <p:clrMapOvr>
+    <a:masterClrMapping/>
+  </p:clrMapOvr>
+</p:sld>
+</file>
+
+<file path=ppt/slides/slide5.xml><?xml version="1.0" encoding="utf-8"?>
+<p:sld xmlns:a="http://schemas.openxmlformats.org/drawingml/2006/main" xmlns:r="http://schemas.openxmlformats.org/officeDocument/2006/relationships" xmlns:p="http://schemas.openxmlformats.org/presentationml/2006/main">
+  <p:cSld>
+    <p:spTree>
+      <p:nvGrpSpPr>
+        <p:cNvPr id="1" name="">
+          <a:extLst>
+            <a:ext uri="{FF2B5EF4-FFF2-40B4-BE49-F238E27FC236}">
+              <a16:creationId xmlns:a16="http://schemas.microsoft.com/office/drawing/2014/main" id="{7EA42F06-169F-525A-440B-F5FC63F19743}"/>
+            </a:ext>
+          </a:extLst>
+        </p:cNvPr>
+        <p:cNvGrpSpPr/>
+        <p:nvPr/>
+      </p:nvGrpSpPr>
+      <p:grpSpPr>
+        <a:xfrm>
+          <a:off x="0" y="0"/>
+          <a:ext cx="0" cy="0"/>
+          <a:chOff x="0" y="0"/>
+          <a:chExt cx="0" cy="0"/>
+        </a:xfrm>
+      </p:grpSpPr>
+      <p:sp>
+        <p:nvSpPr>
+          <p:cNvPr id="4" name="Title 1">
+            <a:extLst>
+              <a:ext uri="{FF2B5EF4-FFF2-40B4-BE49-F238E27FC236}">
+                <a16:creationId xmlns:a16="http://schemas.microsoft.com/office/drawing/2014/main" id="{ED5EA365-3AA9-3C9C-02E1-DEDC99C7ACDD}"/>
+              </a:ext>
+            </a:extLst>
+          </p:cNvPr>
+          <p:cNvSpPr>
+            <a:spLocks noGrp="1"/>
+          </p:cNvSpPr>
+          <p:nvPr>
+            <p:ph type="title"/>
+          </p:nvPr>
+        </p:nvSpPr>
+        <p:spPr>
+          <a:xfrm>
+            <a:off x="186267" y="187324"/>
+            <a:ext cx="10515600" cy="540809"/>
+          </a:xfrm>
+        </p:spPr>
+        <p:txBody>
+          <a:bodyPr>
+            <a:normAutofit/>
+          </a:bodyPr>
+          <a:lstStyle/>
+          <a:p>
+            <a:r>
+              <a:rPr lang="en-US" sz="3000" dirty="0"/>
+              <a:t>Disease dataset set #3: Chan et al. 2021</a:t>
+            </a:r>
+          </a:p>
+        </p:txBody>
+      </p:sp>
+    </p:spTree>
+    <p:extLst>
+      <p:ext uri="{BB962C8B-B14F-4D97-AF65-F5344CB8AC3E}">
+        <p14:creationId xmlns:p14="http://schemas.microsoft.com/office/powerpoint/2010/main" val="3529596915"/>
+      </p:ext>
+    </p:extLst>
+  </p:cSld>
+  <p:clrMapOvr>
+    <a:masterClrMapping/>
+  </p:clrMapOvr>
+</p:sld>
+</file>
+
+<file path=ppt/slides/slide6.xml><?xml version="1.0" encoding="utf-8"?>
+<p:sld xmlns:a="http://schemas.openxmlformats.org/drawingml/2006/main" xmlns:r="http://schemas.openxmlformats.org/officeDocument/2006/relationships" xmlns:p="http://schemas.openxmlformats.org/presentationml/2006/main">
+  <p:cSld>
+    <p:spTree>
+      <p:nvGrpSpPr>
+        <p:cNvPr id="1" name="">
+          <a:extLst>
+            <a:ext uri="{FF2B5EF4-FFF2-40B4-BE49-F238E27FC236}">
+              <a16:creationId xmlns:a16="http://schemas.microsoft.com/office/drawing/2014/main" id="{860E88DB-90AD-2439-CB7B-6F55446C5F38}"/>
+            </a:ext>
+          </a:extLst>
+        </p:cNvPr>
+        <p:cNvGrpSpPr/>
+        <p:nvPr/>
+      </p:nvGrpSpPr>
+      <p:grpSpPr>
+        <a:xfrm>
+          <a:off x="0" y="0"/>
+          <a:ext cx="0" cy="0"/>
+          <a:chOff x="0" y="0"/>
+          <a:chExt cx="0" cy="0"/>
+        </a:xfrm>
+      </p:grpSpPr>
+      <p:sp>
+        <p:nvSpPr>
+          <p:cNvPr id="4" name="Title 1">
+            <a:extLst>
+              <a:ext uri="{FF2B5EF4-FFF2-40B4-BE49-F238E27FC236}">
+                <a16:creationId xmlns:a16="http://schemas.microsoft.com/office/drawing/2014/main" id="{89286DB7-F6FF-71EF-8598-333A66E44A2B}"/>
+              </a:ext>
+            </a:extLst>
+          </p:cNvPr>
+          <p:cNvSpPr>
+            <a:spLocks noGrp="1"/>
+          </p:cNvSpPr>
+          <p:nvPr>
+            <p:ph type="title"/>
+          </p:nvPr>
+        </p:nvSpPr>
+        <p:spPr>
+          <a:xfrm>
+            <a:off x="186267" y="187324"/>
+            <a:ext cx="10515600" cy="540809"/>
+          </a:xfrm>
+        </p:spPr>
+        <p:txBody>
+          <a:bodyPr>
+            <a:normAutofit/>
+          </a:bodyPr>
+          <a:lstStyle/>
+          <a:p>
+            <a:r>
+              <a:rPr lang="en-US" sz="3000" dirty="0"/>
+              <a:t>Disease dataset set #4: Sullivan and </a:t>
+            </a:r>
+            <a:r>
+              <a:rPr lang="en-US" sz="3000" dirty="0" err="1"/>
+              <a:t>Proestou</a:t>
+            </a:r>
+            <a:r>
+              <a:rPr lang="en-US" sz="3000" dirty="0"/>
+              <a:t> 2021</a:t>
+            </a:r>
+          </a:p>
+        </p:txBody>
+      </p:sp>
+    </p:spTree>
+    <p:extLst>
+      <p:ext uri="{BB962C8B-B14F-4D97-AF65-F5344CB8AC3E}">
+        <p14:creationId xmlns:p14="http://schemas.microsoft.com/office/powerpoint/2010/main" val="1835731223"/>
       </p:ext>
     </p:extLst>
   </p:cSld>

</xml_diff>

<commit_message>
adding study 2 and 3 to the ppt
</commit_message>
<xml_diff>
--- a/analysis_ideas.pptx
+++ b/analysis_ideas.pptx
@@ -606,7 +606,7 @@
           <a:p>
             <a:fld id="{B39DB6D8-D897-47EB-B13C-F7D5E8B7745B}" type="datetimeFigureOut">
               <a:rPr lang="en-US" smtClean="0"/>
-              <a:t>1/7/2025</a:t>
+              <a:t>1/16/2025</a:t>
             </a:fld>
             <a:endParaRPr lang="en-US"/>
           </a:p>
@@ -804,7 +804,7 @@
           <a:p>
             <a:fld id="{B39DB6D8-D897-47EB-B13C-F7D5E8B7745B}" type="datetimeFigureOut">
               <a:rPr lang="en-US" smtClean="0"/>
-              <a:t>1/7/2025</a:t>
+              <a:t>1/16/2025</a:t>
             </a:fld>
             <a:endParaRPr lang="en-US"/>
           </a:p>
@@ -1012,7 +1012,7 @@
           <a:p>
             <a:fld id="{B39DB6D8-D897-47EB-B13C-F7D5E8B7745B}" type="datetimeFigureOut">
               <a:rPr lang="en-US" smtClean="0"/>
-              <a:t>1/7/2025</a:t>
+              <a:t>1/16/2025</a:t>
             </a:fld>
             <a:endParaRPr lang="en-US"/>
           </a:p>
@@ -1210,7 +1210,7 @@
           <a:p>
             <a:fld id="{B39DB6D8-D897-47EB-B13C-F7D5E8B7745B}" type="datetimeFigureOut">
               <a:rPr lang="en-US" smtClean="0"/>
-              <a:t>1/7/2025</a:t>
+              <a:t>1/16/2025</a:t>
             </a:fld>
             <a:endParaRPr lang="en-US"/>
           </a:p>
@@ -1485,7 +1485,7 @@
           <a:p>
             <a:fld id="{B39DB6D8-D897-47EB-B13C-F7D5E8B7745B}" type="datetimeFigureOut">
               <a:rPr lang="en-US" smtClean="0"/>
-              <a:t>1/7/2025</a:t>
+              <a:t>1/16/2025</a:t>
             </a:fld>
             <a:endParaRPr lang="en-US"/>
           </a:p>
@@ -1750,7 +1750,7 @@
           <a:p>
             <a:fld id="{B39DB6D8-D897-47EB-B13C-F7D5E8B7745B}" type="datetimeFigureOut">
               <a:rPr lang="en-US" smtClean="0"/>
-              <a:t>1/7/2025</a:t>
+              <a:t>1/16/2025</a:t>
             </a:fld>
             <a:endParaRPr lang="en-US"/>
           </a:p>
@@ -2162,7 +2162,7 @@
           <a:p>
             <a:fld id="{B39DB6D8-D897-47EB-B13C-F7D5E8B7745B}" type="datetimeFigureOut">
               <a:rPr lang="en-US" smtClean="0"/>
-              <a:t>1/7/2025</a:t>
+              <a:t>1/16/2025</a:t>
             </a:fld>
             <a:endParaRPr lang="en-US"/>
           </a:p>
@@ -2303,7 +2303,7 @@
           <a:p>
             <a:fld id="{B39DB6D8-D897-47EB-B13C-F7D5E8B7745B}" type="datetimeFigureOut">
               <a:rPr lang="en-US" smtClean="0"/>
-              <a:t>1/7/2025</a:t>
+              <a:t>1/16/2025</a:t>
             </a:fld>
             <a:endParaRPr lang="en-US"/>
           </a:p>
@@ -2416,7 +2416,7 @@
           <a:p>
             <a:fld id="{B39DB6D8-D897-47EB-B13C-F7D5E8B7745B}" type="datetimeFigureOut">
               <a:rPr lang="en-US" smtClean="0"/>
-              <a:t>1/7/2025</a:t>
+              <a:t>1/16/2025</a:t>
             </a:fld>
             <a:endParaRPr lang="en-US"/>
           </a:p>
@@ -2727,7 +2727,7 @@
           <a:p>
             <a:fld id="{B39DB6D8-D897-47EB-B13C-F7D5E8B7745B}" type="datetimeFigureOut">
               <a:rPr lang="en-US" smtClean="0"/>
-              <a:t>1/7/2025</a:t>
+              <a:t>1/16/2025</a:t>
             </a:fld>
             <a:endParaRPr lang="en-US"/>
           </a:p>
@@ -3015,7 +3015,7 @@
           <a:p>
             <a:fld id="{B39DB6D8-D897-47EB-B13C-F7D5E8B7745B}" type="datetimeFigureOut">
               <a:rPr lang="en-US" smtClean="0"/>
-              <a:t>1/7/2025</a:t>
+              <a:t>1/16/2025</a:t>
             </a:fld>
             <a:endParaRPr lang="en-US"/>
           </a:p>
@@ -3256,7 +3256,7 @@
           <a:p>
             <a:fld id="{B39DB6D8-D897-47EB-B13C-F7D5E8B7745B}" type="datetimeFigureOut">
               <a:rPr lang="en-US" smtClean="0"/>
-              <a:t>1/7/2025</a:t>
+              <a:t>1/16/2025</a:t>
             </a:fld>
             <a:endParaRPr lang="en-US"/>
           </a:p>
@@ -5458,7 +5458,7 @@
         <p:spPr>
           <a:xfrm>
             <a:off x="186267" y="788456"/>
-            <a:ext cx="10515600" cy="1694633"/>
+            <a:ext cx="10515600" cy="1851260"/>
           </a:xfrm>
           <a:prstGeom prst="rect">
             <a:avLst/>
@@ -5535,7 +5535,13 @@
           <a:p>
             <a:r>
               <a:rPr lang="en-US" sz="1800" dirty="0"/>
-              <a:t>In this study we measured dermo tolerance and evaluated global expression patterns of two sensitive and two tolerant eastern oyster families experimentally challenged with distinct doses of </a:t>
+              <a:t>Oyster origin: Aquaculture Genetics and Breeding Technology Center (ABC) eastern oyster breeding program at the Virginia Institute of Marine Science (VIMS)</a:t>
+            </a:r>
+          </a:p>
+          <a:p>
+            <a:r>
+              <a:rPr lang="en-US" sz="1800" dirty="0"/>
+              <a:t>Two sensitive and two tolerant eastern oyster families experimentally challenged with distinct doses of </a:t>
             </a:r>
             <a:r>
               <a:rPr lang="en-US" sz="1800" i="1" dirty="0"/>
@@ -5543,7 +5549,31 @@
             </a:r>
             <a:r>
               <a:rPr lang="en-US" sz="1800" dirty="0"/>
-              <a:t>(0, 10^6, 10^7, and 10^8 parasite spores per gram wet weight, n = 3–5 individuals per family per dose)</a:t>
+              <a:t>(0, 10</a:t>
+            </a:r>
+            <a:r>
+              <a:rPr lang="en-US" sz="1800" baseline="30000" dirty="0"/>
+              <a:t>6</a:t>
+            </a:r>
+            <a:r>
+              <a:rPr lang="en-US" sz="1800" dirty="0"/>
+              <a:t>, 10</a:t>
+            </a:r>
+            <a:r>
+              <a:rPr lang="en-US" sz="1800" baseline="30000" dirty="0"/>
+              <a:t>7</a:t>
+            </a:r>
+            <a:r>
+              <a:rPr lang="en-US" sz="1800" dirty="0"/>
+              <a:t>, and 10</a:t>
+            </a:r>
+            <a:r>
+              <a:rPr lang="en-US" sz="1800" baseline="30000" dirty="0"/>
+              <a:t>8</a:t>
+            </a:r>
+            <a:r>
+              <a:rPr lang="en-US" sz="1800" dirty="0"/>
+              <a:t> parasite spores per gram wet weight, n = 3–5 individuals per family per dose)</a:t>
             </a:r>
           </a:p>
         </p:txBody>
@@ -5687,7 +5717,7 @@
             </a:r>
             <a:r>
               <a:rPr lang="en-US" baseline="30000" dirty="0"/>
-              <a:t>^6</a:t>
+              <a:t>6</a:t>
             </a:r>
             <a:r>
               <a:rPr lang="en-US" dirty="0"/>
@@ -5746,7 +5776,7 @@
             </a:r>
             <a:r>
               <a:rPr lang="en-US" baseline="30000" dirty="0"/>
-              <a:t>^7</a:t>
+              <a:t>7</a:t>
             </a:r>
             <a:r>
               <a:rPr lang="en-US" dirty="0"/>
@@ -5805,7 +5835,7 @@
             </a:r>
             <a:r>
               <a:rPr lang="en-US" baseline="30000" dirty="0"/>
-              <a:t>^8</a:t>
+              <a:t>8</a:t>
             </a:r>
             <a:r>
               <a:rPr lang="en-US" dirty="0"/>
@@ -6758,8 +6788,8 @@
         </p:nvCxnSpPr>
         <p:spPr>
           <a:xfrm flipH="1" flipV="1">
-            <a:off x="8727649" y="3166533"/>
-            <a:ext cx="9950" cy="537384"/>
+            <a:off x="8732155" y="3409871"/>
+            <a:ext cx="5444" cy="294046"/>
           </a:xfrm>
           <a:prstGeom prst="straightConnector1">
             <a:avLst/>
@@ -6803,8 +6833,8 @@
         </p:nvSpPr>
         <p:spPr>
           <a:xfrm>
-            <a:off x="8077831" y="2557666"/>
-            <a:ext cx="3292902" cy="523220"/>
+            <a:off x="8784238" y="2942162"/>
+            <a:ext cx="2400789" cy="738664"/>
           </a:xfrm>
           <a:prstGeom prst="rect">
             <a:avLst/>
@@ -6899,6 +6929,725 @@
           </a:p>
         </p:txBody>
       </p:sp>
+      <p:sp>
+        <p:nvSpPr>
+          <p:cNvPr id="2" name="Title 1">
+            <a:extLst>
+              <a:ext uri="{FF2B5EF4-FFF2-40B4-BE49-F238E27FC236}">
+                <a16:creationId xmlns:a16="http://schemas.microsoft.com/office/drawing/2014/main" id="{E83F03F4-5EB1-4520-B6DC-3D6BE48CBFA2}"/>
+              </a:ext>
+            </a:extLst>
+          </p:cNvPr>
+          <p:cNvSpPr txBox="1">
+            <a:spLocks/>
+          </p:cNvSpPr>
+          <p:nvPr/>
+        </p:nvSpPr>
+        <p:spPr>
+          <a:xfrm>
+            <a:off x="186267" y="788457"/>
+            <a:ext cx="10515600" cy="2005544"/>
+          </a:xfrm>
+          <a:prstGeom prst="rect">
+            <a:avLst/>
+          </a:prstGeom>
+        </p:spPr>
+        <p:txBody>
+          <a:bodyPr vert="horz" lIns="91440" tIns="45720" rIns="91440" bIns="45720" rtlCol="0" anchor="ctr">
+            <a:normAutofit/>
+          </a:bodyPr>
+          <a:lstStyle>
+            <a:lvl1pPr algn="l" defTabSz="914400" rtl="0" eaLnBrk="1" latinLnBrk="0" hangingPunct="1">
+              <a:lnSpc>
+                <a:spcPct val="90000"/>
+              </a:lnSpc>
+              <a:spcBef>
+                <a:spcPct val="0"/>
+              </a:spcBef>
+              <a:buNone/>
+              <a:defRPr sz="4400" kern="1200">
+                <a:solidFill>
+                  <a:schemeClr val="tx1"/>
+                </a:solidFill>
+                <a:latin typeface="+mj-lt"/>
+                <a:ea typeface="+mj-ea"/>
+                <a:cs typeface="+mj-cs"/>
+              </a:defRPr>
+            </a:lvl1pPr>
+          </a:lstStyle>
+          <a:p>
+            <a:r>
+              <a:rPr lang="en-US" sz="1800" dirty="0"/>
+              <a:t>Characterizing the Epigenetic and Transcriptomic Responses to </a:t>
+            </a:r>
+            <a:r>
+              <a:rPr lang="en-US" sz="1800" i="1" dirty="0" err="1"/>
+              <a:t>Perkinsus</a:t>
+            </a:r>
+            <a:r>
+              <a:rPr lang="en-US" sz="1800" i="1" dirty="0"/>
+              <a:t> marinus </a:t>
+            </a:r>
+            <a:r>
+              <a:rPr lang="en-US" sz="1800" dirty="0"/>
+              <a:t>Infection in the Eastern Oyster </a:t>
+            </a:r>
+            <a:r>
+              <a:rPr lang="en-US" sz="1800" i="1" dirty="0"/>
+              <a:t>Crassostrea virginica</a:t>
+            </a:r>
+          </a:p>
+          <a:p>
+            <a:r>
+              <a:rPr lang="en-US" sz="1800" dirty="0"/>
+              <a:t>link:  </a:t>
+            </a:r>
+            <a:r>
+              <a:rPr lang="en-US" sz="1800" dirty="0">
+                <a:hlinkClick r:id="rId2"/>
+              </a:rPr>
+              <a:t>https://www.frontiersin.org/journals/marine-science/articles/10.3389/fmars.2020.00598/full</a:t>
+            </a:r>
+            <a:r>
+              <a:rPr lang="en-US" sz="1800" dirty="0"/>
+              <a:t> </a:t>
+            </a:r>
+          </a:p>
+          <a:p>
+            <a:endParaRPr lang="en-US" sz="1800" dirty="0"/>
+          </a:p>
+          <a:p>
+            <a:r>
+              <a:rPr lang="en-US" sz="1800" dirty="0"/>
+              <a:t>Oyster origin: Vermilion Bay, Louisiana &amp; Calcasieu Lake, Louisiana. 5 months acclimation at hatchery then spawned. Spat reared in upwelling system and </a:t>
+            </a:r>
+            <a:r>
+              <a:rPr lang="en-US" sz="1800" dirty="0" err="1"/>
+              <a:t>outplanted</a:t>
+            </a:r>
+            <a:r>
+              <a:rPr lang="en-US" sz="1800" dirty="0"/>
+              <a:t> to mesh bags. Monitored for mortality and cleaned every 3 months for 14-month period</a:t>
+            </a:r>
+          </a:p>
+        </p:txBody>
+      </p:sp>
+      <p:pic>
+        <p:nvPicPr>
+          <p:cNvPr id="3" name="Picture 2" descr="Oyster Graphic">
+            <a:extLst>
+              <a:ext uri="{FF2B5EF4-FFF2-40B4-BE49-F238E27FC236}">
+                <a16:creationId xmlns:a16="http://schemas.microsoft.com/office/drawing/2014/main" id="{D4C1FCF1-F5BA-498D-A68A-C375C793E2CF}"/>
+              </a:ext>
+            </a:extLst>
+          </p:cNvPr>
+          <p:cNvPicPr>
+            <a:picLocks noChangeAspect="1" noChangeArrowheads="1"/>
+          </p:cNvPicPr>
+          <p:nvPr/>
+        </p:nvPicPr>
+        <p:blipFill>
+          <a:blip r:embed="rId3">
+            <a:extLst>
+              <a:ext uri="{28A0092B-C50C-407E-A947-70E740481C1C}">
+                <a14:useLocalDpi xmlns:a14="http://schemas.microsoft.com/office/drawing/2010/main" val="0"/>
+              </a:ext>
+            </a:extLst>
+          </a:blip>
+          <a:srcRect/>
+          <a:stretch>
+            <a:fillRect/>
+          </a:stretch>
+        </p:blipFill>
+        <p:spPr bwMode="auto">
+          <a:xfrm>
+            <a:off x="2129874" y="3509940"/>
+            <a:ext cx="791126" cy="791126"/>
+          </a:xfrm>
+          <a:prstGeom prst="rect">
+            <a:avLst/>
+          </a:prstGeom>
+          <a:noFill/>
+          <a:extLst>
+            <a:ext uri="{909E8E84-426E-40DD-AFC4-6F175D3DCCD1}">
+              <a14:hiddenFill xmlns:a14="http://schemas.microsoft.com/office/drawing/2010/main">
+                <a:solidFill>
+                  <a:srgbClr val="FFFFFF"/>
+                </a:solidFill>
+              </a14:hiddenFill>
+            </a:ext>
+          </a:extLst>
+        </p:spPr>
+      </p:pic>
+      <p:sp>
+        <p:nvSpPr>
+          <p:cNvPr id="5" name="TextBox 4">
+            <a:extLst>
+              <a:ext uri="{FF2B5EF4-FFF2-40B4-BE49-F238E27FC236}">
+                <a16:creationId xmlns:a16="http://schemas.microsoft.com/office/drawing/2014/main" id="{4EC5E1B2-A0A2-A0BC-175E-182BE493FA50}"/>
+              </a:ext>
+            </a:extLst>
+          </p:cNvPr>
+          <p:cNvSpPr txBox="1"/>
+          <p:nvPr/>
+        </p:nvSpPr>
+        <p:spPr>
+          <a:xfrm>
+            <a:off x="1490513" y="4418802"/>
+            <a:ext cx="2069848" cy="738664"/>
+          </a:xfrm>
+          <a:prstGeom prst="rect">
+            <a:avLst/>
+          </a:prstGeom>
+          <a:noFill/>
+          <a:ln w="28575">
+            <a:noFill/>
+          </a:ln>
+        </p:spPr>
+        <p:txBody>
+          <a:bodyPr wrap="square" rtlCol="0">
+            <a:spAutoFit/>
+          </a:bodyPr>
+          <a:lstStyle/>
+          <a:p>
+            <a:pPr algn="ctr"/>
+            <a:r>
+              <a:rPr lang="en-US" sz="1400" dirty="0"/>
+              <a:t>Phys: shell height, wet weight, </a:t>
+            </a:r>
+            <a:r>
+              <a:rPr lang="en-US" sz="1400" i="1" dirty="0"/>
+              <a:t>P. marinus</a:t>
+            </a:r>
+            <a:r>
+              <a:rPr lang="en-US" sz="1400" dirty="0"/>
+              <a:t> </a:t>
+            </a:r>
+            <a:r>
+              <a:rPr lang="en-US" sz="1400" dirty="0" err="1"/>
+              <a:t>hyponospores</a:t>
+            </a:r>
+            <a:r>
+              <a:rPr lang="en-US" sz="1400" dirty="0"/>
+              <a:t> g</a:t>
+            </a:r>
+            <a:r>
+              <a:rPr lang="en-US" sz="1400" baseline="30000" dirty="0"/>
+              <a:t>-1</a:t>
+            </a:r>
+          </a:p>
+        </p:txBody>
+      </p:sp>
+      <p:cxnSp>
+        <p:nvCxnSpPr>
+          <p:cNvPr id="8" name="Straight Arrow Connector 7">
+            <a:extLst>
+              <a:ext uri="{FF2B5EF4-FFF2-40B4-BE49-F238E27FC236}">
+                <a16:creationId xmlns:a16="http://schemas.microsoft.com/office/drawing/2014/main" id="{04FB4D2D-4373-2823-1C84-EDF8B4D4964F}"/>
+              </a:ext>
+            </a:extLst>
+          </p:cNvPr>
+          <p:cNvCxnSpPr/>
+          <p:nvPr/>
+        </p:nvCxnSpPr>
+        <p:spPr>
+          <a:xfrm>
+            <a:off x="347133" y="4121664"/>
+            <a:ext cx="1621620" cy="0"/>
+          </a:xfrm>
+          <a:prstGeom prst="straightConnector1">
+            <a:avLst/>
+          </a:prstGeom>
+          <a:ln>
+            <a:tailEnd type="triangle"/>
+          </a:ln>
+        </p:spPr>
+        <p:style>
+          <a:lnRef idx="2">
+            <a:schemeClr val="dk1"/>
+          </a:lnRef>
+          <a:fillRef idx="0">
+            <a:schemeClr val="dk1"/>
+          </a:fillRef>
+          <a:effectRef idx="1">
+            <a:schemeClr val="dk1"/>
+          </a:effectRef>
+          <a:fontRef idx="minor">
+            <a:schemeClr val="tx1"/>
+          </a:fontRef>
+        </p:style>
+      </p:cxnSp>
+      <p:sp>
+        <p:nvSpPr>
+          <p:cNvPr id="9" name="TextBox 8">
+            <a:extLst>
+              <a:ext uri="{FF2B5EF4-FFF2-40B4-BE49-F238E27FC236}">
+                <a16:creationId xmlns:a16="http://schemas.microsoft.com/office/drawing/2014/main" id="{811ADC54-2BAB-46C7-ACFE-68ABD364183E}"/>
+              </a:ext>
+            </a:extLst>
+          </p:cNvPr>
+          <p:cNvSpPr txBox="1"/>
+          <p:nvPr/>
+        </p:nvSpPr>
+        <p:spPr>
+          <a:xfrm>
+            <a:off x="415182" y="3478247"/>
+            <a:ext cx="1193486" cy="523220"/>
+          </a:xfrm>
+          <a:prstGeom prst="rect">
+            <a:avLst/>
+          </a:prstGeom>
+          <a:noFill/>
+          <a:ln w="28575">
+            <a:noFill/>
+          </a:ln>
+        </p:spPr>
+        <p:txBody>
+          <a:bodyPr wrap="square" rtlCol="0">
+            <a:spAutoFit/>
+          </a:bodyPr>
+          <a:lstStyle/>
+          <a:p>
+            <a:pPr algn="ctr"/>
+            <a:r>
+              <a:rPr lang="en-US" sz="1400" dirty="0"/>
+              <a:t>14 months out planted</a:t>
+            </a:r>
+          </a:p>
+        </p:txBody>
+      </p:sp>
+      <p:cxnSp>
+        <p:nvCxnSpPr>
+          <p:cNvPr id="10" name="Connector: Elbow 9">
+            <a:extLst>
+              <a:ext uri="{FF2B5EF4-FFF2-40B4-BE49-F238E27FC236}">
+                <a16:creationId xmlns:a16="http://schemas.microsoft.com/office/drawing/2014/main" id="{7E1D230C-7BA6-6CD0-EA0D-21D78E6D9FD7}"/>
+              </a:ext>
+            </a:extLst>
+          </p:cNvPr>
+          <p:cNvCxnSpPr>
+            <a:cxnSpLocks/>
+          </p:cNvCxnSpPr>
+          <p:nvPr/>
+        </p:nvCxnSpPr>
+        <p:spPr>
+          <a:xfrm flipV="1">
+            <a:off x="3725524" y="3402455"/>
+            <a:ext cx="1007342" cy="522324"/>
+          </a:xfrm>
+          <a:prstGeom prst="bentConnector3">
+            <a:avLst>
+              <a:gd name="adj1" fmla="val 50000"/>
+            </a:avLst>
+          </a:prstGeom>
+          <a:ln>
+            <a:tailEnd type="triangle"/>
+          </a:ln>
+        </p:spPr>
+        <p:style>
+          <a:lnRef idx="1">
+            <a:schemeClr val="dk1"/>
+          </a:lnRef>
+          <a:fillRef idx="0">
+            <a:schemeClr val="dk1"/>
+          </a:fillRef>
+          <a:effectRef idx="0">
+            <a:schemeClr val="dk1"/>
+          </a:effectRef>
+          <a:fontRef idx="minor">
+            <a:schemeClr val="tx1"/>
+          </a:fontRef>
+        </p:style>
+      </p:cxnSp>
+      <p:cxnSp>
+        <p:nvCxnSpPr>
+          <p:cNvPr id="12" name="Connector: Elbow 11">
+            <a:extLst>
+              <a:ext uri="{FF2B5EF4-FFF2-40B4-BE49-F238E27FC236}">
+                <a16:creationId xmlns:a16="http://schemas.microsoft.com/office/drawing/2014/main" id="{CC0C7ADD-F7F6-2BE2-C521-E052CDE8E268}"/>
+              </a:ext>
+            </a:extLst>
+          </p:cNvPr>
+          <p:cNvCxnSpPr>
+            <a:cxnSpLocks/>
+          </p:cNvCxnSpPr>
+          <p:nvPr/>
+        </p:nvCxnSpPr>
+        <p:spPr>
+          <a:xfrm>
+            <a:off x="3725524" y="3924779"/>
+            <a:ext cx="1007342" cy="477844"/>
+          </a:xfrm>
+          <a:prstGeom prst="bentConnector3">
+            <a:avLst>
+              <a:gd name="adj1" fmla="val 50000"/>
+            </a:avLst>
+          </a:prstGeom>
+          <a:ln>
+            <a:tailEnd type="triangle"/>
+          </a:ln>
+        </p:spPr>
+        <p:style>
+          <a:lnRef idx="1">
+            <a:schemeClr val="dk1"/>
+          </a:lnRef>
+          <a:fillRef idx="0">
+            <a:schemeClr val="dk1"/>
+          </a:fillRef>
+          <a:effectRef idx="0">
+            <a:schemeClr val="dk1"/>
+          </a:effectRef>
+          <a:fontRef idx="minor">
+            <a:schemeClr val="tx1"/>
+          </a:fontRef>
+        </p:style>
+      </p:cxnSp>
+      <p:cxnSp>
+        <p:nvCxnSpPr>
+          <p:cNvPr id="15" name="Straight Arrow Connector 14">
+            <a:extLst>
+              <a:ext uri="{FF2B5EF4-FFF2-40B4-BE49-F238E27FC236}">
+                <a16:creationId xmlns:a16="http://schemas.microsoft.com/office/drawing/2014/main" id="{C2A6CE62-735E-C036-DBDB-AA448D4E7D20}"/>
+              </a:ext>
+            </a:extLst>
+          </p:cNvPr>
+          <p:cNvCxnSpPr>
+            <a:cxnSpLocks/>
+          </p:cNvCxnSpPr>
+          <p:nvPr/>
+        </p:nvCxnSpPr>
+        <p:spPr>
+          <a:xfrm>
+            <a:off x="3725524" y="3924779"/>
+            <a:ext cx="1007342" cy="0"/>
+          </a:xfrm>
+          <a:prstGeom prst="straightConnector1">
+            <a:avLst/>
+          </a:prstGeom>
+          <a:ln>
+            <a:tailEnd type="triangle"/>
+          </a:ln>
+        </p:spPr>
+        <p:style>
+          <a:lnRef idx="1">
+            <a:schemeClr val="dk1"/>
+          </a:lnRef>
+          <a:fillRef idx="0">
+            <a:schemeClr val="dk1"/>
+          </a:fillRef>
+          <a:effectRef idx="0">
+            <a:schemeClr val="dk1"/>
+          </a:effectRef>
+          <a:fontRef idx="minor">
+            <a:schemeClr val="tx1"/>
+          </a:fontRef>
+        </p:style>
+      </p:cxnSp>
+      <p:sp>
+        <p:nvSpPr>
+          <p:cNvPr id="17" name="TextBox 16">
+            <a:extLst>
+              <a:ext uri="{FF2B5EF4-FFF2-40B4-BE49-F238E27FC236}">
+                <a16:creationId xmlns:a16="http://schemas.microsoft.com/office/drawing/2014/main" id="{DCACB167-8BF9-B504-8A41-D0EBF60DEC9C}"/>
+              </a:ext>
+            </a:extLst>
+          </p:cNvPr>
+          <p:cNvSpPr txBox="1"/>
+          <p:nvPr/>
+        </p:nvSpPr>
+        <p:spPr>
+          <a:xfrm>
+            <a:off x="4868330" y="3246495"/>
+            <a:ext cx="3886203" cy="307777"/>
+          </a:xfrm>
+          <a:prstGeom prst="rect">
+            <a:avLst/>
+          </a:prstGeom>
+          <a:noFill/>
+          <a:ln w="28575">
+            <a:noFill/>
+          </a:ln>
+        </p:spPr>
+        <p:txBody>
+          <a:bodyPr wrap="square" rtlCol="0">
+            <a:spAutoFit/>
+          </a:bodyPr>
+          <a:lstStyle/>
+          <a:p>
+            <a:r>
+              <a:rPr lang="en-US" sz="1400" dirty="0"/>
+              <a:t>Very-light  (&lt;/=1,000 parasites g</a:t>
+            </a:r>
+            <a:r>
+              <a:rPr lang="en-US" sz="1400" baseline="30000" dirty="0"/>
+              <a:t>-1</a:t>
+            </a:r>
+            <a:r>
+              <a:rPr lang="en-US" sz="1400" dirty="0"/>
+              <a:t>) n=16</a:t>
+            </a:r>
+          </a:p>
+        </p:txBody>
+      </p:sp>
+      <p:sp>
+        <p:nvSpPr>
+          <p:cNvPr id="18" name="TextBox 17">
+            <a:extLst>
+              <a:ext uri="{FF2B5EF4-FFF2-40B4-BE49-F238E27FC236}">
+                <a16:creationId xmlns:a16="http://schemas.microsoft.com/office/drawing/2014/main" id="{4786E780-83AD-1F24-B030-C06FC47428C8}"/>
+              </a:ext>
+            </a:extLst>
+          </p:cNvPr>
+          <p:cNvSpPr txBox="1"/>
+          <p:nvPr/>
+        </p:nvSpPr>
+        <p:spPr>
+          <a:xfrm>
+            <a:off x="4868330" y="3739857"/>
+            <a:ext cx="3733803" cy="307777"/>
+          </a:xfrm>
+          <a:prstGeom prst="rect">
+            <a:avLst/>
+          </a:prstGeom>
+          <a:noFill/>
+          <a:ln w="28575">
+            <a:noFill/>
+          </a:ln>
+        </p:spPr>
+        <p:txBody>
+          <a:bodyPr wrap="square" rtlCol="0">
+            <a:spAutoFit/>
+          </a:bodyPr>
+          <a:lstStyle/>
+          <a:p>
+            <a:r>
+              <a:rPr lang="en-US" sz="1400" dirty="0"/>
+              <a:t>Light  (1,001 – 10,000 parasites g</a:t>
+            </a:r>
+            <a:r>
+              <a:rPr lang="en-US" sz="1400" baseline="30000" dirty="0"/>
+              <a:t>-1</a:t>
+            </a:r>
+            <a:r>
+              <a:rPr lang="en-US" sz="1400" dirty="0"/>
+              <a:t>) n=8</a:t>
+            </a:r>
+          </a:p>
+        </p:txBody>
+      </p:sp>
+      <p:sp>
+        <p:nvSpPr>
+          <p:cNvPr id="19" name="TextBox 18">
+            <a:extLst>
+              <a:ext uri="{FF2B5EF4-FFF2-40B4-BE49-F238E27FC236}">
+                <a16:creationId xmlns:a16="http://schemas.microsoft.com/office/drawing/2014/main" id="{1FA3A8F6-0EC9-F4B1-484B-618DEBCF523E}"/>
+              </a:ext>
+            </a:extLst>
+          </p:cNvPr>
+          <p:cNvSpPr txBox="1"/>
+          <p:nvPr/>
+        </p:nvSpPr>
+        <p:spPr>
+          <a:xfrm>
+            <a:off x="4868330" y="4233219"/>
+            <a:ext cx="4402670" cy="307777"/>
+          </a:xfrm>
+          <a:prstGeom prst="rect">
+            <a:avLst/>
+          </a:prstGeom>
+          <a:noFill/>
+          <a:ln w="28575">
+            <a:noFill/>
+          </a:ln>
+        </p:spPr>
+        <p:txBody>
+          <a:bodyPr wrap="square" rtlCol="0">
+            <a:spAutoFit/>
+          </a:bodyPr>
+          <a:lstStyle/>
+          <a:p>
+            <a:r>
+              <a:rPr lang="en-US" sz="1400" dirty="0"/>
+              <a:t>Moderate  (10</a:t>
+            </a:r>
+            <a:r>
+              <a:rPr lang="en-US" sz="1400" baseline="30000" dirty="0"/>
+              <a:t>4</a:t>
+            </a:r>
+            <a:r>
+              <a:rPr lang="en-US" sz="1400" dirty="0"/>
+              <a:t> – 10</a:t>
+            </a:r>
+            <a:r>
+              <a:rPr lang="en-US" sz="1400" baseline="30000" dirty="0"/>
+              <a:t>5</a:t>
+            </a:r>
+            <a:r>
+              <a:rPr lang="en-US" sz="1400" dirty="0"/>
+              <a:t> parasites g</a:t>
+            </a:r>
+            <a:r>
+              <a:rPr lang="en-US" sz="1400" baseline="30000" dirty="0"/>
+              <a:t>-1</a:t>
+            </a:r>
+            <a:r>
+              <a:rPr lang="en-US" sz="1400" dirty="0"/>
+              <a:t>) n=8</a:t>
+            </a:r>
+          </a:p>
+        </p:txBody>
+      </p:sp>
+      <p:cxnSp>
+        <p:nvCxnSpPr>
+          <p:cNvPr id="21" name="Connector: Elbow 20">
+            <a:extLst>
+              <a:ext uri="{FF2B5EF4-FFF2-40B4-BE49-F238E27FC236}">
+                <a16:creationId xmlns:a16="http://schemas.microsoft.com/office/drawing/2014/main" id="{E0CA29E2-B8C7-1B84-F6A7-7650C53B0DB9}"/>
+              </a:ext>
+            </a:extLst>
+          </p:cNvPr>
+          <p:cNvCxnSpPr>
+            <a:cxnSpLocks/>
+          </p:cNvCxnSpPr>
+          <p:nvPr/>
+        </p:nvCxnSpPr>
+        <p:spPr>
+          <a:xfrm>
+            <a:off x="3721482" y="3924778"/>
+            <a:ext cx="1011384" cy="955691"/>
+          </a:xfrm>
+          <a:prstGeom prst="bentConnector3">
+            <a:avLst>
+              <a:gd name="adj1" fmla="val 50000"/>
+            </a:avLst>
+          </a:prstGeom>
+          <a:ln>
+            <a:tailEnd type="triangle"/>
+          </a:ln>
+        </p:spPr>
+        <p:style>
+          <a:lnRef idx="1">
+            <a:schemeClr val="dk1"/>
+          </a:lnRef>
+          <a:fillRef idx="0">
+            <a:schemeClr val="dk1"/>
+          </a:fillRef>
+          <a:effectRef idx="0">
+            <a:schemeClr val="dk1"/>
+          </a:effectRef>
+          <a:fontRef idx="minor">
+            <a:schemeClr val="tx1"/>
+          </a:fontRef>
+        </p:style>
+      </p:cxnSp>
+      <p:sp>
+        <p:nvSpPr>
+          <p:cNvPr id="27" name="TextBox 26">
+            <a:extLst>
+              <a:ext uri="{FF2B5EF4-FFF2-40B4-BE49-F238E27FC236}">
+                <a16:creationId xmlns:a16="http://schemas.microsoft.com/office/drawing/2014/main" id="{3A4AA6C1-2D0C-0D73-79B0-D774FDFE52E8}"/>
+              </a:ext>
+            </a:extLst>
+          </p:cNvPr>
+          <p:cNvSpPr txBox="1"/>
+          <p:nvPr/>
+        </p:nvSpPr>
+        <p:spPr>
+          <a:xfrm>
+            <a:off x="4868329" y="4726580"/>
+            <a:ext cx="3987803" cy="307777"/>
+          </a:xfrm>
+          <a:prstGeom prst="rect">
+            <a:avLst/>
+          </a:prstGeom>
+          <a:noFill/>
+          <a:ln w="28575">
+            <a:noFill/>
+          </a:ln>
+        </p:spPr>
+        <p:txBody>
+          <a:bodyPr wrap="square" rtlCol="0">
+            <a:spAutoFit/>
+          </a:bodyPr>
+          <a:lstStyle/>
+          <a:p>
+            <a:r>
+              <a:rPr lang="en-US" sz="1400" dirty="0"/>
+              <a:t>Moderate-heavy  (&gt;10</a:t>
+            </a:r>
+            <a:r>
+              <a:rPr lang="en-US" sz="1400" baseline="30000" dirty="0"/>
+              <a:t>5</a:t>
+            </a:r>
+            <a:r>
+              <a:rPr lang="en-US" sz="1400" dirty="0"/>
+              <a:t> parasites g</a:t>
+            </a:r>
+            <a:r>
+              <a:rPr lang="en-US" sz="1400" baseline="30000" dirty="0"/>
+              <a:t>-1</a:t>
+            </a:r>
+            <a:r>
+              <a:rPr lang="en-US" sz="1400" dirty="0"/>
+              <a:t>) n=8</a:t>
+            </a:r>
+          </a:p>
+        </p:txBody>
+      </p:sp>
+      <p:sp>
+        <p:nvSpPr>
+          <p:cNvPr id="29" name="TextBox 28">
+            <a:extLst>
+              <a:ext uri="{FF2B5EF4-FFF2-40B4-BE49-F238E27FC236}">
+                <a16:creationId xmlns:a16="http://schemas.microsoft.com/office/drawing/2014/main" id="{F18FA6E2-5491-09C4-E0EB-77A6AEF1AC24}"/>
+              </a:ext>
+            </a:extLst>
+          </p:cNvPr>
+          <p:cNvSpPr txBox="1"/>
+          <p:nvPr/>
+        </p:nvSpPr>
+        <p:spPr>
+          <a:xfrm>
+            <a:off x="3082121" y="3091391"/>
+            <a:ext cx="1299635" cy="738664"/>
+          </a:xfrm>
+          <a:prstGeom prst="rect">
+            <a:avLst/>
+          </a:prstGeom>
+          <a:noFill/>
+          <a:ln w="28575">
+            <a:noFill/>
+          </a:ln>
+        </p:spPr>
+        <p:txBody>
+          <a:bodyPr wrap="square" rtlCol="0">
+            <a:spAutoFit/>
+          </a:bodyPr>
+          <a:lstStyle/>
+          <a:p>
+            <a:pPr algn="ctr"/>
+            <a:r>
+              <a:rPr lang="en-US" sz="1400" dirty="0"/>
+              <a:t>Classified:</a:t>
+            </a:r>
+          </a:p>
+          <a:p>
+            <a:pPr algn="ctr"/>
+            <a:r>
+              <a:rPr lang="en-US" sz="1400" dirty="0"/>
+              <a:t>n=40</a:t>
+            </a:r>
+          </a:p>
+          <a:p>
+            <a:pPr algn="ctr"/>
+            <a:r>
+              <a:rPr lang="en-US" sz="1400" dirty="0" err="1"/>
+              <a:t>tagseq</a:t>
+            </a:r>
+            <a:endParaRPr lang="en-US" sz="1400" dirty="0"/>
+          </a:p>
+        </p:txBody>
+      </p:sp>
     </p:spTree>
     <p:extLst>
       <p:ext uri="{BB962C8B-B14F-4D97-AF65-F5344CB8AC3E}">
@@ -6966,6 +7715,439 @@
             <a:r>
               <a:rPr lang="en-US" sz="3000" dirty="0"/>
               <a:t>Disease dataset set #3: Chan et al. 2021</a:t>
+            </a:r>
+          </a:p>
+        </p:txBody>
+      </p:sp>
+      <p:sp>
+        <p:nvSpPr>
+          <p:cNvPr id="2" name="Title 1">
+            <a:extLst>
+              <a:ext uri="{FF2B5EF4-FFF2-40B4-BE49-F238E27FC236}">
+                <a16:creationId xmlns:a16="http://schemas.microsoft.com/office/drawing/2014/main" id="{416AE173-9512-B3BC-2CD7-ED200D6A0933}"/>
+              </a:ext>
+            </a:extLst>
+          </p:cNvPr>
+          <p:cNvSpPr txBox="1">
+            <a:spLocks/>
+          </p:cNvSpPr>
+          <p:nvPr/>
+        </p:nvSpPr>
+        <p:spPr>
+          <a:xfrm>
+            <a:off x="186267" y="788457"/>
+            <a:ext cx="11836400" cy="1438276"/>
+          </a:xfrm>
+          <a:prstGeom prst="rect">
+            <a:avLst/>
+          </a:prstGeom>
+        </p:spPr>
+        <p:txBody>
+          <a:bodyPr vert="horz" lIns="91440" tIns="45720" rIns="91440" bIns="45720" rtlCol="0" anchor="ctr">
+            <a:normAutofit/>
+          </a:bodyPr>
+          <a:lstStyle>
+            <a:lvl1pPr algn="l" defTabSz="914400" rtl="0" eaLnBrk="1" latinLnBrk="0" hangingPunct="1">
+              <a:lnSpc>
+                <a:spcPct val="90000"/>
+              </a:lnSpc>
+              <a:spcBef>
+                <a:spcPct val="0"/>
+              </a:spcBef>
+              <a:buNone/>
+              <a:defRPr sz="4400" kern="1200">
+                <a:solidFill>
+                  <a:schemeClr val="tx1"/>
+                </a:solidFill>
+                <a:latin typeface="+mj-lt"/>
+                <a:ea typeface="+mj-ea"/>
+                <a:cs typeface="+mj-cs"/>
+              </a:defRPr>
+            </a:lvl1pPr>
+          </a:lstStyle>
+          <a:p>
+            <a:r>
+              <a:rPr lang="en-US" sz="1800" dirty="0"/>
+              <a:t>Transcriptomic Response to </a:t>
+            </a:r>
+            <a:r>
+              <a:rPr lang="en-US" sz="1800" i="1" dirty="0" err="1"/>
+              <a:t>Perkinsus</a:t>
+            </a:r>
+            <a:r>
+              <a:rPr lang="en-US" sz="1800" i="1" dirty="0"/>
+              <a:t> marinus </a:t>
+            </a:r>
+            <a:r>
+              <a:rPr lang="en-US" sz="1800" dirty="0"/>
+              <a:t>in Two </a:t>
+            </a:r>
+            <a:r>
+              <a:rPr lang="en-US" sz="1800" i="1" dirty="0"/>
+              <a:t>Crassostrea</a:t>
+            </a:r>
+            <a:r>
+              <a:rPr lang="en-US" sz="1800" dirty="0"/>
+              <a:t> Oysters Reveals Evolutionary Dynamics of Host-Parasite Interactions</a:t>
+            </a:r>
+          </a:p>
+          <a:p>
+            <a:r>
+              <a:rPr lang="en-US" sz="1800" dirty="0"/>
+              <a:t>link:  </a:t>
+            </a:r>
+            <a:r>
+              <a:rPr lang="en-US" sz="1800" dirty="0">
+                <a:hlinkClick r:id="rId2"/>
+              </a:rPr>
+              <a:t>https://www.frontiersin.org/journals/genetics/articles/10.3389/fgene.2021.795706/full</a:t>
+            </a:r>
+            <a:r>
+              <a:rPr lang="en-US" sz="1800" dirty="0"/>
+              <a:t> </a:t>
+            </a:r>
+          </a:p>
+          <a:p>
+            <a:endParaRPr lang="en-US" sz="1800" dirty="0"/>
+          </a:p>
+          <a:p>
+            <a:r>
+              <a:rPr lang="en-US" sz="1800" dirty="0"/>
+              <a:t>Oyster origin: Maine and Washington oyster farms. Acclimated in lab for 24 hours then experimentally challenged</a:t>
+            </a:r>
+          </a:p>
+        </p:txBody>
+      </p:sp>
+      <p:pic>
+        <p:nvPicPr>
+          <p:cNvPr id="5" name="Picture 4" descr="A diagram of a human brain&#10;&#10;Description automatically generated with medium confidence">
+            <a:extLst>
+              <a:ext uri="{FF2B5EF4-FFF2-40B4-BE49-F238E27FC236}">
+                <a16:creationId xmlns:a16="http://schemas.microsoft.com/office/drawing/2014/main" id="{A5EF3B3D-F3C7-D071-28CD-85CD2AD38C2D}"/>
+              </a:ext>
+            </a:extLst>
+          </p:cNvPr>
+          <p:cNvPicPr>
+            <a:picLocks noChangeAspect="1"/>
+          </p:cNvPicPr>
+          <p:nvPr/>
+        </p:nvPicPr>
+        <p:blipFill>
+          <a:blip r:embed="rId3">
+            <a:extLst>
+              <a:ext uri="{28A0092B-C50C-407E-A947-70E740481C1C}">
+                <a14:useLocalDpi xmlns:a14="http://schemas.microsoft.com/office/drawing/2010/main" val="0"/>
+              </a:ext>
+            </a:extLst>
+          </a:blip>
+          <a:stretch>
+            <a:fillRect/>
+          </a:stretch>
+        </p:blipFill>
+        <p:spPr>
+          <a:xfrm>
+            <a:off x="575733" y="3136706"/>
+            <a:ext cx="5673595" cy="3204827"/>
+          </a:xfrm>
+          <a:prstGeom prst="rect">
+            <a:avLst/>
+          </a:prstGeom>
+        </p:spPr>
+      </p:pic>
+      <p:sp>
+        <p:nvSpPr>
+          <p:cNvPr id="6" name="TextBox 5">
+            <a:extLst>
+              <a:ext uri="{FF2B5EF4-FFF2-40B4-BE49-F238E27FC236}">
+                <a16:creationId xmlns:a16="http://schemas.microsoft.com/office/drawing/2014/main" id="{C7667B00-4787-3009-7BD7-1B813D52D448}"/>
+              </a:ext>
+            </a:extLst>
+          </p:cNvPr>
+          <p:cNvSpPr txBox="1"/>
+          <p:nvPr/>
+        </p:nvSpPr>
+        <p:spPr>
+          <a:xfrm>
+            <a:off x="5444066" y="4222224"/>
+            <a:ext cx="1523805" cy="307777"/>
+          </a:xfrm>
+          <a:prstGeom prst="rect">
+            <a:avLst/>
+          </a:prstGeom>
+          <a:noFill/>
+          <a:ln w="28575">
+            <a:noFill/>
+          </a:ln>
+        </p:spPr>
+        <p:txBody>
+          <a:bodyPr wrap="square" rtlCol="0">
+            <a:spAutoFit/>
+          </a:bodyPr>
+          <a:lstStyle/>
+          <a:p>
+            <a:r>
+              <a:rPr lang="en-US" sz="1400" dirty="0"/>
+              <a:t>Control (FSW)</a:t>
+            </a:r>
+          </a:p>
+        </p:txBody>
+      </p:sp>
+      <p:sp>
+        <p:nvSpPr>
+          <p:cNvPr id="8" name="TextBox 7">
+            <a:extLst>
+              <a:ext uri="{FF2B5EF4-FFF2-40B4-BE49-F238E27FC236}">
+                <a16:creationId xmlns:a16="http://schemas.microsoft.com/office/drawing/2014/main" id="{99B233FA-1245-B7B8-F3FF-725172D38351}"/>
+              </a:ext>
+            </a:extLst>
+          </p:cNvPr>
+          <p:cNvSpPr txBox="1"/>
+          <p:nvPr/>
+        </p:nvSpPr>
+        <p:spPr>
+          <a:xfrm>
+            <a:off x="5444066" y="5618889"/>
+            <a:ext cx="1523805" cy="307777"/>
+          </a:xfrm>
+          <a:prstGeom prst="rect">
+            <a:avLst/>
+          </a:prstGeom>
+          <a:noFill/>
+          <a:ln w="28575">
+            <a:noFill/>
+          </a:ln>
+        </p:spPr>
+        <p:txBody>
+          <a:bodyPr wrap="square" rtlCol="0">
+            <a:spAutoFit/>
+          </a:bodyPr>
+          <a:lstStyle/>
+          <a:p>
+            <a:r>
+              <a:rPr lang="en-US" sz="1400" dirty="0"/>
+              <a:t>Control (FSW)</a:t>
+            </a:r>
+          </a:p>
+        </p:txBody>
+      </p:sp>
+      <p:sp>
+        <p:nvSpPr>
+          <p:cNvPr id="9" name="TextBox 8">
+            <a:extLst>
+              <a:ext uri="{FF2B5EF4-FFF2-40B4-BE49-F238E27FC236}">
+                <a16:creationId xmlns:a16="http://schemas.microsoft.com/office/drawing/2014/main" id="{F3BBF34D-9A5A-8B28-6340-CE3754FF66AE}"/>
+              </a:ext>
+            </a:extLst>
+          </p:cNvPr>
+          <p:cNvSpPr txBox="1"/>
+          <p:nvPr/>
+        </p:nvSpPr>
+        <p:spPr>
+          <a:xfrm>
+            <a:off x="5444066" y="3523922"/>
+            <a:ext cx="3225605" cy="307777"/>
+          </a:xfrm>
+          <a:prstGeom prst="rect">
+            <a:avLst/>
+          </a:prstGeom>
+          <a:noFill/>
+          <a:ln w="28575">
+            <a:noFill/>
+          </a:ln>
+        </p:spPr>
+        <p:txBody>
+          <a:bodyPr wrap="square" rtlCol="0">
+            <a:spAutoFit/>
+          </a:bodyPr>
+          <a:lstStyle/>
+          <a:p>
+            <a:r>
+              <a:rPr lang="en-US" sz="1400" dirty="0"/>
+              <a:t>Challenge (1.2 x 10</a:t>
+            </a:r>
+            <a:r>
+              <a:rPr lang="en-US" sz="1400" baseline="30000" dirty="0"/>
+              <a:t>6</a:t>
+            </a:r>
+            <a:r>
+              <a:rPr lang="en-US" sz="1400" dirty="0"/>
+              <a:t> </a:t>
+            </a:r>
+            <a:r>
+              <a:rPr lang="en-US" sz="1400" i="1" dirty="0"/>
+              <a:t>P. marinus</a:t>
+            </a:r>
+            <a:r>
+              <a:rPr lang="en-US" sz="1400" dirty="0"/>
+              <a:t>)</a:t>
+            </a:r>
+          </a:p>
+        </p:txBody>
+      </p:sp>
+      <p:sp>
+        <p:nvSpPr>
+          <p:cNvPr id="10" name="TextBox 9">
+            <a:extLst>
+              <a:ext uri="{FF2B5EF4-FFF2-40B4-BE49-F238E27FC236}">
+                <a16:creationId xmlns:a16="http://schemas.microsoft.com/office/drawing/2014/main" id="{2103C3F8-E804-CC6A-85F5-8067E1CF38CE}"/>
+              </a:ext>
+            </a:extLst>
+          </p:cNvPr>
+          <p:cNvSpPr txBox="1"/>
+          <p:nvPr/>
+        </p:nvSpPr>
+        <p:spPr>
+          <a:xfrm>
+            <a:off x="5444066" y="4968407"/>
+            <a:ext cx="3225605" cy="307777"/>
+          </a:xfrm>
+          <a:prstGeom prst="rect">
+            <a:avLst/>
+          </a:prstGeom>
+          <a:noFill/>
+          <a:ln w="28575">
+            <a:noFill/>
+          </a:ln>
+        </p:spPr>
+        <p:txBody>
+          <a:bodyPr wrap="square" rtlCol="0">
+            <a:spAutoFit/>
+          </a:bodyPr>
+          <a:lstStyle/>
+          <a:p>
+            <a:r>
+              <a:rPr lang="en-US" sz="1400" dirty="0"/>
+              <a:t>Challenge (1.2 x 10</a:t>
+            </a:r>
+            <a:r>
+              <a:rPr lang="en-US" sz="1400" baseline="30000" dirty="0"/>
+              <a:t>6</a:t>
+            </a:r>
+            <a:r>
+              <a:rPr lang="en-US" sz="1400" dirty="0"/>
+              <a:t> </a:t>
+            </a:r>
+            <a:r>
+              <a:rPr lang="en-US" sz="1400" i="1" dirty="0"/>
+              <a:t>P. marinus</a:t>
+            </a:r>
+            <a:r>
+              <a:rPr lang="en-US" sz="1400" dirty="0"/>
+              <a:t>)</a:t>
+            </a:r>
+          </a:p>
+        </p:txBody>
+      </p:sp>
+      <p:sp>
+        <p:nvSpPr>
+          <p:cNvPr id="12" name="TextBox 11">
+            <a:extLst>
+              <a:ext uri="{FF2B5EF4-FFF2-40B4-BE49-F238E27FC236}">
+                <a16:creationId xmlns:a16="http://schemas.microsoft.com/office/drawing/2014/main" id="{C4F67131-6389-4B58-EA04-804C1AD45099}"/>
+              </a:ext>
+            </a:extLst>
+          </p:cNvPr>
+          <p:cNvSpPr txBox="1"/>
+          <p:nvPr/>
+        </p:nvSpPr>
+        <p:spPr>
+          <a:xfrm>
+            <a:off x="4750262" y="2778917"/>
+            <a:ext cx="702735" cy="307777"/>
+          </a:xfrm>
+          <a:prstGeom prst="rect">
+            <a:avLst/>
+          </a:prstGeom>
+          <a:noFill/>
+          <a:ln w="28575">
+            <a:noFill/>
+          </a:ln>
+        </p:spPr>
+        <p:txBody>
+          <a:bodyPr wrap="square" rtlCol="0">
+            <a:spAutoFit/>
+          </a:bodyPr>
+          <a:lstStyle/>
+          <a:p>
+            <a:r>
+              <a:rPr lang="en-US" sz="1400" dirty="0"/>
+              <a:t>n=10</a:t>
+            </a:r>
+          </a:p>
+        </p:txBody>
+      </p:sp>
+      <p:sp>
+        <p:nvSpPr>
+          <p:cNvPr id="13" name="TextBox 12">
+            <a:extLst>
+              <a:ext uri="{FF2B5EF4-FFF2-40B4-BE49-F238E27FC236}">
+                <a16:creationId xmlns:a16="http://schemas.microsoft.com/office/drawing/2014/main" id="{6EB8B7CD-0AAE-4207-3C49-C0E2C3BD9232}"/>
+              </a:ext>
+            </a:extLst>
+          </p:cNvPr>
+          <p:cNvSpPr txBox="1"/>
+          <p:nvPr/>
+        </p:nvSpPr>
+        <p:spPr>
+          <a:xfrm>
+            <a:off x="3848232" y="2778917"/>
+            <a:ext cx="702735" cy="307777"/>
+          </a:xfrm>
+          <a:prstGeom prst="rect">
+            <a:avLst/>
+          </a:prstGeom>
+          <a:noFill/>
+          <a:ln w="28575">
+            <a:noFill/>
+          </a:ln>
+        </p:spPr>
+        <p:txBody>
+          <a:bodyPr wrap="square" rtlCol="0">
+            <a:spAutoFit/>
+          </a:bodyPr>
+          <a:lstStyle/>
+          <a:p>
+            <a:r>
+              <a:rPr lang="en-US" sz="1400" dirty="0"/>
+              <a:t>n=10</a:t>
+            </a:r>
+          </a:p>
+        </p:txBody>
+      </p:sp>
+      <p:sp>
+        <p:nvSpPr>
+          <p:cNvPr id="14" name="TextBox 13">
+            <a:extLst>
+              <a:ext uri="{FF2B5EF4-FFF2-40B4-BE49-F238E27FC236}">
+                <a16:creationId xmlns:a16="http://schemas.microsoft.com/office/drawing/2014/main" id="{0E97E1D2-A117-145F-59A2-3B496FE68E2B}"/>
+              </a:ext>
+            </a:extLst>
+          </p:cNvPr>
+          <p:cNvSpPr txBox="1"/>
+          <p:nvPr/>
+        </p:nvSpPr>
+        <p:spPr>
+          <a:xfrm>
+            <a:off x="2518965" y="2778917"/>
+            <a:ext cx="702735" cy="307777"/>
+          </a:xfrm>
+          <a:prstGeom prst="rect">
+            <a:avLst/>
+          </a:prstGeom>
+          <a:noFill/>
+          <a:ln w="28575">
+            <a:noFill/>
+          </a:ln>
+        </p:spPr>
+        <p:txBody>
+          <a:bodyPr wrap="square" rtlCol="0">
+            <a:spAutoFit/>
+          </a:bodyPr>
+          <a:lstStyle/>
+          <a:p>
+            <a:r>
+              <a:rPr lang="en-US" sz="1400" dirty="0"/>
+              <a:t>n=10</a:t>
             </a:r>
           </a:p>
         </p:txBody>

</xml_diff>

<commit_message>
Modify slide 6: Disease set #4
</commit_message>
<xml_diff>
--- a/analysis_ideas.pptx
+++ b/analysis_ideas.pptx
@@ -120,9 +120,7 @@
 <file path=ppt/revisionInfo.xml><?xml version="1.0" encoding="utf-8"?>
 <p1510:revInfo xmlns:a="http://schemas.openxmlformats.org/drawingml/2006/main" xmlns:r="http://schemas.openxmlformats.org/officeDocument/2006/relationships" xmlns:p1510="http://schemas.microsoft.com/office/powerpoint/2015/10/main">
   <p1510:revLst>
-    <p1510:client id="{993996CE-F763-CB30-21DC-7FA922D7FE85}" v="126" dt="2024-12-13T15:25:30.038"/>
-    <p1510:client id="{A15FB58C-E6E2-41C5-8160-F7C00DB20A18}" v="1482" dt="2024-12-13T15:26:56.958"/>
-    <p1510:client id="{DEA23BB8-2350-2EED-0B9C-43F97AD684B3}" v="6" dt="2024-12-13T14:44:41.191"/>
+    <p1510:client id="{1652D9ED-8F34-4469-AA6E-2BA2F557AC94}" v="4" dt="2025-01-17T15:05:23.313"/>
   </p1510:revLst>
 </p1510:revInfo>
 </file>
@@ -130,329 +128,74 @@
 <file path=ppt/changesInfos/changesInfo1.xml><?xml version="1.0" encoding="utf-8"?>
 <pc:chgInfo xmlns:a="http://schemas.openxmlformats.org/drawingml/2006/main" xmlns:r="http://schemas.openxmlformats.org/officeDocument/2006/relationships" xmlns:ac="http://schemas.microsoft.com/office/drawing/2013/main/command" xmlns:pc="http://schemas.microsoft.com/office/powerpoint/2013/main/command">
   <pc:docChgLst>
-    <pc:chgData name="Shelly Wanamaker" userId="cd0df884-05c1-481b-a1f7-883604879bba" providerId="ADAL" clId="{A15FB58C-E6E2-41C5-8160-F7C00DB20A18}"/>
-    <pc:docChg chg="undo custSel addSld modSld">
-      <pc:chgData name="Shelly Wanamaker" userId="cd0df884-05c1-481b-a1f7-883604879bba" providerId="ADAL" clId="{A15FB58C-E6E2-41C5-8160-F7C00DB20A18}" dt="2024-12-13T15:26:56.958" v="1478" actId="20577"/>
+    <pc:chgData name="Steve H. Yost" userId="9b5a6cf492109805" providerId="LiveId" clId="{1652D9ED-8F34-4469-AA6E-2BA2F557AC94}"/>
+    <pc:docChg chg="undo custSel modSld">
+      <pc:chgData name="Steve H. Yost" userId="9b5a6cf492109805" providerId="LiveId" clId="{1652D9ED-8F34-4469-AA6E-2BA2F557AC94}" dt="2025-01-17T15:42:11.281" v="337" actId="478"/>
       <pc:docMkLst>
         <pc:docMk/>
       </pc:docMkLst>
-      <pc:sldChg chg="addSp modSp mod">
-        <pc:chgData name="Shelly Wanamaker" userId="cd0df884-05c1-481b-a1f7-883604879bba" providerId="ADAL" clId="{A15FB58C-E6E2-41C5-8160-F7C00DB20A18}" dt="2024-12-13T15:18:05.016" v="925"/>
+      <pc:sldChg chg="addSp delSp modSp mod">
+        <pc:chgData name="Steve H. Yost" userId="9b5a6cf492109805" providerId="LiveId" clId="{1652D9ED-8F34-4469-AA6E-2BA2F557AC94}" dt="2025-01-17T15:42:11.281" v="337" actId="478"/>
         <pc:sldMkLst>
           <pc:docMk/>
-          <pc:sldMk cId="2348175036" sldId="256"/>
+          <pc:sldMk cId="1835731223" sldId="261"/>
         </pc:sldMkLst>
-        <pc:spChg chg="add mod">
-          <ac:chgData name="Shelly Wanamaker" userId="cd0df884-05c1-481b-a1f7-883604879bba" providerId="ADAL" clId="{A15FB58C-E6E2-41C5-8160-F7C00DB20A18}" dt="2024-12-13T15:11:24.121" v="857" actId="20577"/>
+        <pc:spChg chg="mod">
+          <ac:chgData name="Steve H. Yost" userId="9b5a6cf492109805" providerId="LiveId" clId="{1652D9ED-8F34-4469-AA6E-2BA2F557AC94}" dt="2025-01-17T15:19:13.340" v="333" actId="20577"/>
           <ac:spMkLst>
             <pc:docMk/>
-            <pc:sldMk cId="2348175036" sldId="256"/>
-            <ac:spMk id="3" creationId="{3916E3E9-890A-7E7D-D977-FC0136269393}"/>
-          </ac:spMkLst>
-        </pc:spChg>
-        <pc:spChg chg="add mod">
-          <ac:chgData name="Shelly Wanamaker" userId="cd0df884-05c1-481b-a1f7-883604879bba" providerId="ADAL" clId="{A15FB58C-E6E2-41C5-8160-F7C00DB20A18}" dt="2024-12-13T15:02:04.682" v="777" actId="1076"/>
-          <ac:spMkLst>
-            <pc:docMk/>
-            <pc:sldMk cId="2348175036" sldId="256"/>
-            <ac:spMk id="4" creationId="{10F830F1-110D-6F62-F8C3-3621F6A0EBDD}"/>
-          </ac:spMkLst>
-        </pc:spChg>
-        <pc:spChg chg="add mod">
-          <ac:chgData name="Shelly Wanamaker" userId="cd0df884-05c1-481b-a1f7-883604879bba" providerId="ADAL" clId="{A15FB58C-E6E2-41C5-8160-F7C00DB20A18}" dt="2024-12-13T15:02:04.682" v="777" actId="1076"/>
-          <ac:spMkLst>
-            <pc:docMk/>
-            <pc:sldMk cId="2348175036" sldId="256"/>
-            <ac:spMk id="5" creationId="{2146FCF8-E8A1-FB85-6941-B4D8A4BF1CA0}"/>
-          </ac:spMkLst>
-        </pc:spChg>
-        <pc:spChg chg="add mod">
-          <ac:chgData name="Shelly Wanamaker" userId="cd0df884-05c1-481b-a1f7-883604879bba" providerId="ADAL" clId="{A15FB58C-E6E2-41C5-8160-F7C00DB20A18}" dt="2024-12-13T15:02:04.682" v="777" actId="1076"/>
-          <ac:spMkLst>
-            <pc:docMk/>
-            <pc:sldMk cId="2348175036" sldId="256"/>
-            <ac:spMk id="6" creationId="{F489EE1D-7E40-4DA1-0155-2C6356391440}"/>
-          </ac:spMkLst>
-        </pc:spChg>
-        <pc:spChg chg="add mod">
-          <ac:chgData name="Shelly Wanamaker" userId="cd0df884-05c1-481b-a1f7-883604879bba" providerId="ADAL" clId="{A15FB58C-E6E2-41C5-8160-F7C00DB20A18}" dt="2024-12-13T15:02:04.682" v="777" actId="1076"/>
-          <ac:spMkLst>
-            <pc:docMk/>
-            <pc:sldMk cId="2348175036" sldId="256"/>
-            <ac:spMk id="7" creationId="{B767E63D-805E-93AC-8032-D1B87178F87C}"/>
-          </ac:spMkLst>
-        </pc:spChg>
-        <pc:spChg chg="add mod">
-          <ac:chgData name="Shelly Wanamaker" userId="cd0df884-05c1-481b-a1f7-883604879bba" providerId="ADAL" clId="{A15FB58C-E6E2-41C5-8160-F7C00DB20A18}" dt="2024-12-13T15:02:04.682" v="777" actId="1076"/>
-          <ac:spMkLst>
-            <pc:docMk/>
-            <pc:sldMk cId="2348175036" sldId="256"/>
-            <ac:spMk id="8" creationId="{5BDE67DA-72B9-E25F-A7B2-088882EDF77B}"/>
-          </ac:spMkLst>
-        </pc:spChg>
-        <pc:spChg chg="add mod">
-          <ac:chgData name="Shelly Wanamaker" userId="cd0df884-05c1-481b-a1f7-883604879bba" providerId="ADAL" clId="{A15FB58C-E6E2-41C5-8160-F7C00DB20A18}" dt="2024-12-13T15:02:04.682" v="777" actId="1076"/>
-          <ac:spMkLst>
-            <pc:docMk/>
-            <pc:sldMk cId="2348175036" sldId="256"/>
-            <ac:spMk id="9" creationId="{11212AB0-F7B1-40A0-8B1F-E05BB34E5622}"/>
-          </ac:spMkLst>
-        </pc:spChg>
-        <pc:spChg chg="add mod">
-          <ac:chgData name="Shelly Wanamaker" userId="cd0df884-05c1-481b-a1f7-883604879bba" providerId="ADAL" clId="{A15FB58C-E6E2-41C5-8160-F7C00DB20A18}" dt="2024-12-13T15:02:04.682" v="777" actId="1076"/>
-          <ac:spMkLst>
-            <pc:docMk/>
-            <pc:sldMk cId="2348175036" sldId="256"/>
-            <ac:spMk id="10" creationId="{20F30570-B8B6-9A40-87CA-5B1851C865C7}"/>
-          </ac:spMkLst>
-        </pc:spChg>
-        <pc:spChg chg="add mod">
-          <ac:chgData name="Shelly Wanamaker" userId="cd0df884-05c1-481b-a1f7-883604879bba" providerId="ADAL" clId="{A15FB58C-E6E2-41C5-8160-F7C00DB20A18}" dt="2024-12-13T15:02:04.682" v="777" actId="1076"/>
-          <ac:spMkLst>
-            <pc:docMk/>
-            <pc:sldMk cId="2348175036" sldId="256"/>
-            <ac:spMk id="11" creationId="{38EAE23A-1DD9-1995-405A-B58E556CF197}"/>
-          </ac:spMkLst>
-        </pc:spChg>
-        <pc:spChg chg="add mod">
-          <ac:chgData name="Shelly Wanamaker" userId="cd0df884-05c1-481b-a1f7-883604879bba" providerId="ADAL" clId="{A15FB58C-E6E2-41C5-8160-F7C00DB20A18}" dt="2024-12-13T15:02:04.682" v="777" actId="1076"/>
-          <ac:spMkLst>
-            <pc:docMk/>
-            <pc:sldMk cId="2348175036" sldId="256"/>
-            <ac:spMk id="12" creationId="{7D5F945D-2520-56B4-66FA-B63C6F612006}"/>
-          </ac:spMkLst>
-        </pc:spChg>
-        <pc:spChg chg="add mod">
-          <ac:chgData name="Shelly Wanamaker" userId="cd0df884-05c1-481b-a1f7-883604879bba" providerId="ADAL" clId="{A15FB58C-E6E2-41C5-8160-F7C00DB20A18}" dt="2024-12-13T15:02:04.682" v="777" actId="1076"/>
-          <ac:spMkLst>
-            <pc:docMk/>
-            <pc:sldMk cId="2348175036" sldId="256"/>
-            <ac:spMk id="13" creationId="{2CCA0306-2F65-B021-3824-AE71730C4B90}"/>
-          </ac:spMkLst>
-        </pc:spChg>
-        <pc:spChg chg="add mod ord">
-          <ac:chgData name="Shelly Wanamaker" userId="cd0df884-05c1-481b-a1f7-883604879bba" providerId="ADAL" clId="{A15FB58C-E6E2-41C5-8160-F7C00DB20A18}" dt="2024-12-13T15:02:04.682" v="777" actId="1076"/>
-          <ac:spMkLst>
-            <pc:docMk/>
-            <pc:sldMk cId="2348175036" sldId="256"/>
-            <ac:spMk id="14" creationId="{B362755E-F37A-E380-2FC1-B3189E8A8701}"/>
-          </ac:spMkLst>
-        </pc:spChg>
-        <pc:spChg chg="add mod ord">
-          <ac:chgData name="Shelly Wanamaker" userId="cd0df884-05c1-481b-a1f7-883604879bba" providerId="ADAL" clId="{A15FB58C-E6E2-41C5-8160-F7C00DB20A18}" dt="2024-12-13T15:02:04.682" v="777" actId="1076"/>
-          <ac:spMkLst>
-            <pc:docMk/>
-            <pc:sldMk cId="2348175036" sldId="256"/>
-            <ac:spMk id="15" creationId="{F361F3BF-452A-CC57-1CEE-87617EB311E6}"/>
-          </ac:spMkLst>
-        </pc:spChg>
-        <pc:spChg chg="add mod ord">
-          <ac:chgData name="Shelly Wanamaker" userId="cd0df884-05c1-481b-a1f7-883604879bba" providerId="ADAL" clId="{A15FB58C-E6E2-41C5-8160-F7C00DB20A18}" dt="2024-12-13T15:02:04.682" v="777" actId="1076"/>
-          <ac:spMkLst>
-            <pc:docMk/>
-            <pc:sldMk cId="2348175036" sldId="256"/>
-            <ac:spMk id="16" creationId="{34A7B9E4-B92F-D00B-8868-C990066F7DAA}"/>
-          </ac:spMkLst>
-        </pc:spChg>
-        <pc:spChg chg="add mod ord">
-          <ac:chgData name="Shelly Wanamaker" userId="cd0df884-05c1-481b-a1f7-883604879bba" providerId="ADAL" clId="{A15FB58C-E6E2-41C5-8160-F7C00DB20A18}" dt="2024-12-13T15:02:04.682" v="777" actId="1076"/>
-          <ac:spMkLst>
-            <pc:docMk/>
-            <pc:sldMk cId="2348175036" sldId="256"/>
-            <ac:spMk id="17" creationId="{772F44CB-965D-8753-3CB2-BA602319E356}"/>
-          </ac:spMkLst>
-        </pc:spChg>
-        <pc:spChg chg="add mod">
-          <ac:chgData name="Shelly Wanamaker" userId="cd0df884-05c1-481b-a1f7-883604879bba" providerId="ADAL" clId="{A15FB58C-E6E2-41C5-8160-F7C00DB20A18}" dt="2024-12-13T15:02:04.682" v="777" actId="1076"/>
-          <ac:spMkLst>
-            <pc:docMk/>
-            <pc:sldMk cId="2348175036" sldId="256"/>
-            <ac:spMk id="18" creationId="{91260735-2F21-CB3A-3482-6EAF41342080}"/>
-          </ac:spMkLst>
-        </pc:spChg>
-        <pc:spChg chg="add mod">
-          <ac:chgData name="Shelly Wanamaker" userId="cd0df884-05c1-481b-a1f7-883604879bba" providerId="ADAL" clId="{A15FB58C-E6E2-41C5-8160-F7C00DB20A18}" dt="2024-12-13T15:02:04.682" v="777" actId="1076"/>
-          <ac:spMkLst>
-            <pc:docMk/>
-            <pc:sldMk cId="2348175036" sldId="256"/>
-            <ac:spMk id="19" creationId="{502AB14D-BBD8-F059-48AC-9918C9AFA50B}"/>
-          </ac:spMkLst>
-        </pc:spChg>
-        <pc:spChg chg="add mod">
-          <ac:chgData name="Shelly Wanamaker" userId="cd0df884-05c1-481b-a1f7-883604879bba" providerId="ADAL" clId="{A15FB58C-E6E2-41C5-8160-F7C00DB20A18}" dt="2024-12-13T15:02:04.682" v="777" actId="1076"/>
-          <ac:spMkLst>
-            <pc:docMk/>
-            <pc:sldMk cId="2348175036" sldId="256"/>
-            <ac:spMk id="20" creationId="{91A22FF9-9A7C-300A-1FDE-794E75C89D59}"/>
-          </ac:spMkLst>
-        </pc:spChg>
-        <pc:spChg chg="add mod">
-          <ac:chgData name="Shelly Wanamaker" userId="cd0df884-05c1-481b-a1f7-883604879bba" providerId="ADAL" clId="{A15FB58C-E6E2-41C5-8160-F7C00DB20A18}" dt="2024-12-13T15:02:04.682" v="777" actId="1076"/>
-          <ac:spMkLst>
-            <pc:docMk/>
-            <pc:sldMk cId="2348175036" sldId="256"/>
-            <ac:spMk id="21" creationId="{A46F2642-7ACE-82BA-1A96-5C486B1F19F2}"/>
-          </ac:spMkLst>
-        </pc:spChg>
-        <pc:spChg chg="add mod">
-          <ac:chgData name="Shelly Wanamaker" userId="cd0df884-05c1-481b-a1f7-883604879bba" providerId="ADAL" clId="{A15FB58C-E6E2-41C5-8160-F7C00DB20A18}" dt="2024-12-13T15:02:04.682" v="777" actId="1076"/>
-          <ac:spMkLst>
-            <pc:docMk/>
-            <pc:sldMk cId="2348175036" sldId="256"/>
-            <ac:spMk id="22" creationId="{838BC3CD-4B8D-7361-9B5C-0B41F3821FB1}"/>
-          </ac:spMkLst>
-        </pc:spChg>
-        <pc:spChg chg="add mod">
-          <ac:chgData name="Shelly Wanamaker" userId="cd0df884-05c1-481b-a1f7-883604879bba" providerId="ADAL" clId="{A15FB58C-E6E2-41C5-8160-F7C00DB20A18}" dt="2024-12-13T15:02:04.682" v="777" actId="1076"/>
-          <ac:spMkLst>
-            <pc:docMk/>
-            <pc:sldMk cId="2348175036" sldId="256"/>
-            <ac:spMk id="23" creationId="{D7B0CB71-3F72-1AEC-3A04-05A742B253D7}"/>
-          </ac:spMkLst>
-        </pc:spChg>
-        <pc:spChg chg="add mod">
-          <ac:chgData name="Shelly Wanamaker" userId="cd0df884-05c1-481b-a1f7-883604879bba" providerId="ADAL" clId="{A15FB58C-E6E2-41C5-8160-F7C00DB20A18}" dt="2024-12-13T15:02:04.682" v="777" actId="1076"/>
-          <ac:spMkLst>
-            <pc:docMk/>
-            <pc:sldMk cId="2348175036" sldId="256"/>
-            <ac:spMk id="24" creationId="{7EF94764-CE5D-4A8C-A1FB-9C759F8B48AB}"/>
-          </ac:spMkLst>
-        </pc:spChg>
-        <pc:spChg chg="add mod">
-          <ac:chgData name="Shelly Wanamaker" userId="cd0df884-05c1-481b-a1f7-883604879bba" providerId="ADAL" clId="{A15FB58C-E6E2-41C5-8160-F7C00DB20A18}" dt="2024-12-13T15:02:04.682" v="777" actId="1076"/>
-          <ac:spMkLst>
-            <pc:docMk/>
-            <pc:sldMk cId="2348175036" sldId="256"/>
-            <ac:spMk id="25" creationId="{23CE226F-FF17-8ECC-8AC3-8A4306E60D10}"/>
-          </ac:spMkLst>
-        </pc:spChg>
-        <pc:spChg chg="add mod">
-          <ac:chgData name="Shelly Wanamaker" userId="cd0df884-05c1-481b-a1f7-883604879bba" providerId="ADAL" clId="{A15FB58C-E6E2-41C5-8160-F7C00DB20A18}" dt="2024-12-13T15:02:04.682" v="777" actId="1076"/>
-          <ac:spMkLst>
-            <pc:docMk/>
-            <pc:sldMk cId="2348175036" sldId="256"/>
-            <ac:spMk id="26" creationId="{67C7FD55-23AA-0180-D4F3-DC09EE874C14}"/>
-          </ac:spMkLst>
-        </pc:spChg>
-        <pc:spChg chg="add mod">
-          <ac:chgData name="Shelly Wanamaker" userId="cd0df884-05c1-481b-a1f7-883604879bba" providerId="ADAL" clId="{A15FB58C-E6E2-41C5-8160-F7C00DB20A18}" dt="2024-12-13T15:02:04.682" v="777" actId="1076"/>
-          <ac:spMkLst>
-            <pc:docMk/>
-            <pc:sldMk cId="2348175036" sldId="256"/>
-            <ac:spMk id="27" creationId="{CAC4A126-884B-7063-52EF-1E82DE1DDF78}"/>
-          </ac:spMkLst>
-        </pc:spChg>
-        <pc:spChg chg="add mod">
-          <ac:chgData name="Shelly Wanamaker" userId="cd0df884-05c1-481b-a1f7-883604879bba" providerId="ADAL" clId="{A15FB58C-E6E2-41C5-8160-F7C00DB20A18}" dt="2024-12-13T15:02:04.682" v="777" actId="1076"/>
-          <ac:spMkLst>
-            <pc:docMk/>
-            <pc:sldMk cId="2348175036" sldId="256"/>
-            <ac:spMk id="28" creationId="{CC67148D-ADA5-74D4-8736-4D3DACF2B5A6}"/>
-          </ac:spMkLst>
-        </pc:spChg>
-        <pc:spChg chg="add mod">
-          <ac:chgData name="Shelly Wanamaker" userId="cd0df884-05c1-481b-a1f7-883604879bba" providerId="ADAL" clId="{A15FB58C-E6E2-41C5-8160-F7C00DB20A18}" dt="2024-12-13T15:02:04.682" v="777" actId="1076"/>
-          <ac:spMkLst>
-            <pc:docMk/>
-            <pc:sldMk cId="2348175036" sldId="256"/>
-            <ac:spMk id="29" creationId="{1C728CEB-BD00-B780-26C2-A54D36091C7F}"/>
-          </ac:spMkLst>
-        </pc:spChg>
-        <pc:spChg chg="add mod">
-          <ac:chgData name="Shelly Wanamaker" userId="cd0df884-05c1-481b-a1f7-883604879bba" providerId="ADAL" clId="{A15FB58C-E6E2-41C5-8160-F7C00DB20A18}" dt="2024-12-13T15:02:04.682" v="777" actId="1076"/>
-          <ac:spMkLst>
-            <pc:docMk/>
-            <pc:sldMk cId="2348175036" sldId="256"/>
-            <ac:spMk id="30" creationId="{EBF1166B-2486-D061-394C-822C900ED085}"/>
-          </ac:spMkLst>
-        </pc:spChg>
-        <pc:spChg chg="add mod">
-          <ac:chgData name="Shelly Wanamaker" userId="cd0df884-05c1-481b-a1f7-883604879bba" providerId="ADAL" clId="{A15FB58C-E6E2-41C5-8160-F7C00DB20A18}" dt="2024-12-13T15:18:00.509" v="924" actId="403"/>
-          <ac:spMkLst>
-            <pc:docMk/>
-            <pc:sldMk cId="2348175036" sldId="256"/>
-            <ac:spMk id="31" creationId="{0760348A-31E5-53B7-3F23-1CD50D7CF295}"/>
-          </ac:spMkLst>
-        </pc:spChg>
-        <pc:spChg chg="add mod">
-          <ac:chgData name="Shelly Wanamaker" userId="cd0df884-05c1-481b-a1f7-883604879bba" providerId="ADAL" clId="{A15FB58C-E6E2-41C5-8160-F7C00DB20A18}" dt="2024-12-13T15:18:05.016" v="925"/>
-          <ac:spMkLst>
-            <pc:docMk/>
-            <pc:sldMk cId="2348175036" sldId="256"/>
-            <ac:spMk id="32" creationId="{877AF79F-E215-A51D-6013-88C6307C4B34}"/>
-          </ac:spMkLst>
-        </pc:spChg>
-      </pc:sldChg>
-      <pc:sldChg chg="modSp new mod">
-        <pc:chgData name="Shelly Wanamaker" userId="cd0df884-05c1-481b-a1f7-883604879bba" providerId="ADAL" clId="{A15FB58C-E6E2-41C5-8160-F7C00DB20A18}" dt="2024-12-13T15:26:56.958" v="1478" actId="20577"/>
-        <pc:sldMkLst>
-          <pc:docMk/>
-          <pc:sldMk cId="668727100" sldId="257"/>
-        </pc:sldMkLst>
-        <pc:spChg chg="mod">
-          <ac:chgData name="Shelly Wanamaker" userId="cd0df884-05c1-481b-a1f7-883604879bba" providerId="ADAL" clId="{A15FB58C-E6E2-41C5-8160-F7C00DB20A18}" dt="2024-12-13T15:18:33.064" v="944" actId="20577"/>
-          <ac:spMkLst>
-            <pc:docMk/>
-            <pc:sldMk cId="668727100" sldId="257"/>
-            <ac:spMk id="2" creationId="{F22ED875-3FB8-6D9F-5D58-B148A199E681}"/>
+            <pc:sldMk cId="1835731223" sldId="261"/>
+            <ac:spMk id="2" creationId="{716A2321-9FE5-5C06-3CA4-3FD685BFD82C}"/>
           </ac:spMkLst>
         </pc:spChg>
         <pc:spChg chg="mod">
-          <ac:chgData name="Shelly Wanamaker" userId="cd0df884-05c1-481b-a1f7-883604879bba" providerId="ADAL" clId="{A15FB58C-E6E2-41C5-8160-F7C00DB20A18}" dt="2024-12-13T15:26:56.958" v="1478" actId="20577"/>
+          <ac:chgData name="Steve H. Yost" userId="9b5a6cf492109805" providerId="LiveId" clId="{1652D9ED-8F34-4469-AA6E-2BA2F557AC94}" dt="2025-01-17T14:45:01.391" v="16" actId="20577"/>
           <ac:spMkLst>
             <pc:docMk/>
-            <pc:sldMk cId="668727100" sldId="257"/>
-            <ac:spMk id="3" creationId="{B737D269-2CEB-094C-FB91-9592A8B24B05}"/>
+            <pc:sldMk cId="1835731223" sldId="261"/>
+            <ac:spMk id="9" creationId="{4FA8FBC9-5FD7-ADB9-EA36-CE8897326DC6}"/>
           </ac:spMkLst>
         </pc:spChg>
-      </pc:sldChg>
-    </pc:docChg>
-  </pc:docChgLst>
-  <pc:docChgLst>
-    <pc:chgData name="Emma Strand" userId="S::emma.strand@gmgi.org::cb199c47-99d2-4351-a663-5c5d31f99371" providerId="AD" clId="Web-{DEA23BB8-2350-2EED-0B9C-43F97AD684B3}"/>
-    <pc:docChg chg="modSld">
-      <pc:chgData name="Emma Strand" userId="S::emma.strand@gmgi.org::cb199c47-99d2-4351-a663-5c5d31f99371" providerId="AD" clId="Web-{DEA23BB8-2350-2EED-0B9C-43F97AD684B3}" dt="2024-12-13T14:44:41.191" v="3"/>
-      <pc:docMkLst>
-        <pc:docMk/>
-      </pc:docMkLst>
-      <pc:sldChg chg="addSp delSp modSp">
-        <pc:chgData name="Emma Strand" userId="S::emma.strand@gmgi.org::cb199c47-99d2-4351-a663-5c5d31f99371" providerId="AD" clId="Web-{DEA23BB8-2350-2EED-0B9C-43F97AD684B3}" dt="2024-12-13T14:44:41.191" v="3"/>
-        <pc:sldMkLst>
-          <pc:docMk/>
-          <pc:sldMk cId="2348175036" sldId="256"/>
-        </pc:sldMkLst>
-        <pc:spChg chg="add del mod">
-          <ac:chgData name="Emma Strand" userId="S::emma.strand@gmgi.org::cb199c47-99d2-4351-a663-5c5d31f99371" providerId="AD" clId="Web-{DEA23BB8-2350-2EED-0B9C-43F97AD684B3}" dt="2024-12-13T14:44:41.191" v="3"/>
+        <pc:spChg chg="mod">
+          <ac:chgData name="Steve H. Yost" userId="9b5a6cf492109805" providerId="LiveId" clId="{1652D9ED-8F34-4469-AA6E-2BA2F557AC94}" dt="2025-01-17T15:08:35.354" v="278" actId="14100"/>
           <ac:spMkLst>
             <pc:docMk/>
-            <pc:sldMk cId="2348175036" sldId="256"/>
-            <ac:spMk id="2" creationId="{322CE8A2-09D0-BBDB-4E16-7E07798760D1}"/>
+            <pc:sldMk cId="1835731223" sldId="261"/>
+            <ac:spMk id="21" creationId="{B86F60C9-4883-F689-A999-7FE175456DC7}"/>
           </ac:spMkLst>
         </pc:spChg>
-      </pc:sldChg>
-    </pc:docChg>
-  </pc:docChgLst>
-  <pc:docChgLst>
-    <pc:chgData name="Emma Strand" userId="S::emma.strand@gmgi.org::cb199c47-99d2-4351-a663-5c5d31f99371" providerId="AD" clId="Web-{993996CE-F763-CB30-21DC-7FA922D7FE85}"/>
-    <pc:docChg chg="modSld">
-      <pc:chgData name="Emma Strand" userId="S::emma.strand@gmgi.org::cb199c47-99d2-4351-a663-5c5d31f99371" providerId="AD" clId="Web-{993996CE-F763-CB30-21DC-7FA922D7FE85}" dt="2024-12-13T15:25:30.022" v="63" actId="20577"/>
-      <pc:docMkLst>
-        <pc:docMk/>
-      </pc:docMkLst>
-      <pc:sldChg chg="modSp">
-        <pc:chgData name="Emma Strand" userId="S::emma.strand@gmgi.org::cb199c47-99d2-4351-a663-5c5d31f99371" providerId="AD" clId="Web-{993996CE-F763-CB30-21DC-7FA922D7FE85}" dt="2024-12-13T15:25:30.022" v="63" actId="20577"/>
-        <pc:sldMkLst>
-          <pc:docMk/>
-          <pc:sldMk cId="2348175036" sldId="256"/>
-        </pc:sldMkLst>
-        <pc:spChg chg="mod">
-          <ac:chgData name="Emma Strand" userId="S::emma.strand@gmgi.org::cb199c47-99d2-4351-a663-5c5d31f99371" providerId="AD" clId="Web-{993996CE-F763-CB30-21DC-7FA922D7FE85}" dt="2024-12-13T15:25:30.022" v="63" actId="20577"/>
+        <pc:spChg chg="add del mod">
+          <ac:chgData name="Steve H. Yost" userId="9b5a6cf492109805" providerId="LiveId" clId="{1652D9ED-8F34-4469-AA6E-2BA2F557AC94}" dt="2025-01-17T15:41:59.852" v="335" actId="478"/>
           <ac:spMkLst>
             <pc:docMk/>
-            <pc:sldMk cId="2348175036" sldId="256"/>
-            <ac:spMk id="3" creationId="{3916E3E9-890A-7E7D-D977-FC0136269393}"/>
+            <pc:sldMk cId="1835731223" sldId="261"/>
+            <ac:spMk id="22" creationId="{67257C7A-1475-8BA1-6BDC-591D5A4FB73F}"/>
           </ac:spMkLst>
         </pc:spChg>
+        <pc:spChg chg="add del mod">
+          <ac:chgData name="Steve H. Yost" userId="9b5a6cf492109805" providerId="LiveId" clId="{1652D9ED-8F34-4469-AA6E-2BA2F557AC94}" dt="2025-01-17T15:05:42.953" v="249" actId="478"/>
+          <ac:spMkLst>
+            <pc:docMk/>
+            <pc:sldMk cId="1835731223" sldId="261"/>
+            <ac:spMk id="23" creationId="{20E02368-1E3F-5A59-D8F5-FD5E32226F93}"/>
+          </ac:spMkLst>
+        </pc:spChg>
+        <pc:spChg chg="add del mod">
+          <ac:chgData name="Steve H. Yost" userId="9b5a6cf492109805" providerId="LiveId" clId="{1652D9ED-8F34-4469-AA6E-2BA2F557AC94}" dt="2025-01-17T15:42:11.281" v="337" actId="478"/>
+          <ac:spMkLst>
+            <pc:docMk/>
+            <pc:sldMk cId="1835731223" sldId="261"/>
+            <ac:spMk id="24" creationId="{488CD53D-F774-F42E-9460-2428B5D971EB}"/>
+          </ac:spMkLst>
+        </pc:spChg>
+        <pc:cxnChg chg="add del mod">
+          <ac:chgData name="Steve H. Yost" userId="9b5a6cf492109805" providerId="LiveId" clId="{1652D9ED-8F34-4469-AA6E-2BA2F557AC94}" dt="2025-01-17T15:41:56.783" v="334" actId="478"/>
+          <ac:cxnSpMkLst>
+            <pc:docMk/>
+            <pc:sldMk cId="1835731223" sldId="261"/>
+            <ac:cxnSpMk id="13" creationId="{83E220EE-22EB-87FD-26F9-3C5318F405D8}"/>
+          </ac:cxnSpMkLst>
+        </pc:cxnChg>
       </pc:sldChg>
     </pc:docChg>
   </pc:docChgLst>
@@ -606,7 +349,7 @@
           <a:p>
             <a:fld id="{B39DB6D8-D897-47EB-B13C-F7D5E8B7745B}" type="datetimeFigureOut">
               <a:rPr lang="en-US" smtClean="0"/>
-              <a:t>1/16/2025</a:t>
+              <a:t>1/17/2025</a:t>
             </a:fld>
             <a:endParaRPr lang="en-US"/>
           </a:p>
@@ -804,7 +547,7 @@
           <a:p>
             <a:fld id="{B39DB6D8-D897-47EB-B13C-F7D5E8B7745B}" type="datetimeFigureOut">
               <a:rPr lang="en-US" smtClean="0"/>
-              <a:t>1/16/2025</a:t>
+              <a:t>1/17/2025</a:t>
             </a:fld>
             <a:endParaRPr lang="en-US"/>
           </a:p>
@@ -1012,7 +755,7 @@
           <a:p>
             <a:fld id="{B39DB6D8-D897-47EB-B13C-F7D5E8B7745B}" type="datetimeFigureOut">
               <a:rPr lang="en-US" smtClean="0"/>
-              <a:t>1/16/2025</a:t>
+              <a:t>1/17/2025</a:t>
             </a:fld>
             <a:endParaRPr lang="en-US"/>
           </a:p>
@@ -1210,7 +953,7 @@
           <a:p>
             <a:fld id="{B39DB6D8-D897-47EB-B13C-F7D5E8B7745B}" type="datetimeFigureOut">
               <a:rPr lang="en-US" smtClean="0"/>
-              <a:t>1/16/2025</a:t>
+              <a:t>1/17/2025</a:t>
             </a:fld>
             <a:endParaRPr lang="en-US"/>
           </a:p>
@@ -1485,7 +1228,7 @@
           <a:p>
             <a:fld id="{B39DB6D8-D897-47EB-B13C-F7D5E8B7745B}" type="datetimeFigureOut">
               <a:rPr lang="en-US" smtClean="0"/>
-              <a:t>1/16/2025</a:t>
+              <a:t>1/17/2025</a:t>
             </a:fld>
             <a:endParaRPr lang="en-US"/>
           </a:p>
@@ -1750,7 +1493,7 @@
           <a:p>
             <a:fld id="{B39DB6D8-D897-47EB-B13C-F7D5E8B7745B}" type="datetimeFigureOut">
               <a:rPr lang="en-US" smtClean="0"/>
-              <a:t>1/16/2025</a:t>
+              <a:t>1/17/2025</a:t>
             </a:fld>
             <a:endParaRPr lang="en-US"/>
           </a:p>
@@ -2162,7 +1905,7 @@
           <a:p>
             <a:fld id="{B39DB6D8-D897-47EB-B13C-F7D5E8B7745B}" type="datetimeFigureOut">
               <a:rPr lang="en-US" smtClean="0"/>
-              <a:t>1/16/2025</a:t>
+              <a:t>1/17/2025</a:t>
             </a:fld>
             <a:endParaRPr lang="en-US"/>
           </a:p>
@@ -2303,7 +2046,7 @@
           <a:p>
             <a:fld id="{B39DB6D8-D897-47EB-B13C-F7D5E8B7745B}" type="datetimeFigureOut">
               <a:rPr lang="en-US" smtClean="0"/>
-              <a:t>1/16/2025</a:t>
+              <a:t>1/17/2025</a:t>
             </a:fld>
             <a:endParaRPr lang="en-US"/>
           </a:p>
@@ -2416,7 +2159,7 @@
           <a:p>
             <a:fld id="{B39DB6D8-D897-47EB-B13C-F7D5E8B7745B}" type="datetimeFigureOut">
               <a:rPr lang="en-US" smtClean="0"/>
-              <a:t>1/16/2025</a:t>
+              <a:t>1/17/2025</a:t>
             </a:fld>
             <a:endParaRPr lang="en-US"/>
           </a:p>
@@ -2727,7 +2470,7 @@
           <a:p>
             <a:fld id="{B39DB6D8-D897-47EB-B13C-F7D5E8B7745B}" type="datetimeFigureOut">
               <a:rPr lang="en-US" smtClean="0"/>
-              <a:t>1/16/2025</a:t>
+              <a:t>1/17/2025</a:t>
             </a:fld>
             <a:endParaRPr lang="en-US"/>
           </a:p>
@@ -3015,7 +2758,7 @@
           <a:p>
             <a:fld id="{B39DB6D8-D897-47EB-B13C-F7D5E8B7745B}" type="datetimeFigureOut">
               <a:rPr lang="en-US" smtClean="0"/>
-              <a:t>1/16/2025</a:t>
+              <a:t>1/17/2025</a:t>
             </a:fld>
             <a:endParaRPr lang="en-US"/>
           </a:p>
@@ -3256,7 +2999,7 @@
           <a:p>
             <a:fld id="{B39DB6D8-D897-47EB-B13C-F7D5E8B7745B}" type="datetimeFigureOut">
               <a:rPr lang="en-US" smtClean="0"/>
-              <a:t>1/16/2025</a:t>
+              <a:t>1/17/2025</a:t>
             </a:fld>
             <a:endParaRPr lang="en-US"/>
           </a:p>
@@ -8256,7 +7999,7 @@
         </p:spPr>
         <p:txBody>
           <a:bodyPr vert="horz" lIns="91440" tIns="45720" rIns="91440" bIns="45720" rtlCol="0" anchor="ctr">
-            <a:normAutofit/>
+            <a:normAutofit fontScale="85000" lnSpcReduction="10000"/>
           </a:bodyPr>
           <a:lstStyle>
             <a:lvl1pPr algn="l" defTabSz="914400" rtl="0" eaLnBrk="1" latinLnBrk="0" hangingPunct="1">
@@ -8317,7 +8060,19 @@
           <a:p>
             <a:r>
               <a:rPr lang="en-US" sz="1800" dirty="0"/>
-              <a:t>Oyster origin: 1 year old from full sibling oyster family 286 from VIMS transported to USDA ARS NCWMAC in RI. Acclimated to lab conditions. </a:t>
+              <a:t>Oyster origin: 1 year old from full sibling oyster family 286 from VIMS transported to USDA ARS NCWMAC in RI. Acclimated to lab conditions. All exposed oysters (n = 56 per group) received a dose of 5 × </a:t>
+            </a:r>
+            <a:r>
+              <a:rPr lang="fi-FI" sz="1800" dirty="0"/>
+              <a:t>10</a:t>
+            </a:r>
+            <a:r>
+              <a:rPr lang="fi-FI" sz="1800" baseline="30000" dirty="0"/>
+              <a:t>6</a:t>
+            </a:r>
+            <a:r>
+              <a:rPr lang="en-US" sz="1800" dirty="0"/>
+              <a:t> cultured P. marinus cells. Group 2 were fed P. marinus; Group 3 were injected with P. marinus. At 6 h, 36 h, 7 d, and 28 d post-exposure, six live oysters per group were censored and mantle and digestive tissues preserved. For 3-5 per group, measured global gene expression. Throughout, moribund oystered were removed and sampled. At completion at 42 d, remaining oysters were sampled. Samples were sequenced in two batches (fall 2015 and 2017) and expression profiles covaried with batch.</a:t>
             </a:r>
           </a:p>
         </p:txBody>
@@ -8587,7 +8342,7 @@
         <p:spPr>
           <a:xfrm>
             <a:off x="1414249" y="5112988"/>
-            <a:ext cx="1193486" cy="738664"/>
+            <a:ext cx="1193486" cy="954107"/>
           </a:xfrm>
           <a:prstGeom prst="rect">
             <a:avLst/>
@@ -8613,7 +8368,7 @@
             <a:pPr algn="ctr"/>
             <a:r>
               <a:rPr lang="en-US" sz="1400" dirty="0"/>
-              <a:t>5 x 10</a:t>
+              <a:t>Injected 5 x 10</a:t>
             </a:r>
             <a:r>
               <a:rPr lang="en-US" sz="1400" baseline="30000" dirty="0"/>
@@ -9122,7 +8877,7 @@
         <p:spPr>
           <a:xfrm>
             <a:off x="3158032" y="3526240"/>
-            <a:ext cx="1864527" cy="307777"/>
+            <a:ext cx="2671843" cy="307777"/>
           </a:xfrm>
           <a:prstGeom prst="rect">
             <a:avLst/>
@@ -9140,12 +8895,9 @@
           <a:p>
             <a:r>
               <a:rPr lang="en-US" sz="1400" dirty="0"/>
-              <a:t>n=6 timepoint</a:t>
-            </a:r>
-            <a:r>
-              <a:rPr lang="en-US" sz="1400" baseline="30000" dirty="0"/>
-              <a:t>-1</a:t>
-            </a:r>
+              <a:t>n=3-5 per group per timepoint</a:t>
+            </a:r>
+            <a:endParaRPr lang="en-US" sz="1400" baseline="30000" dirty="0"/>
           </a:p>
         </p:txBody>
       </p:sp>

</xml_diff>

<commit_message>
adding dataset #5 to analysis ideas ppt
</commit_message>
<xml_diff>
--- a/analysis_ideas.pptx
+++ b/analysis_ideas.pptx
@@ -11,6 +11,7 @@
     <p:sldId id="259" r:id="rId5"/>
     <p:sldId id="260" r:id="rId6"/>
     <p:sldId id="261" r:id="rId7"/>
+    <p:sldId id="262" r:id="rId8"/>
   </p:sldIdLst>
   <p:sldSz cx="12192000" cy="6858000"/>
   <p:notesSz cx="6858000" cy="9144000"/>
@@ -349,7 +350,7 @@
           <a:p>
             <a:fld id="{B39DB6D8-D897-47EB-B13C-F7D5E8B7745B}" type="datetimeFigureOut">
               <a:rPr lang="en-US" smtClean="0"/>
-              <a:t>1/17/2025</a:t>
+              <a:t>1/28/2025</a:t>
             </a:fld>
             <a:endParaRPr lang="en-US"/>
           </a:p>
@@ -547,7 +548,7 @@
           <a:p>
             <a:fld id="{B39DB6D8-D897-47EB-B13C-F7D5E8B7745B}" type="datetimeFigureOut">
               <a:rPr lang="en-US" smtClean="0"/>
-              <a:t>1/17/2025</a:t>
+              <a:t>1/28/2025</a:t>
             </a:fld>
             <a:endParaRPr lang="en-US"/>
           </a:p>
@@ -755,7 +756,7 @@
           <a:p>
             <a:fld id="{B39DB6D8-D897-47EB-B13C-F7D5E8B7745B}" type="datetimeFigureOut">
               <a:rPr lang="en-US" smtClean="0"/>
-              <a:t>1/17/2025</a:t>
+              <a:t>1/28/2025</a:t>
             </a:fld>
             <a:endParaRPr lang="en-US"/>
           </a:p>
@@ -953,7 +954,7 @@
           <a:p>
             <a:fld id="{B39DB6D8-D897-47EB-B13C-F7D5E8B7745B}" type="datetimeFigureOut">
               <a:rPr lang="en-US" smtClean="0"/>
-              <a:t>1/17/2025</a:t>
+              <a:t>1/28/2025</a:t>
             </a:fld>
             <a:endParaRPr lang="en-US"/>
           </a:p>
@@ -1228,7 +1229,7 @@
           <a:p>
             <a:fld id="{B39DB6D8-D897-47EB-B13C-F7D5E8B7745B}" type="datetimeFigureOut">
               <a:rPr lang="en-US" smtClean="0"/>
-              <a:t>1/17/2025</a:t>
+              <a:t>1/28/2025</a:t>
             </a:fld>
             <a:endParaRPr lang="en-US"/>
           </a:p>
@@ -1493,7 +1494,7 @@
           <a:p>
             <a:fld id="{B39DB6D8-D897-47EB-B13C-F7D5E8B7745B}" type="datetimeFigureOut">
               <a:rPr lang="en-US" smtClean="0"/>
-              <a:t>1/17/2025</a:t>
+              <a:t>1/28/2025</a:t>
             </a:fld>
             <a:endParaRPr lang="en-US"/>
           </a:p>
@@ -1905,7 +1906,7 @@
           <a:p>
             <a:fld id="{B39DB6D8-D897-47EB-B13C-F7D5E8B7745B}" type="datetimeFigureOut">
               <a:rPr lang="en-US" smtClean="0"/>
-              <a:t>1/17/2025</a:t>
+              <a:t>1/28/2025</a:t>
             </a:fld>
             <a:endParaRPr lang="en-US"/>
           </a:p>
@@ -2046,7 +2047,7 @@
           <a:p>
             <a:fld id="{B39DB6D8-D897-47EB-B13C-F7D5E8B7745B}" type="datetimeFigureOut">
               <a:rPr lang="en-US" smtClean="0"/>
-              <a:t>1/17/2025</a:t>
+              <a:t>1/28/2025</a:t>
             </a:fld>
             <a:endParaRPr lang="en-US"/>
           </a:p>
@@ -2159,7 +2160,7 @@
           <a:p>
             <a:fld id="{B39DB6D8-D897-47EB-B13C-F7D5E8B7745B}" type="datetimeFigureOut">
               <a:rPr lang="en-US" smtClean="0"/>
-              <a:t>1/17/2025</a:t>
+              <a:t>1/28/2025</a:t>
             </a:fld>
             <a:endParaRPr lang="en-US"/>
           </a:p>
@@ -2470,7 +2471,7 @@
           <a:p>
             <a:fld id="{B39DB6D8-D897-47EB-B13C-F7D5E8B7745B}" type="datetimeFigureOut">
               <a:rPr lang="en-US" smtClean="0"/>
-              <a:t>1/17/2025</a:t>
+              <a:t>1/28/2025</a:t>
             </a:fld>
             <a:endParaRPr lang="en-US"/>
           </a:p>
@@ -2758,7 +2759,7 @@
           <a:p>
             <a:fld id="{B39DB6D8-D897-47EB-B13C-F7D5E8B7745B}" type="datetimeFigureOut">
               <a:rPr lang="en-US" smtClean="0"/>
-              <a:t>1/17/2025</a:t>
+              <a:t>1/28/2025</a:t>
             </a:fld>
             <a:endParaRPr lang="en-US"/>
           </a:p>
@@ -2999,7 +3000,7 @@
           <a:p>
             <a:fld id="{B39DB6D8-D897-47EB-B13C-F7D5E8B7745B}" type="datetimeFigureOut">
               <a:rPr lang="en-US" smtClean="0"/>
-              <a:t>1/17/2025</a:t>
+              <a:t>1/28/2025</a:t>
             </a:fld>
             <a:endParaRPr lang="en-US"/>
           </a:p>
@@ -8905,6 +8906,979 @@
     <p:extLst>
       <p:ext uri="{BB962C8B-B14F-4D97-AF65-F5344CB8AC3E}">
         <p14:creationId xmlns:p14="http://schemas.microsoft.com/office/powerpoint/2010/main" val="1835731223"/>
+      </p:ext>
+    </p:extLst>
+  </p:cSld>
+  <p:clrMapOvr>
+    <a:masterClrMapping/>
+  </p:clrMapOvr>
+</p:sld>
+</file>
+
+<file path=ppt/slides/slide7.xml><?xml version="1.0" encoding="utf-8"?>
+<p:sld xmlns:a="http://schemas.openxmlformats.org/drawingml/2006/main" xmlns:r="http://schemas.openxmlformats.org/officeDocument/2006/relationships" xmlns:p="http://schemas.openxmlformats.org/presentationml/2006/main">
+  <p:cSld>
+    <p:spTree>
+      <p:nvGrpSpPr>
+        <p:cNvPr id="1" name="">
+          <a:extLst>
+            <a:ext uri="{FF2B5EF4-FFF2-40B4-BE49-F238E27FC236}">
+              <a16:creationId xmlns:a16="http://schemas.microsoft.com/office/drawing/2014/main" id="{FA89AB57-A7B6-24A6-6B09-01F41D400749}"/>
+            </a:ext>
+          </a:extLst>
+        </p:cNvPr>
+        <p:cNvGrpSpPr/>
+        <p:nvPr/>
+      </p:nvGrpSpPr>
+      <p:grpSpPr>
+        <a:xfrm>
+          <a:off x="0" y="0"/>
+          <a:ext cx="0" cy="0"/>
+          <a:chOff x="0" y="0"/>
+          <a:chExt cx="0" cy="0"/>
+        </a:xfrm>
+      </p:grpSpPr>
+      <p:sp>
+        <p:nvSpPr>
+          <p:cNvPr id="4" name="Title 1">
+            <a:extLst>
+              <a:ext uri="{FF2B5EF4-FFF2-40B4-BE49-F238E27FC236}">
+                <a16:creationId xmlns:a16="http://schemas.microsoft.com/office/drawing/2014/main" id="{F2DF2575-6501-10AB-1046-70C39217E837}"/>
+              </a:ext>
+            </a:extLst>
+          </p:cNvPr>
+          <p:cNvSpPr>
+            <a:spLocks noGrp="1"/>
+          </p:cNvSpPr>
+          <p:nvPr>
+            <p:ph type="title"/>
+          </p:nvPr>
+        </p:nvSpPr>
+        <p:spPr>
+          <a:xfrm>
+            <a:off x="186267" y="187324"/>
+            <a:ext cx="10515600" cy="540809"/>
+          </a:xfrm>
+        </p:spPr>
+        <p:txBody>
+          <a:bodyPr>
+            <a:normAutofit/>
+          </a:bodyPr>
+          <a:lstStyle/>
+          <a:p>
+            <a:r>
+              <a:rPr lang="en-US" sz="3000" dirty="0"/>
+              <a:t>Disease dataset set #5: </a:t>
+            </a:r>
+            <a:r>
+              <a:rPr lang="en-US" sz="3000" dirty="0" err="1"/>
+              <a:t>Proestou</a:t>
+            </a:r>
+            <a:r>
+              <a:rPr lang="en-US" sz="3000" dirty="0"/>
+              <a:t> and Sullivan 2020</a:t>
+            </a:r>
+          </a:p>
+        </p:txBody>
+      </p:sp>
+      <p:sp>
+        <p:nvSpPr>
+          <p:cNvPr id="2" name="Title 1">
+            <a:extLst>
+              <a:ext uri="{FF2B5EF4-FFF2-40B4-BE49-F238E27FC236}">
+                <a16:creationId xmlns:a16="http://schemas.microsoft.com/office/drawing/2014/main" id="{F2D8C66F-5FDC-35C5-EE17-EBF109EF7C39}"/>
+              </a:ext>
+            </a:extLst>
+          </p:cNvPr>
+          <p:cNvSpPr txBox="1">
+            <a:spLocks/>
+          </p:cNvSpPr>
+          <p:nvPr/>
+        </p:nvSpPr>
+        <p:spPr>
+          <a:xfrm>
+            <a:off x="254000" y="788456"/>
+            <a:ext cx="11836400" cy="2640544"/>
+          </a:xfrm>
+          <a:prstGeom prst="rect">
+            <a:avLst/>
+          </a:prstGeom>
+        </p:spPr>
+        <p:txBody>
+          <a:bodyPr vert="horz" lIns="91440" tIns="45720" rIns="91440" bIns="45720" rtlCol="0" anchor="ctr">
+            <a:normAutofit/>
+          </a:bodyPr>
+          <a:lstStyle>
+            <a:lvl1pPr algn="l" defTabSz="914400" rtl="0" eaLnBrk="1" latinLnBrk="0" hangingPunct="1">
+              <a:lnSpc>
+                <a:spcPct val="90000"/>
+              </a:lnSpc>
+              <a:spcBef>
+                <a:spcPct val="0"/>
+              </a:spcBef>
+              <a:buNone/>
+              <a:defRPr sz="4400" kern="1200">
+                <a:solidFill>
+                  <a:schemeClr val="tx1"/>
+                </a:solidFill>
+                <a:latin typeface="+mj-lt"/>
+                <a:ea typeface="+mj-ea"/>
+                <a:cs typeface="+mj-cs"/>
+              </a:defRPr>
+            </a:lvl1pPr>
+          </a:lstStyle>
+          <a:p>
+            <a:r>
+              <a:rPr lang="en-US" sz="1600" dirty="0"/>
+              <a:t>Variation in global transcriptomic response to </a:t>
+            </a:r>
+            <a:r>
+              <a:rPr lang="en-US" sz="1600" dirty="0" err="1"/>
+              <a:t>Perkinsus</a:t>
+            </a:r>
+            <a:r>
+              <a:rPr lang="en-US" sz="1600" dirty="0"/>
+              <a:t> marinus infection among eastern oyster families highlights potential mechanisms of disease resistance</a:t>
+            </a:r>
+          </a:p>
+          <a:p>
+            <a:r>
+              <a:rPr lang="en-US" sz="1600" dirty="0"/>
+              <a:t>link: </a:t>
+            </a:r>
+            <a:r>
+              <a:rPr lang="en-US" sz="1600" dirty="0">
+                <a:hlinkClick r:id="rId2"/>
+              </a:rPr>
+              <a:t>https://www.sciencedirect.com/science/article/pii/S1050464819311295?via=ihub#appsec1</a:t>
+            </a:r>
+            <a:r>
+              <a:rPr lang="en-US" sz="1600" dirty="0"/>
+              <a:t> </a:t>
+            </a:r>
+          </a:p>
+          <a:p>
+            <a:endParaRPr lang="en-US" sz="1600" dirty="0"/>
+          </a:p>
+          <a:p>
+            <a:r>
+              <a:rPr lang="en-US" sz="1600" dirty="0"/>
+              <a:t>Oyster origin: full sibling oyster families from the Aquaculture Genetics &amp; Breeding Technology Center's (ABC) selective breeding program were challenged with either 5 × 10</a:t>
+            </a:r>
+            <a:r>
+              <a:rPr lang="en-US" sz="1600" baseline="30000" dirty="0"/>
+              <a:t>6</a:t>
+            </a:r>
+            <a:r>
+              <a:rPr lang="en-US" sz="1600" dirty="0"/>
+              <a:t> P. marinus cells g</a:t>
+            </a:r>
+            <a:r>
+              <a:rPr lang="en-US" sz="1600" baseline="30000" dirty="0"/>
+              <a:t>−1</a:t>
+            </a:r>
+            <a:r>
+              <a:rPr lang="en-US" sz="1600" dirty="0"/>
+              <a:t> wet tissue weight (injected treatment) or artificial seawater (control treatment) via injection in adductor muscle tissue </a:t>
+            </a:r>
+          </a:p>
+          <a:p>
+            <a:endParaRPr lang="en-US" sz="1600" dirty="0"/>
+          </a:p>
+          <a:p>
+            <a:r>
+              <a:rPr lang="en-US" sz="1600" dirty="0"/>
+              <a:t>gene expression analysis focused on mantle tissues collected from two families identified as susceptible (low survival and low parasite elimination rate, family 242) and resistant (high survival and moderate parasite elimination rate, family 266) to </a:t>
+            </a:r>
+            <a:r>
+              <a:rPr lang="en-US" sz="1600" i="1" dirty="0"/>
+              <a:t>P. marinus </a:t>
+            </a:r>
+            <a:r>
+              <a:rPr lang="en-US" sz="1600" dirty="0"/>
+              <a:t>infection in the laboratory disease challenge</a:t>
+            </a:r>
+          </a:p>
+        </p:txBody>
+      </p:sp>
+      <p:pic>
+        <p:nvPicPr>
+          <p:cNvPr id="23" name="Picture 22" descr="Oyster Graphic">
+            <a:extLst>
+              <a:ext uri="{FF2B5EF4-FFF2-40B4-BE49-F238E27FC236}">
+                <a16:creationId xmlns:a16="http://schemas.microsoft.com/office/drawing/2014/main" id="{5C663024-4666-6A4A-16B0-6E85DC034309}"/>
+              </a:ext>
+            </a:extLst>
+          </p:cNvPr>
+          <p:cNvPicPr>
+            <a:picLocks noChangeAspect="1" noChangeArrowheads="1"/>
+          </p:cNvPicPr>
+          <p:nvPr/>
+        </p:nvPicPr>
+        <p:blipFill>
+          <a:blip r:embed="rId3">
+            <a:extLst>
+              <a:ext uri="{28A0092B-C50C-407E-A947-70E740481C1C}">
+                <a14:useLocalDpi xmlns:a14="http://schemas.microsoft.com/office/drawing/2010/main" val="0"/>
+              </a:ext>
+            </a:extLst>
+          </a:blip>
+          <a:srcRect/>
+          <a:stretch>
+            <a:fillRect/>
+          </a:stretch>
+        </p:blipFill>
+        <p:spPr bwMode="auto">
+          <a:xfrm>
+            <a:off x="707474" y="4200696"/>
+            <a:ext cx="779679" cy="779679"/>
+          </a:xfrm>
+          <a:prstGeom prst="rect">
+            <a:avLst/>
+          </a:prstGeom>
+          <a:noFill/>
+          <a:extLst>
+            <a:ext uri="{909E8E84-426E-40DD-AFC4-6F175D3DCCD1}">
+              <a14:hiddenFill xmlns:a14="http://schemas.microsoft.com/office/drawing/2010/main">
+                <a:solidFill>
+                  <a:srgbClr val="FFFFFF"/>
+                </a:solidFill>
+              </a14:hiddenFill>
+            </a:ext>
+          </a:extLst>
+        </p:spPr>
+      </p:pic>
+      <p:sp>
+        <p:nvSpPr>
+          <p:cNvPr id="24" name="TextBox 23">
+            <a:extLst>
+              <a:ext uri="{FF2B5EF4-FFF2-40B4-BE49-F238E27FC236}">
+                <a16:creationId xmlns:a16="http://schemas.microsoft.com/office/drawing/2014/main" id="{3C00A945-8BC1-6A9F-4380-A86C0EC70160}"/>
+              </a:ext>
+            </a:extLst>
+          </p:cNvPr>
+          <p:cNvSpPr txBox="1"/>
+          <p:nvPr/>
+        </p:nvSpPr>
+        <p:spPr>
+          <a:xfrm>
+            <a:off x="1423651" y="4231799"/>
+            <a:ext cx="1193486" cy="523220"/>
+          </a:xfrm>
+          <a:prstGeom prst="rect">
+            <a:avLst/>
+          </a:prstGeom>
+          <a:noFill/>
+          <a:ln w="28575">
+            <a:noFill/>
+          </a:ln>
+        </p:spPr>
+        <p:txBody>
+          <a:bodyPr wrap="square" rtlCol="0">
+            <a:spAutoFit/>
+          </a:bodyPr>
+          <a:lstStyle/>
+          <a:p>
+            <a:pPr algn="ctr"/>
+            <a:r>
+              <a:rPr lang="en-US" sz="1400" dirty="0"/>
+              <a:t>Family 242</a:t>
+            </a:r>
+          </a:p>
+          <a:p>
+            <a:pPr algn="ctr"/>
+            <a:r>
+              <a:rPr lang="fi-FI" sz="1400" i="1" dirty="0"/>
+              <a:t>susceptible</a:t>
+            </a:r>
+            <a:endParaRPr lang="en-US" sz="1400" dirty="0"/>
+          </a:p>
+        </p:txBody>
+      </p:sp>
+      <p:cxnSp>
+        <p:nvCxnSpPr>
+          <p:cNvPr id="25" name="Straight Arrow Connector 24">
+            <a:extLst>
+              <a:ext uri="{FF2B5EF4-FFF2-40B4-BE49-F238E27FC236}">
+                <a16:creationId xmlns:a16="http://schemas.microsoft.com/office/drawing/2014/main" id="{E7439F40-1FCA-78EB-9F13-B9C8CD706ED9}"/>
+              </a:ext>
+            </a:extLst>
+          </p:cNvPr>
+          <p:cNvCxnSpPr>
+            <a:cxnSpLocks/>
+          </p:cNvCxnSpPr>
+          <p:nvPr/>
+        </p:nvCxnSpPr>
+        <p:spPr>
+          <a:xfrm>
+            <a:off x="7436298" y="5023355"/>
+            <a:ext cx="3276600" cy="0"/>
+          </a:xfrm>
+          <a:prstGeom prst="straightConnector1">
+            <a:avLst/>
+          </a:prstGeom>
+          <a:ln>
+            <a:tailEnd type="triangle"/>
+          </a:ln>
+        </p:spPr>
+        <p:style>
+          <a:lnRef idx="2">
+            <a:schemeClr val="dk1"/>
+          </a:lnRef>
+          <a:fillRef idx="0">
+            <a:schemeClr val="dk1"/>
+          </a:fillRef>
+          <a:effectRef idx="1">
+            <a:schemeClr val="dk1"/>
+          </a:effectRef>
+          <a:fontRef idx="minor">
+            <a:schemeClr val="tx1"/>
+          </a:fontRef>
+        </p:style>
+      </p:cxnSp>
+      <p:sp>
+        <p:nvSpPr>
+          <p:cNvPr id="27" name="TextBox 26">
+            <a:extLst>
+              <a:ext uri="{FF2B5EF4-FFF2-40B4-BE49-F238E27FC236}">
+                <a16:creationId xmlns:a16="http://schemas.microsoft.com/office/drawing/2014/main" id="{9B738EB1-97D4-EE47-9F2F-A32312D5C745}"/>
+              </a:ext>
+            </a:extLst>
+          </p:cNvPr>
+          <p:cNvSpPr txBox="1"/>
+          <p:nvPr/>
+        </p:nvSpPr>
+        <p:spPr>
+          <a:xfrm>
+            <a:off x="7646836" y="4516439"/>
+            <a:ext cx="1193486" cy="307777"/>
+          </a:xfrm>
+          <a:prstGeom prst="rect">
+            <a:avLst/>
+          </a:prstGeom>
+          <a:noFill/>
+          <a:ln w="28575">
+            <a:noFill/>
+          </a:ln>
+        </p:spPr>
+        <p:txBody>
+          <a:bodyPr wrap="square" rtlCol="0">
+            <a:spAutoFit/>
+          </a:bodyPr>
+          <a:lstStyle/>
+          <a:p>
+            <a:pPr algn="ctr"/>
+            <a:r>
+              <a:rPr lang="en-US" sz="1400" dirty="0"/>
+              <a:t>36 h</a:t>
+            </a:r>
+          </a:p>
+        </p:txBody>
+      </p:sp>
+      <p:sp>
+        <p:nvSpPr>
+          <p:cNvPr id="28" name="Oval 27">
+            <a:extLst>
+              <a:ext uri="{FF2B5EF4-FFF2-40B4-BE49-F238E27FC236}">
+                <a16:creationId xmlns:a16="http://schemas.microsoft.com/office/drawing/2014/main" id="{C70D79BD-B42C-EFD3-6E6E-1B09BE87CC52}"/>
+              </a:ext>
+            </a:extLst>
+          </p:cNvPr>
+          <p:cNvSpPr/>
+          <p:nvPr/>
+        </p:nvSpPr>
+        <p:spPr>
+          <a:xfrm>
+            <a:off x="8180080" y="4959855"/>
+            <a:ext cx="126999" cy="126999"/>
+          </a:xfrm>
+          <a:prstGeom prst="ellipse">
+            <a:avLst/>
+          </a:prstGeom>
+          <a:solidFill>
+            <a:schemeClr val="tx1">
+              <a:lumMod val="50000"/>
+              <a:lumOff val="50000"/>
+            </a:schemeClr>
+          </a:solidFill>
+          <a:ln>
+            <a:solidFill>
+              <a:schemeClr val="tx1">
+                <a:lumMod val="50000"/>
+                <a:lumOff val="50000"/>
+              </a:schemeClr>
+            </a:solidFill>
+          </a:ln>
+        </p:spPr>
+        <p:style>
+          <a:lnRef idx="2">
+            <a:schemeClr val="accent1">
+              <a:shade val="15000"/>
+            </a:schemeClr>
+          </a:lnRef>
+          <a:fillRef idx="1">
+            <a:schemeClr val="accent1"/>
+          </a:fillRef>
+          <a:effectRef idx="0">
+            <a:schemeClr val="accent1"/>
+          </a:effectRef>
+          <a:fontRef idx="minor">
+            <a:schemeClr val="lt1"/>
+          </a:fontRef>
+        </p:style>
+        <p:txBody>
+          <a:bodyPr rtlCol="0" anchor="ctr"/>
+          <a:lstStyle/>
+          <a:p>
+            <a:pPr algn="ctr"/>
+            <a:endParaRPr lang="en-US"/>
+          </a:p>
+        </p:txBody>
+      </p:sp>
+      <p:sp>
+        <p:nvSpPr>
+          <p:cNvPr id="29" name="TextBox 28">
+            <a:extLst>
+              <a:ext uri="{FF2B5EF4-FFF2-40B4-BE49-F238E27FC236}">
+                <a16:creationId xmlns:a16="http://schemas.microsoft.com/office/drawing/2014/main" id="{8FC2E54E-1B59-9F70-F276-34BC89FB15A8}"/>
+              </a:ext>
+            </a:extLst>
+          </p:cNvPr>
+          <p:cNvSpPr txBox="1"/>
+          <p:nvPr/>
+        </p:nvSpPr>
+        <p:spPr>
+          <a:xfrm>
+            <a:off x="8435434" y="4516439"/>
+            <a:ext cx="1193486" cy="307777"/>
+          </a:xfrm>
+          <a:prstGeom prst="rect">
+            <a:avLst/>
+          </a:prstGeom>
+          <a:noFill/>
+          <a:ln w="28575">
+            <a:noFill/>
+          </a:ln>
+        </p:spPr>
+        <p:txBody>
+          <a:bodyPr wrap="square" rtlCol="0">
+            <a:spAutoFit/>
+          </a:bodyPr>
+          <a:lstStyle/>
+          <a:p>
+            <a:pPr algn="ctr"/>
+            <a:r>
+              <a:rPr lang="en-US" sz="1400" dirty="0"/>
+              <a:t>7 d</a:t>
+            </a:r>
+          </a:p>
+        </p:txBody>
+      </p:sp>
+      <p:sp>
+        <p:nvSpPr>
+          <p:cNvPr id="30" name="Oval 29">
+            <a:extLst>
+              <a:ext uri="{FF2B5EF4-FFF2-40B4-BE49-F238E27FC236}">
+                <a16:creationId xmlns:a16="http://schemas.microsoft.com/office/drawing/2014/main" id="{E7F60429-B0D9-9663-A16D-0DFD1C90EC77}"/>
+              </a:ext>
+            </a:extLst>
+          </p:cNvPr>
+          <p:cNvSpPr/>
+          <p:nvPr/>
+        </p:nvSpPr>
+        <p:spPr>
+          <a:xfrm>
+            <a:off x="8968678" y="4959855"/>
+            <a:ext cx="126999" cy="126999"/>
+          </a:xfrm>
+          <a:prstGeom prst="ellipse">
+            <a:avLst/>
+          </a:prstGeom>
+          <a:solidFill>
+            <a:schemeClr val="tx1">
+              <a:lumMod val="50000"/>
+              <a:lumOff val="50000"/>
+            </a:schemeClr>
+          </a:solidFill>
+          <a:ln>
+            <a:solidFill>
+              <a:schemeClr val="tx1">
+                <a:lumMod val="50000"/>
+                <a:lumOff val="50000"/>
+              </a:schemeClr>
+            </a:solidFill>
+          </a:ln>
+        </p:spPr>
+        <p:style>
+          <a:lnRef idx="2">
+            <a:schemeClr val="accent1">
+              <a:shade val="15000"/>
+            </a:schemeClr>
+          </a:lnRef>
+          <a:fillRef idx="1">
+            <a:schemeClr val="accent1"/>
+          </a:fillRef>
+          <a:effectRef idx="0">
+            <a:schemeClr val="accent1"/>
+          </a:effectRef>
+          <a:fontRef idx="minor">
+            <a:schemeClr val="lt1"/>
+          </a:fontRef>
+        </p:style>
+        <p:txBody>
+          <a:bodyPr rtlCol="0" anchor="ctr"/>
+          <a:lstStyle/>
+          <a:p>
+            <a:pPr algn="ctr"/>
+            <a:endParaRPr lang="en-US"/>
+          </a:p>
+        </p:txBody>
+      </p:sp>
+      <p:sp>
+        <p:nvSpPr>
+          <p:cNvPr id="31" name="TextBox 30">
+            <a:extLst>
+              <a:ext uri="{FF2B5EF4-FFF2-40B4-BE49-F238E27FC236}">
+                <a16:creationId xmlns:a16="http://schemas.microsoft.com/office/drawing/2014/main" id="{362B0692-6D65-4DEE-2B1B-101211674D69}"/>
+              </a:ext>
+            </a:extLst>
+          </p:cNvPr>
+          <p:cNvSpPr txBox="1"/>
+          <p:nvPr/>
+        </p:nvSpPr>
+        <p:spPr>
+          <a:xfrm>
+            <a:off x="9574863" y="4516439"/>
+            <a:ext cx="1193486" cy="307777"/>
+          </a:xfrm>
+          <a:prstGeom prst="rect">
+            <a:avLst/>
+          </a:prstGeom>
+          <a:noFill/>
+          <a:ln w="28575">
+            <a:noFill/>
+          </a:ln>
+        </p:spPr>
+        <p:txBody>
+          <a:bodyPr wrap="square" rtlCol="0">
+            <a:spAutoFit/>
+          </a:bodyPr>
+          <a:lstStyle/>
+          <a:p>
+            <a:pPr algn="ctr"/>
+            <a:r>
+              <a:rPr lang="en-US" sz="1400" dirty="0"/>
+              <a:t>28 d</a:t>
+            </a:r>
+          </a:p>
+        </p:txBody>
+      </p:sp>
+      <p:sp>
+        <p:nvSpPr>
+          <p:cNvPr id="32" name="Oval 31">
+            <a:extLst>
+              <a:ext uri="{FF2B5EF4-FFF2-40B4-BE49-F238E27FC236}">
+                <a16:creationId xmlns:a16="http://schemas.microsoft.com/office/drawing/2014/main" id="{21C60642-2148-80BD-1224-75BD76935C74}"/>
+              </a:ext>
+            </a:extLst>
+          </p:cNvPr>
+          <p:cNvSpPr/>
+          <p:nvPr/>
+        </p:nvSpPr>
+        <p:spPr>
+          <a:xfrm>
+            <a:off x="10108107" y="4959855"/>
+            <a:ext cx="126999" cy="126999"/>
+          </a:xfrm>
+          <a:prstGeom prst="ellipse">
+            <a:avLst/>
+          </a:prstGeom>
+          <a:solidFill>
+            <a:schemeClr val="tx1">
+              <a:lumMod val="50000"/>
+              <a:lumOff val="50000"/>
+            </a:schemeClr>
+          </a:solidFill>
+          <a:ln>
+            <a:solidFill>
+              <a:schemeClr val="tx1">
+                <a:lumMod val="50000"/>
+                <a:lumOff val="50000"/>
+              </a:schemeClr>
+            </a:solidFill>
+          </a:ln>
+        </p:spPr>
+        <p:style>
+          <a:lnRef idx="2">
+            <a:schemeClr val="accent1">
+              <a:shade val="15000"/>
+            </a:schemeClr>
+          </a:lnRef>
+          <a:fillRef idx="1">
+            <a:schemeClr val="accent1"/>
+          </a:fillRef>
+          <a:effectRef idx="0">
+            <a:schemeClr val="accent1"/>
+          </a:effectRef>
+          <a:fontRef idx="minor">
+            <a:schemeClr val="lt1"/>
+          </a:fontRef>
+        </p:style>
+        <p:txBody>
+          <a:bodyPr rtlCol="0" anchor="ctr"/>
+          <a:lstStyle/>
+          <a:p>
+            <a:pPr algn="ctr"/>
+            <a:endParaRPr lang="en-US"/>
+          </a:p>
+        </p:txBody>
+      </p:sp>
+      <p:sp>
+        <p:nvSpPr>
+          <p:cNvPr id="33" name="TextBox 32">
+            <a:extLst>
+              <a:ext uri="{FF2B5EF4-FFF2-40B4-BE49-F238E27FC236}">
+                <a16:creationId xmlns:a16="http://schemas.microsoft.com/office/drawing/2014/main" id="{0DDB7621-955B-472B-9EFD-3D860CB58BDB}"/>
+              </a:ext>
+            </a:extLst>
+          </p:cNvPr>
+          <p:cNvSpPr txBox="1"/>
+          <p:nvPr/>
+        </p:nvSpPr>
+        <p:spPr>
+          <a:xfrm>
+            <a:off x="7563263" y="3857580"/>
+            <a:ext cx="2671843" cy="523220"/>
+          </a:xfrm>
+          <a:prstGeom prst="rect">
+            <a:avLst/>
+          </a:prstGeom>
+          <a:noFill/>
+          <a:ln w="28575">
+            <a:noFill/>
+          </a:ln>
+        </p:spPr>
+        <p:txBody>
+          <a:bodyPr wrap="square" rtlCol="0">
+            <a:spAutoFit/>
+          </a:bodyPr>
+          <a:lstStyle/>
+          <a:p>
+            <a:r>
+              <a:rPr lang="en-US" sz="1400" dirty="0"/>
+              <a:t>n=62 total</a:t>
+            </a:r>
+          </a:p>
+          <a:p>
+            <a:r>
+              <a:rPr lang="en-US" sz="1400" dirty="0"/>
+              <a:t>Min n=5 per family per timepoint</a:t>
+            </a:r>
+            <a:endParaRPr lang="en-US" sz="1400" baseline="30000" dirty="0"/>
+          </a:p>
+        </p:txBody>
+      </p:sp>
+      <p:pic>
+        <p:nvPicPr>
+          <p:cNvPr id="35" name="Picture 34" descr="Oyster Graphic">
+            <a:extLst>
+              <a:ext uri="{FF2B5EF4-FFF2-40B4-BE49-F238E27FC236}">
+                <a16:creationId xmlns:a16="http://schemas.microsoft.com/office/drawing/2014/main" id="{F99C66E5-7150-29B2-B680-A74E9E5CB919}"/>
+              </a:ext>
+            </a:extLst>
+          </p:cNvPr>
+          <p:cNvPicPr>
+            <a:picLocks noChangeAspect="1" noChangeArrowheads="1"/>
+          </p:cNvPicPr>
+          <p:nvPr/>
+        </p:nvPicPr>
+        <p:blipFill>
+          <a:blip r:embed="rId3">
+            <a:extLst>
+              <a:ext uri="{28A0092B-C50C-407E-A947-70E740481C1C}">
+                <a14:useLocalDpi xmlns:a14="http://schemas.microsoft.com/office/drawing/2010/main" val="0"/>
+              </a:ext>
+            </a:extLst>
+          </a:blip>
+          <a:srcRect/>
+          <a:stretch>
+            <a:fillRect/>
+          </a:stretch>
+        </p:blipFill>
+        <p:spPr bwMode="auto">
+          <a:xfrm>
+            <a:off x="707474" y="5077501"/>
+            <a:ext cx="779679" cy="779679"/>
+          </a:xfrm>
+          <a:prstGeom prst="rect">
+            <a:avLst/>
+          </a:prstGeom>
+          <a:noFill/>
+          <a:extLst>
+            <a:ext uri="{909E8E84-426E-40DD-AFC4-6F175D3DCCD1}">
+              <a14:hiddenFill xmlns:a14="http://schemas.microsoft.com/office/drawing/2010/main">
+                <a:solidFill>
+                  <a:srgbClr val="FFFFFF"/>
+                </a:solidFill>
+              </a14:hiddenFill>
+            </a:ext>
+          </a:extLst>
+        </p:spPr>
+      </p:pic>
+      <p:sp>
+        <p:nvSpPr>
+          <p:cNvPr id="36" name="TextBox 35">
+            <a:extLst>
+              <a:ext uri="{FF2B5EF4-FFF2-40B4-BE49-F238E27FC236}">
+                <a16:creationId xmlns:a16="http://schemas.microsoft.com/office/drawing/2014/main" id="{F59F6757-571C-0706-A492-7259B89F0E93}"/>
+              </a:ext>
+            </a:extLst>
+          </p:cNvPr>
+          <p:cNvSpPr txBox="1"/>
+          <p:nvPr/>
+        </p:nvSpPr>
+        <p:spPr>
+          <a:xfrm>
+            <a:off x="1423651" y="5108604"/>
+            <a:ext cx="1193486" cy="523220"/>
+          </a:xfrm>
+          <a:prstGeom prst="rect">
+            <a:avLst/>
+          </a:prstGeom>
+          <a:noFill/>
+          <a:ln w="28575">
+            <a:noFill/>
+          </a:ln>
+        </p:spPr>
+        <p:txBody>
+          <a:bodyPr wrap="square" rtlCol="0">
+            <a:spAutoFit/>
+          </a:bodyPr>
+          <a:lstStyle/>
+          <a:p>
+            <a:pPr algn="ctr"/>
+            <a:r>
+              <a:rPr lang="en-US" sz="1400" dirty="0"/>
+              <a:t>Family 266</a:t>
+            </a:r>
+          </a:p>
+          <a:p>
+            <a:pPr algn="ctr"/>
+            <a:r>
+              <a:rPr lang="fi-FI" sz="1400" i="1" dirty="0"/>
+              <a:t>resilient</a:t>
+            </a:r>
+            <a:endParaRPr lang="en-US" sz="1400" dirty="0"/>
+          </a:p>
+        </p:txBody>
+      </p:sp>
+      <p:sp>
+        <p:nvSpPr>
+          <p:cNvPr id="37" name="TextBox 36">
+            <a:extLst>
+              <a:ext uri="{FF2B5EF4-FFF2-40B4-BE49-F238E27FC236}">
+                <a16:creationId xmlns:a16="http://schemas.microsoft.com/office/drawing/2014/main" id="{F482ACAD-D4E5-6499-3583-1B602BFBABD5}"/>
+              </a:ext>
+            </a:extLst>
+          </p:cNvPr>
+          <p:cNvSpPr txBox="1"/>
+          <p:nvPr/>
+        </p:nvSpPr>
+        <p:spPr>
+          <a:xfrm>
+            <a:off x="4026243" y="4572000"/>
+            <a:ext cx="3115735" cy="369332"/>
+          </a:xfrm>
+          <a:prstGeom prst="rect">
+            <a:avLst/>
+          </a:prstGeom>
+          <a:noFill/>
+          <a:ln w="28575">
+            <a:solidFill>
+              <a:schemeClr val="accent1"/>
+            </a:solidFill>
+          </a:ln>
+        </p:spPr>
+        <p:txBody>
+          <a:bodyPr wrap="square" rtlCol="0">
+            <a:spAutoFit/>
+          </a:bodyPr>
+          <a:lstStyle/>
+          <a:p>
+            <a:pPr algn="ctr"/>
+            <a:r>
+              <a:rPr lang="en-US" dirty="0"/>
+              <a:t>Control (0 parasite spores g</a:t>
+            </a:r>
+            <a:r>
+              <a:rPr lang="en-US" baseline="30000" dirty="0"/>
+              <a:t>-1</a:t>
+            </a:r>
+            <a:r>
+              <a:rPr lang="en-US" dirty="0"/>
+              <a:t>)</a:t>
+            </a:r>
+          </a:p>
+        </p:txBody>
+      </p:sp>
+      <p:sp>
+        <p:nvSpPr>
+          <p:cNvPr id="38" name="TextBox 37">
+            <a:extLst>
+              <a:ext uri="{FF2B5EF4-FFF2-40B4-BE49-F238E27FC236}">
+                <a16:creationId xmlns:a16="http://schemas.microsoft.com/office/drawing/2014/main" id="{14DDD7EC-481B-5CDF-9059-D859A86CE858}"/>
+              </a:ext>
+            </a:extLst>
+          </p:cNvPr>
+          <p:cNvSpPr txBox="1"/>
+          <p:nvPr/>
+        </p:nvSpPr>
+        <p:spPr>
+          <a:xfrm>
+            <a:off x="4026242" y="5108604"/>
+            <a:ext cx="3115735" cy="369332"/>
+          </a:xfrm>
+          <a:prstGeom prst="rect">
+            <a:avLst/>
+          </a:prstGeom>
+          <a:noFill/>
+          <a:ln w="28575">
+            <a:solidFill>
+              <a:schemeClr val="accent3">
+                <a:lumMod val="60000"/>
+                <a:lumOff val="40000"/>
+              </a:schemeClr>
+            </a:solidFill>
+          </a:ln>
+        </p:spPr>
+        <p:txBody>
+          <a:bodyPr wrap="square" rtlCol="0">
+            <a:spAutoFit/>
+          </a:bodyPr>
+          <a:lstStyle/>
+          <a:p>
+            <a:pPr algn="ctr"/>
+            <a:r>
+              <a:rPr lang="en-US" dirty="0"/>
+              <a:t>Dose 10</a:t>
+            </a:r>
+            <a:r>
+              <a:rPr lang="en-US" baseline="30000" dirty="0"/>
+              <a:t>5</a:t>
+            </a:r>
+            <a:r>
+              <a:rPr lang="en-US" dirty="0"/>
+              <a:t> parasite spores g</a:t>
+            </a:r>
+            <a:r>
+              <a:rPr lang="en-US" baseline="30000" dirty="0"/>
+              <a:t>-1</a:t>
+            </a:r>
+            <a:r>
+              <a:rPr lang="en-US" dirty="0"/>
+              <a:t>)</a:t>
+            </a:r>
+          </a:p>
+        </p:txBody>
+      </p:sp>
+      <p:cxnSp>
+        <p:nvCxnSpPr>
+          <p:cNvPr id="39" name="Straight Arrow Connector 38">
+            <a:extLst>
+              <a:ext uri="{FF2B5EF4-FFF2-40B4-BE49-F238E27FC236}">
+                <a16:creationId xmlns:a16="http://schemas.microsoft.com/office/drawing/2014/main" id="{C514CE6E-EBC0-3CD1-5BAE-B531E9EA61BC}"/>
+              </a:ext>
+            </a:extLst>
+          </p:cNvPr>
+          <p:cNvCxnSpPr>
+            <a:cxnSpLocks/>
+          </p:cNvCxnSpPr>
+          <p:nvPr/>
+        </p:nvCxnSpPr>
+        <p:spPr>
+          <a:xfrm flipV="1">
+            <a:off x="2973462" y="5085624"/>
+            <a:ext cx="787005" cy="489982"/>
+          </a:xfrm>
+          <a:prstGeom prst="straightConnector1">
+            <a:avLst/>
+          </a:prstGeom>
+          <a:ln>
+            <a:solidFill>
+              <a:schemeClr val="tx1">
+                <a:lumMod val="50000"/>
+                <a:lumOff val="50000"/>
+              </a:schemeClr>
+            </a:solidFill>
+            <a:tailEnd type="triangle"/>
+          </a:ln>
+        </p:spPr>
+        <p:style>
+          <a:lnRef idx="2">
+            <a:schemeClr val="accent1"/>
+          </a:lnRef>
+          <a:fillRef idx="0">
+            <a:schemeClr val="accent1"/>
+          </a:fillRef>
+          <a:effectRef idx="1">
+            <a:schemeClr val="accent1"/>
+          </a:effectRef>
+          <a:fontRef idx="minor">
+            <a:schemeClr val="tx1"/>
+          </a:fontRef>
+        </p:style>
+      </p:cxnSp>
+      <p:cxnSp>
+        <p:nvCxnSpPr>
+          <p:cNvPr id="40" name="Straight Arrow Connector 39">
+            <a:extLst>
+              <a:ext uri="{FF2B5EF4-FFF2-40B4-BE49-F238E27FC236}">
+                <a16:creationId xmlns:a16="http://schemas.microsoft.com/office/drawing/2014/main" id="{A3198F2B-E055-1FF1-C8BE-FBBE0206FAD9}"/>
+              </a:ext>
+            </a:extLst>
+          </p:cNvPr>
+          <p:cNvCxnSpPr>
+            <a:cxnSpLocks/>
+          </p:cNvCxnSpPr>
+          <p:nvPr/>
+        </p:nvCxnSpPr>
+        <p:spPr>
+          <a:xfrm>
+            <a:off x="3022600" y="4549156"/>
+            <a:ext cx="737867" cy="459389"/>
+          </a:xfrm>
+          <a:prstGeom prst="straightConnector1">
+            <a:avLst/>
+          </a:prstGeom>
+          <a:ln>
+            <a:solidFill>
+              <a:schemeClr val="tx1">
+                <a:lumMod val="50000"/>
+                <a:lumOff val="50000"/>
+              </a:schemeClr>
+            </a:solidFill>
+            <a:tailEnd type="triangle"/>
+          </a:ln>
+        </p:spPr>
+        <p:style>
+          <a:lnRef idx="2">
+            <a:schemeClr val="accent1"/>
+          </a:lnRef>
+          <a:fillRef idx="0">
+            <a:schemeClr val="accent1"/>
+          </a:fillRef>
+          <a:effectRef idx="1">
+            <a:schemeClr val="accent1"/>
+          </a:effectRef>
+          <a:fontRef idx="minor">
+            <a:schemeClr val="tx1"/>
+          </a:fontRef>
+        </p:style>
+      </p:cxnSp>
+    </p:spTree>
+    <p:extLst>
+      <p:ext uri="{BB962C8B-B14F-4D97-AF65-F5344CB8AC3E}">
+        <p14:creationId xmlns:p14="http://schemas.microsoft.com/office/powerpoint/2010/main" val="2350593374"/>
       </p:ext>
     </p:extLst>
   </p:cSld>

</xml_diff>

<commit_message>
add photo and text for subsetting data
</commit_message>
<xml_diff>
--- a/analysis_ideas.pptx
+++ b/analysis_ideas.pptx
@@ -12,6 +12,7 @@
     <p:sldId id="260" r:id="rId6"/>
     <p:sldId id="261" r:id="rId7"/>
     <p:sldId id="262" r:id="rId8"/>
+    <p:sldId id="263" r:id="rId9"/>
   </p:sldIdLst>
   <p:sldSz cx="12192000" cy="6858000"/>
   <p:notesSz cx="6858000" cy="9144000"/>
@@ -121,7 +122,7 @@
 <file path=ppt/revisionInfo.xml><?xml version="1.0" encoding="utf-8"?>
 <p1510:revInfo xmlns:a="http://schemas.openxmlformats.org/drawingml/2006/main" xmlns:r="http://schemas.openxmlformats.org/officeDocument/2006/relationships" xmlns:p1510="http://schemas.microsoft.com/office/powerpoint/2015/10/main">
   <p1510:revLst>
-    <p1510:client id="{1652D9ED-8F34-4469-AA6E-2BA2F557AC94}" v="4" dt="2025-01-17T15:05:23.313"/>
+    <p1510:client id="{A15FB58C-E6E2-41C5-8160-F7C00DB20A18}" v="5" dt="2025-01-29T23:30:22.752"/>
   </p1510:revLst>
 </p1510:revInfo>
 </file>
@@ -165,38 +166,78 @@
             <ac:spMk id="21" creationId="{B86F60C9-4883-F689-A999-7FE175456DC7}"/>
           </ac:spMkLst>
         </pc:spChg>
-        <pc:spChg chg="add del mod">
-          <ac:chgData name="Steve H. Yost" userId="9b5a6cf492109805" providerId="LiveId" clId="{1652D9ED-8F34-4469-AA6E-2BA2F557AC94}" dt="2025-01-17T15:41:59.852" v="335" actId="478"/>
+      </pc:sldChg>
+    </pc:docChg>
+  </pc:docChgLst>
+  <pc:docChgLst>
+    <pc:chgData name="Shelly Wanamaker" userId="cd0df884-05c1-481b-a1f7-883604879bba" providerId="ADAL" clId="{A15FB58C-E6E2-41C5-8160-F7C00DB20A18}"/>
+    <pc:docChg chg="undo custSel addSld modSld">
+      <pc:chgData name="Shelly Wanamaker" userId="cd0df884-05c1-481b-a1f7-883604879bba" providerId="ADAL" clId="{A15FB58C-E6E2-41C5-8160-F7C00DB20A18}" dt="2025-01-29T23:44:07.538" v="569" actId="1076"/>
+      <pc:docMkLst>
+        <pc:docMk/>
+      </pc:docMkLst>
+      <pc:sldChg chg="addSp delSp modSp new mod">
+        <pc:chgData name="Shelly Wanamaker" userId="cd0df884-05c1-481b-a1f7-883604879bba" providerId="ADAL" clId="{A15FB58C-E6E2-41C5-8160-F7C00DB20A18}" dt="2025-01-29T23:44:07.538" v="569" actId="1076"/>
+        <pc:sldMkLst>
+          <pc:docMk/>
+          <pc:sldMk cId="3807472139" sldId="263"/>
+        </pc:sldMkLst>
+        <pc:spChg chg="mod">
+          <ac:chgData name="Shelly Wanamaker" userId="cd0df884-05c1-481b-a1f7-883604879bba" providerId="ADAL" clId="{A15FB58C-E6E2-41C5-8160-F7C00DB20A18}" dt="2025-01-29T23:30:10.009" v="538" actId="20577"/>
           <ac:spMkLst>
             <pc:docMk/>
-            <pc:sldMk cId="1835731223" sldId="261"/>
-            <ac:spMk id="22" creationId="{67257C7A-1475-8BA1-6BDC-591D5A4FB73F}"/>
+            <pc:sldMk cId="3807472139" sldId="263"/>
+            <ac:spMk id="2" creationId="{A228BAC5-9279-3421-3AE9-B328A95A6744}"/>
+          </ac:spMkLst>
+        </pc:spChg>
+        <pc:spChg chg="del">
+          <ac:chgData name="Shelly Wanamaker" userId="cd0df884-05c1-481b-a1f7-883604879bba" providerId="ADAL" clId="{A15FB58C-E6E2-41C5-8160-F7C00DB20A18}" dt="2025-01-29T23:06:55.311" v="1" actId="478"/>
+          <ac:spMkLst>
+            <pc:docMk/>
+            <pc:sldMk cId="3807472139" sldId="263"/>
+            <ac:spMk id="3" creationId="{C879B45A-6711-FB34-72A7-E1E104F63853}"/>
+          </ac:spMkLst>
+        </pc:spChg>
+        <pc:spChg chg="add del">
+          <ac:chgData name="Shelly Wanamaker" userId="cd0df884-05c1-481b-a1f7-883604879bba" providerId="ADAL" clId="{A15FB58C-E6E2-41C5-8160-F7C00DB20A18}" dt="2025-01-29T23:06:58.057" v="3" actId="22"/>
+          <ac:spMkLst>
+            <pc:docMk/>
+            <pc:sldMk cId="3807472139" sldId="263"/>
+            <ac:spMk id="5" creationId="{1C63DA71-6D23-9501-7CC8-2D84D2D9A7DA}"/>
+          </ac:spMkLst>
+        </pc:spChg>
+        <pc:spChg chg="add mod">
+          <ac:chgData name="Shelly Wanamaker" userId="cd0df884-05c1-481b-a1f7-883604879bba" providerId="ADAL" clId="{A15FB58C-E6E2-41C5-8160-F7C00DB20A18}" dt="2025-01-29T23:07:13.169" v="4"/>
+          <ac:spMkLst>
+            <pc:docMk/>
+            <pc:sldMk cId="3807472139" sldId="263"/>
+            <ac:spMk id="6" creationId="{08FC37FD-3C17-CE95-A1D9-9D112AAF0C29}"/>
           </ac:spMkLst>
         </pc:spChg>
         <pc:spChg chg="add del mod">
-          <ac:chgData name="Steve H. Yost" userId="9b5a6cf492109805" providerId="LiveId" clId="{1652D9ED-8F34-4469-AA6E-2BA2F557AC94}" dt="2025-01-17T15:05:42.953" v="249" actId="478"/>
+          <ac:chgData name="Shelly Wanamaker" userId="cd0df884-05c1-481b-a1f7-883604879bba" providerId="ADAL" clId="{A15FB58C-E6E2-41C5-8160-F7C00DB20A18}" dt="2025-01-29T23:08:40.167" v="46" actId="478"/>
           <ac:spMkLst>
             <pc:docMk/>
-            <pc:sldMk cId="1835731223" sldId="261"/>
-            <ac:spMk id="23" creationId="{20E02368-1E3F-5A59-D8F5-FD5E32226F93}"/>
+            <pc:sldMk cId="3807472139" sldId="263"/>
+            <ac:spMk id="9" creationId="{1756998B-7C3D-E7B5-2374-9480862D9305}"/>
           </ac:spMkLst>
         </pc:spChg>
-        <pc:spChg chg="add del mod">
-          <ac:chgData name="Steve H. Yost" userId="9b5a6cf492109805" providerId="LiveId" clId="{1652D9ED-8F34-4469-AA6E-2BA2F557AC94}" dt="2025-01-17T15:42:11.281" v="337" actId="478"/>
+        <pc:spChg chg="add mod">
+          <ac:chgData name="Shelly Wanamaker" userId="cd0df884-05c1-481b-a1f7-883604879bba" providerId="ADAL" clId="{A15FB58C-E6E2-41C5-8160-F7C00DB20A18}" dt="2025-01-29T23:44:07.538" v="569" actId="1076"/>
           <ac:spMkLst>
             <pc:docMk/>
-            <pc:sldMk cId="1835731223" sldId="261"/>
-            <ac:spMk id="24" creationId="{488CD53D-F774-F42E-9460-2428B5D971EB}"/>
+            <pc:sldMk cId="3807472139" sldId="263"/>
+            <ac:spMk id="10" creationId="{CA0A4FCC-A9C0-9EBB-847A-1534BBEF899A}"/>
           </ac:spMkLst>
         </pc:spChg>
-        <pc:cxnChg chg="add del mod">
-          <ac:chgData name="Steve H. Yost" userId="9b5a6cf492109805" providerId="LiveId" clId="{1652D9ED-8F34-4469-AA6E-2BA2F557AC94}" dt="2025-01-17T15:41:56.783" v="334" actId="478"/>
-          <ac:cxnSpMkLst>
+        <pc:picChg chg="add mod modCrop">
+          <ac:chgData name="Shelly Wanamaker" userId="cd0df884-05c1-481b-a1f7-883604879bba" providerId="ADAL" clId="{A15FB58C-E6E2-41C5-8160-F7C00DB20A18}" dt="2025-01-29T23:27:23.663" v="460" actId="14100"/>
+          <ac:picMkLst>
             <pc:docMk/>
-            <pc:sldMk cId="1835731223" sldId="261"/>
-            <ac:cxnSpMk id="13" creationId="{83E220EE-22EB-87FD-26F9-3C5318F405D8}"/>
-          </ac:cxnSpMkLst>
-        </pc:cxnChg>
+            <pc:sldMk cId="3807472139" sldId="263"/>
+            <ac:picMk id="8" creationId="{201CEA06-2A27-B0A5-9514-74634519C29A}"/>
+          </ac:picMkLst>
+        </pc:picChg>
       </pc:sldChg>
     </pc:docChg>
   </pc:docChgLst>
@@ -350,7 +391,7 @@
           <a:p>
             <a:fld id="{B39DB6D8-D897-47EB-B13C-F7D5E8B7745B}" type="datetimeFigureOut">
               <a:rPr lang="en-US" smtClean="0"/>
-              <a:t>1/28/2025</a:t>
+              <a:t>1/29/2025</a:t>
             </a:fld>
             <a:endParaRPr lang="en-US"/>
           </a:p>
@@ -548,7 +589,7 @@
           <a:p>
             <a:fld id="{B39DB6D8-D897-47EB-B13C-F7D5E8B7745B}" type="datetimeFigureOut">
               <a:rPr lang="en-US" smtClean="0"/>
-              <a:t>1/28/2025</a:t>
+              <a:t>1/29/2025</a:t>
             </a:fld>
             <a:endParaRPr lang="en-US"/>
           </a:p>
@@ -756,7 +797,7 @@
           <a:p>
             <a:fld id="{B39DB6D8-D897-47EB-B13C-F7D5E8B7745B}" type="datetimeFigureOut">
               <a:rPr lang="en-US" smtClean="0"/>
-              <a:t>1/28/2025</a:t>
+              <a:t>1/29/2025</a:t>
             </a:fld>
             <a:endParaRPr lang="en-US"/>
           </a:p>
@@ -954,7 +995,7 @@
           <a:p>
             <a:fld id="{B39DB6D8-D897-47EB-B13C-F7D5E8B7745B}" type="datetimeFigureOut">
               <a:rPr lang="en-US" smtClean="0"/>
-              <a:t>1/28/2025</a:t>
+              <a:t>1/29/2025</a:t>
             </a:fld>
             <a:endParaRPr lang="en-US"/>
           </a:p>
@@ -1229,7 +1270,7 @@
           <a:p>
             <a:fld id="{B39DB6D8-D897-47EB-B13C-F7D5E8B7745B}" type="datetimeFigureOut">
               <a:rPr lang="en-US" smtClean="0"/>
-              <a:t>1/28/2025</a:t>
+              <a:t>1/29/2025</a:t>
             </a:fld>
             <a:endParaRPr lang="en-US"/>
           </a:p>
@@ -1494,7 +1535,7 @@
           <a:p>
             <a:fld id="{B39DB6D8-D897-47EB-B13C-F7D5E8B7745B}" type="datetimeFigureOut">
               <a:rPr lang="en-US" smtClean="0"/>
-              <a:t>1/28/2025</a:t>
+              <a:t>1/29/2025</a:t>
             </a:fld>
             <a:endParaRPr lang="en-US"/>
           </a:p>
@@ -1906,7 +1947,7 @@
           <a:p>
             <a:fld id="{B39DB6D8-D897-47EB-B13C-F7D5E8B7745B}" type="datetimeFigureOut">
               <a:rPr lang="en-US" smtClean="0"/>
-              <a:t>1/28/2025</a:t>
+              <a:t>1/29/2025</a:t>
             </a:fld>
             <a:endParaRPr lang="en-US"/>
           </a:p>
@@ -2047,7 +2088,7 @@
           <a:p>
             <a:fld id="{B39DB6D8-D897-47EB-B13C-F7D5E8B7745B}" type="datetimeFigureOut">
               <a:rPr lang="en-US" smtClean="0"/>
-              <a:t>1/28/2025</a:t>
+              <a:t>1/29/2025</a:t>
             </a:fld>
             <a:endParaRPr lang="en-US"/>
           </a:p>
@@ -2160,7 +2201,7 @@
           <a:p>
             <a:fld id="{B39DB6D8-D897-47EB-B13C-F7D5E8B7745B}" type="datetimeFigureOut">
               <a:rPr lang="en-US" smtClean="0"/>
-              <a:t>1/28/2025</a:t>
+              <a:t>1/29/2025</a:t>
             </a:fld>
             <a:endParaRPr lang="en-US"/>
           </a:p>
@@ -2471,7 +2512,7 @@
           <a:p>
             <a:fld id="{B39DB6D8-D897-47EB-B13C-F7D5E8B7745B}" type="datetimeFigureOut">
               <a:rPr lang="en-US" smtClean="0"/>
-              <a:t>1/28/2025</a:t>
+              <a:t>1/29/2025</a:t>
             </a:fld>
             <a:endParaRPr lang="en-US"/>
           </a:p>
@@ -2759,7 +2800,7 @@
           <a:p>
             <a:fld id="{B39DB6D8-D897-47EB-B13C-F7D5E8B7745B}" type="datetimeFigureOut">
               <a:rPr lang="en-US" smtClean="0"/>
-              <a:t>1/28/2025</a:t>
+              <a:t>1/29/2025</a:t>
             </a:fld>
             <a:endParaRPr lang="en-US"/>
           </a:p>
@@ -3000,7 +3041,7 @@
           <a:p>
             <a:fld id="{B39DB6D8-D897-47EB-B13C-F7D5E8B7745B}" type="datetimeFigureOut">
               <a:rPr lang="en-US" smtClean="0"/>
-              <a:t>1/28/2025</a:t>
+              <a:t>1/29/2025</a:t>
             </a:fld>
             <a:endParaRPr lang="en-US"/>
           </a:p>
@@ -9879,6 +9920,391 @@
     <p:extLst>
       <p:ext uri="{BB962C8B-B14F-4D97-AF65-F5344CB8AC3E}">
         <p14:creationId xmlns:p14="http://schemas.microsoft.com/office/powerpoint/2010/main" val="2350593374"/>
+      </p:ext>
+    </p:extLst>
+  </p:cSld>
+  <p:clrMapOvr>
+    <a:masterClrMapping/>
+  </p:clrMapOvr>
+</p:sld>
+</file>
+
+<file path=ppt/slides/slide8.xml><?xml version="1.0" encoding="utf-8"?>
+<p:sld xmlns:a="http://schemas.openxmlformats.org/drawingml/2006/main" xmlns:r="http://schemas.openxmlformats.org/officeDocument/2006/relationships" xmlns:p="http://schemas.openxmlformats.org/presentationml/2006/main">
+  <p:cSld>
+    <p:spTree>
+      <p:nvGrpSpPr>
+        <p:cNvPr id="1" name=""/>
+        <p:cNvGrpSpPr/>
+        <p:nvPr/>
+      </p:nvGrpSpPr>
+      <p:grpSpPr>
+        <a:xfrm>
+          <a:off x="0" y="0"/>
+          <a:ext cx="0" cy="0"/>
+          <a:chOff x="0" y="0"/>
+          <a:chExt cx="0" cy="0"/>
+        </a:xfrm>
+      </p:grpSpPr>
+      <p:sp>
+        <p:nvSpPr>
+          <p:cNvPr id="2" name="Title 1">
+            <a:extLst>
+              <a:ext uri="{FF2B5EF4-FFF2-40B4-BE49-F238E27FC236}">
+                <a16:creationId xmlns:a16="http://schemas.microsoft.com/office/drawing/2014/main" id="{A228BAC5-9279-3421-3AE9-B328A95A6744}"/>
+              </a:ext>
+            </a:extLst>
+          </p:cNvPr>
+          <p:cNvSpPr>
+            <a:spLocks noGrp="1"/>
+          </p:cNvSpPr>
+          <p:nvPr>
+            <p:ph type="title"/>
+          </p:nvPr>
+        </p:nvSpPr>
+        <p:spPr/>
+        <p:txBody>
+          <a:bodyPr/>
+          <a:lstStyle/>
+          <a:p>
+            <a:r>
+              <a:rPr lang="en-US" dirty="0" err="1"/>
+              <a:t>Subsetting</a:t>
+            </a:r>
+            <a:r>
+              <a:rPr lang="en-US" dirty="0"/>
+              <a:t> the data</a:t>
+            </a:r>
+          </a:p>
+        </p:txBody>
+      </p:sp>
+      <p:sp>
+        <p:nvSpPr>
+          <p:cNvPr id="6" name="AutoShape 2" descr="IMG_3902">
+            <a:extLst>
+              <a:ext uri="{FF2B5EF4-FFF2-40B4-BE49-F238E27FC236}">
+                <a16:creationId xmlns:a16="http://schemas.microsoft.com/office/drawing/2014/main" id="{08FC37FD-3C17-CE95-A1D9-9D112AAF0C29}"/>
+              </a:ext>
+            </a:extLst>
+          </p:cNvPr>
+          <p:cNvSpPr>
+            <a:spLocks noChangeAspect="1" noChangeArrowheads="1"/>
+          </p:cNvSpPr>
+          <p:nvPr/>
+        </p:nvSpPr>
+        <p:spPr bwMode="auto">
+          <a:xfrm>
+            <a:off x="5943600" y="3276600"/>
+            <a:ext cx="304800" cy="304800"/>
+          </a:xfrm>
+          <a:prstGeom prst="rect">
+            <a:avLst/>
+          </a:prstGeom>
+          <a:noFill/>
+          <a:extLst>
+            <a:ext uri="{909E8E84-426E-40DD-AFC4-6F175D3DCCD1}">
+              <a14:hiddenFill xmlns:a14="http://schemas.microsoft.com/office/drawing/2010/main">
+                <a:solidFill>
+                  <a:srgbClr val="FFFFFF"/>
+                </a:solidFill>
+              </a14:hiddenFill>
+            </a:ext>
+          </a:extLst>
+        </p:spPr>
+        <p:txBody>
+          <a:bodyPr vert="horz" wrap="square" lIns="91440" tIns="45720" rIns="91440" bIns="45720" numCol="1" anchor="t" anchorCtr="0" compatLnSpc="1">
+            <a:prstTxWarp prst="textNoShape">
+              <a:avLst/>
+            </a:prstTxWarp>
+          </a:bodyPr>
+          <a:lstStyle/>
+          <a:p>
+            <a:endParaRPr lang="en-US"/>
+          </a:p>
+        </p:txBody>
+      </p:sp>
+      <p:pic>
+        <p:nvPicPr>
+          <p:cNvPr id="8" name="Picture 7" descr="A glass board with writing on it&#10;&#10;Description automatically generated">
+            <a:extLst>
+              <a:ext uri="{FF2B5EF4-FFF2-40B4-BE49-F238E27FC236}">
+                <a16:creationId xmlns:a16="http://schemas.microsoft.com/office/drawing/2014/main" id="{201CEA06-2A27-B0A5-9514-74634519C29A}"/>
+              </a:ext>
+            </a:extLst>
+          </p:cNvPr>
+          <p:cNvPicPr>
+            <a:picLocks noChangeAspect="1"/>
+          </p:cNvPicPr>
+          <p:nvPr/>
+        </p:nvPicPr>
+        <p:blipFill>
+          <a:blip r:embed="rId2">
+            <a:extLst>
+              <a:ext uri="{28A0092B-C50C-407E-A947-70E740481C1C}">
+                <a14:useLocalDpi xmlns:a14="http://schemas.microsoft.com/office/drawing/2010/main" val="0"/>
+              </a:ext>
+            </a:extLst>
+          </a:blip>
+          <a:srcRect l="22042" t="15771" r="16344" b="45233"/>
+          <a:stretch/>
+        </p:blipFill>
+        <p:spPr>
+          <a:xfrm>
+            <a:off x="614516" y="1939413"/>
+            <a:ext cx="3459040" cy="1641988"/>
+          </a:xfrm>
+          <a:prstGeom prst="rect">
+            <a:avLst/>
+          </a:prstGeom>
+        </p:spPr>
+      </p:pic>
+      <p:sp>
+        <p:nvSpPr>
+          <p:cNvPr id="10" name="TextBox 9">
+            <a:extLst>
+              <a:ext uri="{FF2B5EF4-FFF2-40B4-BE49-F238E27FC236}">
+                <a16:creationId xmlns:a16="http://schemas.microsoft.com/office/drawing/2014/main" id="{CA0A4FCC-A9C0-9EBB-847A-1534BBEF899A}"/>
+              </a:ext>
+            </a:extLst>
+          </p:cNvPr>
+          <p:cNvSpPr txBox="1"/>
+          <p:nvPr/>
+        </p:nvSpPr>
+        <p:spPr>
+          <a:xfrm>
+            <a:off x="4604203" y="1521279"/>
+            <a:ext cx="4629150" cy="5693866"/>
+          </a:xfrm>
+          <a:prstGeom prst="rect">
+            <a:avLst/>
+          </a:prstGeom>
+          <a:noFill/>
+        </p:spPr>
+        <p:txBody>
+          <a:bodyPr wrap="square" rtlCol="0">
+            <a:spAutoFit/>
+          </a:bodyPr>
+          <a:lstStyle/>
+          <a:p>
+            <a:pPr marL="285750" indent="-285750">
+              <a:buFont typeface="Arial" panose="020B0604020202020204" pitchFamily="34" charset="0"/>
+              <a:buChar char="•"/>
+            </a:pPr>
+            <a:r>
+              <a:rPr lang="en-US" sz="1600" dirty="0"/>
+              <a:t>Dataset 1: </a:t>
+            </a:r>
+          </a:p>
+          <a:p>
+            <a:pPr marL="742950" lvl="1" indent="-285750">
+              <a:buFont typeface="Arial" panose="020B0604020202020204" pitchFamily="34" charset="0"/>
+              <a:buChar char="•"/>
+            </a:pPr>
+            <a:r>
+              <a:rPr lang="en-US" sz="1600" dirty="0"/>
+              <a:t>CTRL (n = 12-20)</a:t>
+            </a:r>
+          </a:p>
+          <a:p>
+            <a:pPr marL="742950" lvl="1" indent="-285750">
+              <a:buFont typeface="Arial" panose="020B0604020202020204" pitchFamily="34" charset="0"/>
+              <a:buChar char="•"/>
+            </a:pPr>
+            <a:r>
+              <a:rPr lang="en-US" sz="1600" dirty="0"/>
+              <a:t>10^8 dosed (n = 12-20)</a:t>
+            </a:r>
+          </a:p>
+          <a:p>
+            <a:pPr marL="742950" lvl="1" indent="-285750">
+              <a:buFont typeface="Arial" panose="020B0604020202020204" pitchFamily="34" charset="0"/>
+              <a:buChar char="•"/>
+            </a:pPr>
+            <a:r>
+              <a:rPr lang="en-US" sz="1600" dirty="0"/>
+              <a:t>10^7 dosed (n = 12-20)</a:t>
+            </a:r>
+          </a:p>
+          <a:p>
+            <a:pPr marL="285750" indent="-285750">
+              <a:buFont typeface="Arial" panose="020B0604020202020204" pitchFamily="34" charset="0"/>
+              <a:buChar char="•"/>
+            </a:pPr>
+            <a:r>
+              <a:rPr lang="en-US" sz="1600" dirty="0"/>
+              <a:t>Dataset 2: </a:t>
+            </a:r>
+          </a:p>
+          <a:p>
+            <a:pPr marL="742950" lvl="1" indent="-285750">
+              <a:buFont typeface="Arial" panose="020B0604020202020204" pitchFamily="34" charset="0"/>
+              <a:buChar char="•"/>
+            </a:pPr>
+            <a:r>
+              <a:rPr lang="en-US" sz="1600" dirty="0"/>
+              <a:t>CTRL (very light, n =16)</a:t>
+            </a:r>
+          </a:p>
+          <a:p>
+            <a:pPr marL="742950" lvl="1" indent="-285750">
+              <a:buFont typeface="Arial" panose="020B0604020202020204" pitchFamily="34" charset="0"/>
+              <a:buChar char="•"/>
+            </a:pPr>
+            <a:r>
+              <a:rPr lang="en-US" sz="1600" dirty="0"/>
+              <a:t>Moderate (10^4-10^5, n =16)</a:t>
+            </a:r>
+          </a:p>
+          <a:p>
+            <a:pPr marL="742950" lvl="1" indent="-285750">
+              <a:buFont typeface="Arial" panose="020B0604020202020204" pitchFamily="34" charset="0"/>
+              <a:buChar char="•"/>
+            </a:pPr>
+            <a:r>
+              <a:rPr lang="en-US" sz="1600" dirty="0"/>
+              <a:t>Moderate heavy (&gt;10^5, n =16)</a:t>
+            </a:r>
+          </a:p>
+          <a:p>
+            <a:pPr marL="285750" indent="-285750">
+              <a:buFont typeface="Arial" panose="020B0604020202020204" pitchFamily="34" charset="0"/>
+              <a:buChar char="•"/>
+            </a:pPr>
+            <a:r>
+              <a:rPr lang="en-US" sz="1600" dirty="0"/>
+              <a:t>Dataset 3: </a:t>
+            </a:r>
+          </a:p>
+          <a:p>
+            <a:pPr marL="742950" lvl="1" indent="-285750">
+              <a:buFont typeface="Arial" panose="020B0604020202020204" pitchFamily="34" charset="0"/>
+              <a:buChar char="•"/>
+            </a:pPr>
+            <a:r>
+              <a:rPr lang="en-US" sz="1600" dirty="0"/>
+              <a:t>Dosed C. gigas (n = 5)</a:t>
+            </a:r>
+          </a:p>
+          <a:p>
+            <a:pPr marL="742950" lvl="1" indent="-285750">
+              <a:buFont typeface="Arial" panose="020B0604020202020204" pitchFamily="34" charset="0"/>
+              <a:buChar char="•"/>
+            </a:pPr>
+            <a:r>
+              <a:rPr lang="en-US" sz="1600" dirty="0"/>
+              <a:t>Dosed C. virginica (n=5)</a:t>
+            </a:r>
+          </a:p>
+          <a:p>
+            <a:pPr marL="742950" lvl="1" indent="-285750">
+              <a:buFont typeface="Arial" panose="020B0604020202020204" pitchFamily="34" charset="0"/>
+              <a:buChar char="•"/>
+            </a:pPr>
+            <a:r>
+              <a:rPr lang="en-US" sz="1600" dirty="0"/>
+              <a:t>Use all samples</a:t>
+            </a:r>
+          </a:p>
+          <a:p>
+            <a:pPr marL="285750" indent="-285750">
+              <a:buFont typeface="Arial" panose="020B0604020202020204" pitchFamily="34" charset="0"/>
+              <a:buChar char="•"/>
+            </a:pPr>
+            <a:r>
+              <a:rPr lang="en-US" sz="1600" dirty="0"/>
+              <a:t>Dataset 4: </a:t>
+            </a:r>
+          </a:p>
+          <a:p>
+            <a:pPr marL="742950" lvl="1" indent="-285750">
+              <a:buFont typeface="Arial" panose="020B0604020202020204" pitchFamily="34" charset="0"/>
+              <a:buChar char="•"/>
+            </a:pPr>
+            <a:r>
+              <a:rPr lang="en-US" sz="1600" dirty="0"/>
+              <a:t>CTRL (n = 12-20)</a:t>
+            </a:r>
+          </a:p>
+          <a:p>
+            <a:pPr marL="742950" lvl="1" indent="-285750">
+              <a:buFont typeface="Arial" panose="020B0604020202020204" pitchFamily="34" charset="0"/>
+              <a:buChar char="•"/>
+            </a:pPr>
+            <a:r>
+              <a:rPr lang="en-US" sz="1600" dirty="0"/>
+              <a:t>Injected (n = 12-20)</a:t>
+            </a:r>
+          </a:p>
+          <a:p>
+            <a:pPr marL="742950" lvl="1" indent="-285750">
+              <a:buFont typeface="Arial" panose="020B0604020202020204" pitchFamily="34" charset="0"/>
+              <a:buChar char="•"/>
+            </a:pPr>
+            <a:r>
+              <a:rPr lang="en-US" sz="1600" dirty="0"/>
+              <a:t>Use all time points</a:t>
+            </a:r>
+          </a:p>
+          <a:p>
+            <a:pPr marL="285750" indent="-285750">
+              <a:buFont typeface="Arial" panose="020B0604020202020204" pitchFamily="34" charset="0"/>
+              <a:buChar char="•"/>
+            </a:pPr>
+            <a:r>
+              <a:rPr lang="en-US" sz="1600" dirty="0"/>
+              <a:t>Dataset 5:</a:t>
+            </a:r>
+          </a:p>
+          <a:p>
+            <a:pPr marL="742950" lvl="1" indent="-285750">
+              <a:buFont typeface="Arial" panose="020B0604020202020204" pitchFamily="34" charset="0"/>
+              <a:buChar char="•"/>
+            </a:pPr>
+            <a:r>
+              <a:rPr lang="en-US" sz="1600" dirty="0"/>
+              <a:t>CTRL (n = 20)</a:t>
+            </a:r>
+          </a:p>
+          <a:p>
+            <a:pPr marL="742950" lvl="1" indent="-285750">
+              <a:buFont typeface="Arial" panose="020B0604020202020204" pitchFamily="34" charset="0"/>
+              <a:buChar char="•"/>
+            </a:pPr>
+            <a:r>
+              <a:rPr lang="en-US" sz="1600" dirty="0"/>
+              <a:t>10^5 dosed (n =20)</a:t>
+            </a:r>
+          </a:p>
+          <a:p>
+            <a:pPr marL="742950" lvl="1" indent="-285750">
+              <a:buFont typeface="Arial" panose="020B0604020202020204" pitchFamily="34" charset="0"/>
+              <a:buChar char="•"/>
+            </a:pPr>
+            <a:r>
+              <a:rPr lang="en-US" sz="1600" dirty="0"/>
+              <a:t>Exclude time point 36 h</a:t>
+            </a:r>
+          </a:p>
+          <a:p>
+            <a:pPr marL="742950" lvl="1" indent="-285750">
+              <a:buFont typeface="Arial" panose="020B0604020202020204" pitchFamily="34" charset="0"/>
+              <a:buChar char="•"/>
+            </a:pPr>
+            <a:endParaRPr lang="en-US" sz="1600" dirty="0"/>
+          </a:p>
+          <a:p>
+            <a:pPr marL="742950" lvl="1" indent="-285750">
+              <a:buFont typeface="Arial" panose="020B0604020202020204" pitchFamily="34" charset="0"/>
+              <a:buChar char="•"/>
+            </a:pPr>
+            <a:endParaRPr lang="en-US" sz="1600" dirty="0"/>
+          </a:p>
+        </p:txBody>
+      </p:sp>
+    </p:spTree>
+    <p:extLst>
+      <p:ext uri="{BB962C8B-B14F-4D97-AF65-F5344CB8AC3E}">
+        <p14:creationId xmlns:p14="http://schemas.microsoft.com/office/powerpoint/2010/main" val="3807472139"/>
       </p:ext>
     </p:extLst>
   </p:cSld>

</xml_diff>